<commit_message>
# Update LUANVAN.docx: Kiến trúc hệ thống (hình vẽ) # Update SODO.pptx: Kiến trúc hệ thống
</commit_message>
<xml_diff>
--- a/Document/SODO.pptx
+++ b/Document/SODO.pptx
@@ -13,6 +13,10 @@
     <p:sldId id="263" r:id="rId7"/>
     <p:sldId id="261" r:id="rId8"/>
     <p:sldId id="262" r:id="rId9"/>
+    <p:sldId id="264" r:id="rId10"/>
+    <p:sldId id="265" r:id="rId11"/>
+    <p:sldId id="267" r:id="rId12"/>
+    <p:sldId id="266" r:id="rId13"/>
   </p:sldIdLst>
   <p:sldSz cx="12192000" cy="6858000"/>
   <p:notesSz cx="6858000" cy="9144000"/>
@@ -3646,564 +3650,6 @@
       <dsp:cNvGrpSpPr/>
     </dsp:nvGrpSpPr>
     <dsp:grpSpPr/>
-    <dsp:sp modelId="{7F739C37-DE7D-4C78-8F14-BB11D63384A4}">
-      <dsp:nvSpPr>
-        <dsp:cNvPr id="0" name=""/>
-        <dsp:cNvSpPr/>
-      </dsp:nvSpPr>
-      <dsp:spPr>
-        <a:xfrm>
-          <a:off x="2567" y="272267"/>
-          <a:ext cx="2284883" cy="913953"/>
-        </a:xfrm>
-        <a:prstGeom prst="chevron">
-          <a:avLst/>
-        </a:prstGeom>
-        <a:solidFill>
-          <a:schemeClr val="accent1">
-            <a:hueOff val="0"/>
-            <a:satOff val="0"/>
-            <a:lumOff val="0"/>
-            <a:alphaOff val="0"/>
-          </a:schemeClr>
-        </a:solidFill>
-        <a:ln w="12700" cap="flat" cmpd="sng" algn="ctr">
-          <a:solidFill>
-            <a:schemeClr val="lt1">
-              <a:hueOff val="0"/>
-              <a:satOff val="0"/>
-              <a:lumOff val="0"/>
-              <a:alphaOff val="0"/>
-            </a:schemeClr>
-          </a:solidFill>
-          <a:prstDash val="solid"/>
-          <a:miter lim="800000"/>
-        </a:ln>
-        <a:effectLst/>
-      </dsp:spPr>
-      <dsp:style>
-        <a:lnRef idx="2">
-          <a:scrgbClr r="0" g="0" b="0"/>
-        </a:lnRef>
-        <a:fillRef idx="1">
-          <a:scrgbClr r="0" g="0" b="0"/>
-        </a:fillRef>
-        <a:effectRef idx="0">
-          <a:scrgbClr r="0" g="0" b="0"/>
-        </a:effectRef>
-        <a:fontRef idx="minor">
-          <a:schemeClr val="lt1"/>
-        </a:fontRef>
-      </dsp:style>
-      <dsp:txBody>
-        <a:bodyPr spcFirstLastPara="0" vert="horz" wrap="square" lIns="72009" tIns="24003" rIns="24003" bIns="24003" numCol="1" spcCol="1270" anchor="ctr" anchorCtr="0">
-          <a:noAutofit/>
-        </a:bodyPr>
-        <a:lstStyle/>
-        <a:p>
-          <a:pPr lvl="0" algn="ctr" defTabSz="800100">
-            <a:lnSpc>
-              <a:spcPct val="90000"/>
-            </a:lnSpc>
-            <a:spcBef>
-              <a:spcPct val="0"/>
-            </a:spcBef>
-            <a:spcAft>
-              <a:spcPct val="35000"/>
-            </a:spcAft>
-          </a:pPr>
-          <a:r>
-            <a:rPr lang="en-US" sz="1800" kern="1200" dirty="0" err="1" smtClean="0"/>
-            <a:t>Xác</a:t>
-          </a:r>
-          <a:r>
-            <a:rPr lang="en-US" sz="1800" kern="1200" dirty="0" smtClean="0"/>
-            <a:t> </a:t>
-          </a:r>
-          <a:r>
-            <a:rPr lang="en-US" sz="1800" kern="1200" dirty="0" err="1" smtClean="0"/>
-            <a:t>định</a:t>
-          </a:r>
-          <a:r>
-            <a:rPr lang="en-US" sz="1800" kern="1200" dirty="0" smtClean="0"/>
-            <a:t> </a:t>
-          </a:r>
-          <a:r>
-            <a:rPr lang="en-US" sz="1800" kern="1200" dirty="0" err="1" smtClean="0"/>
-            <a:t>địa</a:t>
-          </a:r>
-          <a:r>
-            <a:rPr lang="en-US" sz="1800" kern="1200" dirty="0" smtClean="0"/>
-            <a:t> </a:t>
-          </a:r>
-          <a:r>
-            <a:rPr lang="en-US" sz="1800" kern="1200" dirty="0" err="1" smtClean="0"/>
-            <a:t>chỉ</a:t>
-          </a:r>
-          <a:r>
-            <a:rPr lang="en-US" sz="1800" kern="1200" dirty="0" smtClean="0"/>
-            <a:t> </a:t>
-          </a:r>
-          <a:r>
-            <a:rPr lang="en-US" sz="1800" kern="1200" dirty="0" err="1" smtClean="0"/>
-            <a:t>hàm</a:t>
-          </a:r>
-          <a:r>
-            <a:rPr lang="en-US" sz="1800" kern="1200" dirty="0" smtClean="0"/>
-            <a:t> </a:t>
-          </a:r>
-          <a:r>
-            <a:rPr lang="en-US" sz="1800" kern="1200" dirty="0" err="1" smtClean="0"/>
-            <a:t>gốc</a:t>
-          </a:r>
-          <a:r>
-            <a:rPr lang="en-US" sz="1800" kern="1200" dirty="0" smtClean="0"/>
-            <a:t> (entry point)</a:t>
-          </a:r>
-          <a:endParaRPr lang="en-US" sz="1800" kern="1200" dirty="0"/>
-        </a:p>
-      </dsp:txBody>
-      <dsp:txXfrm>
-        <a:off x="459544" y="272267"/>
-        <a:ext cx="1370930" cy="913953"/>
-      </dsp:txXfrm>
-    </dsp:sp>
-    <dsp:sp modelId="{79E3F17D-5461-4BCB-9DC2-D9574FD49015}">
-      <dsp:nvSpPr>
-        <dsp:cNvPr id="0" name=""/>
-        <dsp:cNvSpPr/>
-      </dsp:nvSpPr>
-      <dsp:spPr>
-        <a:xfrm>
-          <a:off x="2058962" y="272267"/>
-          <a:ext cx="2284883" cy="913953"/>
-        </a:xfrm>
-        <a:prstGeom prst="chevron">
-          <a:avLst/>
-        </a:prstGeom>
-        <a:solidFill>
-          <a:schemeClr val="accent1">
-            <a:hueOff val="0"/>
-            <a:satOff val="0"/>
-            <a:lumOff val="0"/>
-            <a:alphaOff val="0"/>
-          </a:schemeClr>
-        </a:solidFill>
-        <a:ln w="12700" cap="flat" cmpd="sng" algn="ctr">
-          <a:solidFill>
-            <a:schemeClr val="lt1">
-              <a:hueOff val="0"/>
-              <a:satOff val="0"/>
-              <a:lumOff val="0"/>
-              <a:alphaOff val="0"/>
-            </a:schemeClr>
-          </a:solidFill>
-          <a:prstDash val="solid"/>
-          <a:miter lim="800000"/>
-        </a:ln>
-        <a:effectLst/>
-      </dsp:spPr>
-      <dsp:style>
-        <a:lnRef idx="2">
-          <a:scrgbClr r="0" g="0" b="0"/>
-        </a:lnRef>
-        <a:fillRef idx="1">
-          <a:scrgbClr r="0" g="0" b="0"/>
-        </a:fillRef>
-        <a:effectRef idx="0">
-          <a:scrgbClr r="0" g="0" b="0"/>
-        </a:effectRef>
-        <a:fontRef idx="minor">
-          <a:schemeClr val="lt1"/>
-        </a:fontRef>
-      </dsp:style>
-      <dsp:txBody>
-        <a:bodyPr spcFirstLastPara="0" vert="horz" wrap="square" lIns="72009" tIns="24003" rIns="24003" bIns="24003" numCol="1" spcCol="1270" anchor="ctr" anchorCtr="0">
-          <a:noAutofit/>
-        </a:bodyPr>
-        <a:lstStyle/>
-        <a:p>
-          <a:pPr lvl="0" algn="ctr" defTabSz="800100">
-            <a:lnSpc>
-              <a:spcPct val="90000"/>
-            </a:lnSpc>
-            <a:spcBef>
-              <a:spcPct val="0"/>
-            </a:spcBef>
-            <a:spcAft>
-              <a:spcPct val="35000"/>
-            </a:spcAft>
-          </a:pPr>
-          <a:r>
-            <a:rPr lang="en-US" sz="1800" kern="1200" dirty="0" err="1" smtClean="0"/>
-            <a:t>Cấp</a:t>
-          </a:r>
-          <a:r>
-            <a:rPr lang="en-US" sz="1800" kern="1200" dirty="0" smtClean="0"/>
-            <a:t> </a:t>
-          </a:r>
-          <a:r>
-            <a:rPr lang="en-US" sz="1800" kern="1200" dirty="0" err="1" smtClean="0"/>
-            <a:t>phát</a:t>
-          </a:r>
-          <a:r>
-            <a:rPr lang="en-US" sz="1800" kern="1200" dirty="0" smtClean="0"/>
-            <a:t> </a:t>
-          </a:r>
-          <a:r>
-            <a:rPr lang="en-US" sz="1800" kern="1200" dirty="0" err="1" smtClean="0"/>
-            <a:t>vùng</a:t>
-          </a:r>
-          <a:r>
-            <a:rPr lang="en-US" sz="1800" kern="1200" dirty="0" smtClean="0"/>
-            <a:t> </a:t>
-          </a:r>
-          <a:r>
-            <a:rPr lang="en-US" sz="1800" kern="1200" dirty="0" err="1" smtClean="0"/>
-            <a:t>nhớ</a:t>
-          </a:r>
-          <a:r>
-            <a:rPr lang="en-US" sz="1800" kern="1200" dirty="0" smtClean="0"/>
-            <a:t> </a:t>
-          </a:r>
-          <a:r>
-            <a:rPr lang="en-US" sz="1800" kern="1200" dirty="0" err="1" smtClean="0"/>
-            <a:t>lưu</a:t>
-          </a:r>
-          <a:r>
-            <a:rPr lang="en-US" sz="1800" kern="1200" dirty="0" smtClean="0"/>
-            <a:t> </a:t>
-          </a:r>
-          <a:r>
-            <a:rPr lang="en-US" sz="1800" kern="1200" dirty="0" err="1" smtClean="0"/>
-            <a:t>thông</a:t>
-          </a:r>
-          <a:r>
-            <a:rPr lang="en-US" sz="1800" kern="1200" dirty="0" smtClean="0"/>
-            <a:t> tin</a:t>
-          </a:r>
-          <a:endParaRPr lang="en-US" sz="1800" kern="1200" dirty="0"/>
-        </a:p>
-      </dsp:txBody>
-      <dsp:txXfrm>
-        <a:off x="2515939" y="272267"/>
-        <a:ext cx="1370930" cy="913953"/>
-      </dsp:txXfrm>
-    </dsp:sp>
-    <dsp:sp modelId="{342BFAB8-AD99-4644-A7A7-89BFBF6C1002}">
-      <dsp:nvSpPr>
-        <dsp:cNvPr id="0" name=""/>
-        <dsp:cNvSpPr/>
-      </dsp:nvSpPr>
-      <dsp:spPr>
-        <a:xfrm>
-          <a:off x="4115358" y="272267"/>
-          <a:ext cx="2284883" cy="913953"/>
-        </a:xfrm>
-        <a:prstGeom prst="chevron">
-          <a:avLst/>
-        </a:prstGeom>
-        <a:solidFill>
-          <a:schemeClr val="accent1">
-            <a:hueOff val="0"/>
-            <a:satOff val="0"/>
-            <a:lumOff val="0"/>
-            <a:alphaOff val="0"/>
-          </a:schemeClr>
-        </a:solidFill>
-        <a:ln w="12700" cap="flat" cmpd="sng" algn="ctr">
-          <a:solidFill>
-            <a:schemeClr val="lt1">
-              <a:hueOff val="0"/>
-              <a:satOff val="0"/>
-              <a:lumOff val="0"/>
-              <a:alphaOff val="0"/>
-            </a:schemeClr>
-          </a:solidFill>
-          <a:prstDash val="solid"/>
-          <a:miter lim="800000"/>
-        </a:ln>
-        <a:effectLst/>
-      </dsp:spPr>
-      <dsp:style>
-        <a:lnRef idx="2">
-          <a:scrgbClr r="0" g="0" b="0"/>
-        </a:lnRef>
-        <a:fillRef idx="1">
-          <a:scrgbClr r="0" g="0" b="0"/>
-        </a:fillRef>
-        <a:effectRef idx="0">
-          <a:scrgbClr r="0" g="0" b="0"/>
-        </a:effectRef>
-        <a:fontRef idx="minor">
-          <a:schemeClr val="lt1"/>
-        </a:fontRef>
-      </dsp:style>
-      <dsp:txBody>
-        <a:bodyPr spcFirstLastPara="0" vert="horz" wrap="square" lIns="72009" tIns="24003" rIns="24003" bIns="24003" numCol="1" spcCol="1270" anchor="ctr" anchorCtr="0">
-          <a:noAutofit/>
-        </a:bodyPr>
-        <a:lstStyle/>
-        <a:p>
-          <a:pPr lvl="0" algn="ctr" defTabSz="800100">
-            <a:lnSpc>
-              <a:spcPct val="90000"/>
-            </a:lnSpc>
-            <a:spcBef>
-              <a:spcPct val="0"/>
-            </a:spcBef>
-            <a:spcAft>
-              <a:spcPct val="35000"/>
-            </a:spcAft>
-          </a:pPr>
-          <a:r>
-            <a:rPr lang="en-US" sz="1800" kern="1200" dirty="0" err="1" smtClean="0"/>
-            <a:t>Làm</a:t>
-          </a:r>
-          <a:r>
-            <a:rPr lang="en-US" sz="1800" kern="1200" dirty="0" smtClean="0"/>
-            <a:t> </a:t>
-          </a:r>
-          <a:r>
-            <a:rPr lang="en-US" sz="1800" kern="1200" dirty="0" err="1" smtClean="0"/>
-            <a:t>tròn</a:t>
-          </a:r>
-          <a:r>
-            <a:rPr lang="en-US" sz="1800" kern="1200" dirty="0" smtClean="0"/>
-            <a:t> </a:t>
-          </a:r>
-          <a:r>
-            <a:rPr lang="en-US" sz="1800" kern="1200" dirty="0" err="1" smtClean="0"/>
-            <a:t>độ</a:t>
-          </a:r>
-          <a:r>
-            <a:rPr lang="en-US" sz="1800" kern="1200" dirty="0" smtClean="0"/>
-            <a:t> </a:t>
-          </a:r>
-          <a:r>
-            <a:rPr lang="en-US" sz="1800" kern="1200" dirty="0" err="1" smtClean="0"/>
-            <a:t>dài</a:t>
-          </a:r>
-          <a:r>
-            <a:rPr lang="en-US" sz="1800" kern="1200" dirty="0" smtClean="0"/>
-            <a:t> entry point</a:t>
-          </a:r>
-          <a:endParaRPr lang="en-US" sz="1800" kern="1200" dirty="0"/>
-        </a:p>
-      </dsp:txBody>
-      <dsp:txXfrm>
-        <a:off x="4572335" y="272267"/>
-        <a:ext cx="1370930" cy="913953"/>
-      </dsp:txXfrm>
-    </dsp:sp>
-    <dsp:sp modelId="{73C7F563-37A3-4CF6-9658-1DD4E98136F9}">
-      <dsp:nvSpPr>
-        <dsp:cNvPr id="0" name=""/>
-        <dsp:cNvSpPr/>
-      </dsp:nvSpPr>
-      <dsp:spPr>
-        <a:xfrm>
-          <a:off x="6171753" y="272267"/>
-          <a:ext cx="2284883" cy="913953"/>
-        </a:xfrm>
-        <a:prstGeom prst="chevron">
-          <a:avLst/>
-        </a:prstGeom>
-        <a:solidFill>
-          <a:schemeClr val="accent1">
-            <a:hueOff val="0"/>
-            <a:satOff val="0"/>
-            <a:lumOff val="0"/>
-            <a:alphaOff val="0"/>
-          </a:schemeClr>
-        </a:solidFill>
-        <a:ln w="12700" cap="flat" cmpd="sng" algn="ctr">
-          <a:solidFill>
-            <a:schemeClr val="lt1">
-              <a:hueOff val="0"/>
-              <a:satOff val="0"/>
-              <a:lumOff val="0"/>
-              <a:alphaOff val="0"/>
-            </a:schemeClr>
-          </a:solidFill>
-          <a:prstDash val="solid"/>
-          <a:miter lim="800000"/>
-        </a:ln>
-        <a:effectLst/>
-      </dsp:spPr>
-      <dsp:style>
-        <a:lnRef idx="2">
-          <a:scrgbClr r="0" g="0" b="0"/>
-        </a:lnRef>
-        <a:fillRef idx="1">
-          <a:scrgbClr r="0" g="0" b="0"/>
-        </a:fillRef>
-        <a:effectRef idx="0">
-          <a:scrgbClr r="0" g="0" b="0"/>
-        </a:effectRef>
-        <a:fontRef idx="minor">
-          <a:schemeClr val="lt1"/>
-        </a:fontRef>
-      </dsp:style>
-      <dsp:txBody>
-        <a:bodyPr spcFirstLastPara="0" vert="horz" wrap="square" lIns="72009" tIns="24003" rIns="24003" bIns="24003" numCol="1" spcCol="1270" anchor="ctr" anchorCtr="0">
-          <a:noAutofit/>
-        </a:bodyPr>
-        <a:lstStyle/>
-        <a:p>
-          <a:pPr lvl="0" algn="ctr" defTabSz="800100">
-            <a:lnSpc>
-              <a:spcPct val="90000"/>
-            </a:lnSpc>
-            <a:spcBef>
-              <a:spcPct val="0"/>
-            </a:spcBef>
-            <a:spcAft>
-              <a:spcPct val="35000"/>
-            </a:spcAft>
-          </a:pPr>
-          <a:r>
-            <a:rPr lang="en-US" sz="1800" kern="1200" dirty="0" err="1" smtClean="0"/>
-            <a:t>Lưu</a:t>
-          </a:r>
-          <a:r>
-            <a:rPr lang="en-US" sz="1800" kern="1200" dirty="0" smtClean="0"/>
-            <a:t> </a:t>
-          </a:r>
-          <a:r>
-            <a:rPr lang="en-US" sz="1800" kern="1200" dirty="0" err="1" smtClean="0"/>
-            <a:t>địa</a:t>
-          </a:r>
-          <a:r>
-            <a:rPr lang="en-US" sz="1800" kern="1200" dirty="0" smtClean="0"/>
-            <a:t> </a:t>
-          </a:r>
-          <a:r>
-            <a:rPr lang="en-US" sz="1800" kern="1200" dirty="0" err="1" smtClean="0"/>
-            <a:t>chỉ</a:t>
-          </a:r>
-          <a:r>
-            <a:rPr lang="en-US" sz="1800" kern="1200" dirty="0" smtClean="0"/>
-            <a:t> </a:t>
-          </a:r>
-          <a:r>
-            <a:rPr lang="en-US" sz="1800" kern="1200" dirty="0" err="1" smtClean="0"/>
-            <a:t>hàm</a:t>
-          </a:r>
-          <a:r>
-            <a:rPr lang="en-US" sz="1800" kern="1200" dirty="0" smtClean="0"/>
-            <a:t> </a:t>
-          </a:r>
-          <a:r>
-            <a:rPr lang="en-US" sz="1800" kern="1200" dirty="0" err="1" smtClean="0"/>
-            <a:t>gốc</a:t>
-          </a:r>
-          <a:endParaRPr lang="en-US" sz="1800" kern="1200" dirty="0"/>
-        </a:p>
-      </dsp:txBody>
-      <dsp:txXfrm>
-        <a:off x="6628730" y="272267"/>
-        <a:ext cx="1370930" cy="913953"/>
-      </dsp:txXfrm>
-    </dsp:sp>
-    <dsp:sp modelId="{90C7D633-37DA-4C45-B5A5-BFF7A0E0497C}">
-      <dsp:nvSpPr>
-        <dsp:cNvPr id="0" name=""/>
-        <dsp:cNvSpPr/>
-      </dsp:nvSpPr>
-      <dsp:spPr>
-        <a:xfrm>
-          <a:off x="8228148" y="272267"/>
-          <a:ext cx="2284883" cy="913953"/>
-        </a:xfrm>
-        <a:prstGeom prst="chevron">
-          <a:avLst/>
-        </a:prstGeom>
-        <a:solidFill>
-          <a:schemeClr val="accent1">
-            <a:hueOff val="0"/>
-            <a:satOff val="0"/>
-            <a:lumOff val="0"/>
-            <a:alphaOff val="0"/>
-          </a:schemeClr>
-        </a:solidFill>
-        <a:ln w="12700" cap="flat" cmpd="sng" algn="ctr">
-          <a:solidFill>
-            <a:schemeClr val="lt1">
-              <a:hueOff val="0"/>
-              <a:satOff val="0"/>
-              <a:lumOff val="0"/>
-              <a:alphaOff val="0"/>
-            </a:schemeClr>
-          </a:solidFill>
-          <a:prstDash val="solid"/>
-          <a:miter lim="800000"/>
-        </a:ln>
-        <a:effectLst/>
-      </dsp:spPr>
-      <dsp:style>
-        <a:lnRef idx="2">
-          <a:scrgbClr r="0" g="0" b="0"/>
-        </a:lnRef>
-        <a:fillRef idx="1">
-          <a:scrgbClr r="0" g="0" b="0"/>
-        </a:fillRef>
-        <a:effectRef idx="0">
-          <a:scrgbClr r="0" g="0" b="0"/>
-        </a:effectRef>
-        <a:fontRef idx="minor">
-          <a:schemeClr val="lt1"/>
-        </a:fontRef>
-      </dsp:style>
-      <dsp:txBody>
-        <a:bodyPr spcFirstLastPara="0" vert="horz" wrap="square" lIns="72009" tIns="24003" rIns="24003" bIns="24003" numCol="1" spcCol="1270" anchor="ctr" anchorCtr="0">
-          <a:noAutofit/>
-        </a:bodyPr>
-        <a:lstStyle/>
-        <a:p>
-          <a:pPr lvl="0" algn="ctr" defTabSz="800100">
-            <a:lnSpc>
-              <a:spcPct val="90000"/>
-            </a:lnSpc>
-            <a:spcBef>
-              <a:spcPct val="0"/>
-            </a:spcBef>
-            <a:spcAft>
-              <a:spcPct val="35000"/>
-            </a:spcAft>
-          </a:pPr>
-          <a:r>
-            <a:rPr lang="en-US" sz="1800" kern="1200" dirty="0" err="1" smtClean="0"/>
-            <a:t>Nhảy</a:t>
-          </a:r>
-          <a:r>
-            <a:rPr lang="en-US" sz="1800" kern="1200" dirty="0" smtClean="0"/>
-            <a:t> </a:t>
-          </a:r>
-          <a:r>
-            <a:rPr lang="en-US" sz="1800" kern="1200" dirty="0" err="1" smtClean="0"/>
-            <a:t>tới</a:t>
-          </a:r>
-          <a:r>
-            <a:rPr lang="en-US" sz="1800" kern="1200" dirty="0" smtClean="0"/>
-            <a:t> </a:t>
-          </a:r>
-          <a:r>
-            <a:rPr lang="en-US" sz="1800" kern="1200" dirty="0" err="1" smtClean="0"/>
-            <a:t>hàm</a:t>
-          </a:r>
-          <a:r>
-            <a:rPr lang="en-US" sz="1800" kern="1200" dirty="0" smtClean="0"/>
-            <a:t> hook</a:t>
-          </a:r>
-          <a:endParaRPr lang="en-US" sz="1800" kern="1200" dirty="0"/>
-        </a:p>
-      </dsp:txBody>
-      <dsp:txXfrm>
-        <a:off x="8685125" y="272267"/>
-        <a:ext cx="1370930" cy="913953"/>
-      </dsp:txXfrm>
-    </dsp:sp>
   </dsp:spTree>
 </dsp:drawing>
 </file>
@@ -6836,7 +6282,7 @@
           <a:p>
             <a:fld id="{16D2D749-03DE-4EC2-8C00-F102FCD2936A}" type="datetimeFigureOut">
               <a:rPr lang="en-US" smtClean="0"/>
-              <a:t>6/29/2015</a:t>
+              <a:t>6/30/2015</a:t>
             </a:fld>
             <a:endParaRPr lang="en-US"/>
           </a:p>
@@ -7006,7 +6452,7 @@
           <a:p>
             <a:fld id="{16D2D749-03DE-4EC2-8C00-F102FCD2936A}" type="datetimeFigureOut">
               <a:rPr lang="en-US" smtClean="0"/>
-              <a:t>6/29/2015</a:t>
+              <a:t>6/30/2015</a:t>
             </a:fld>
             <a:endParaRPr lang="en-US"/>
           </a:p>
@@ -7186,7 +6632,7 @@
           <a:p>
             <a:fld id="{16D2D749-03DE-4EC2-8C00-F102FCD2936A}" type="datetimeFigureOut">
               <a:rPr lang="en-US" smtClean="0"/>
-              <a:t>6/29/2015</a:t>
+              <a:t>6/30/2015</a:t>
             </a:fld>
             <a:endParaRPr lang="en-US"/>
           </a:p>
@@ -7356,7 +6802,7 @@
           <a:p>
             <a:fld id="{16D2D749-03DE-4EC2-8C00-F102FCD2936A}" type="datetimeFigureOut">
               <a:rPr lang="en-US" smtClean="0"/>
-              <a:t>6/29/2015</a:t>
+              <a:t>6/30/2015</a:t>
             </a:fld>
             <a:endParaRPr lang="en-US"/>
           </a:p>
@@ -7602,7 +7048,7 @@
           <a:p>
             <a:fld id="{16D2D749-03DE-4EC2-8C00-F102FCD2936A}" type="datetimeFigureOut">
               <a:rPr lang="en-US" smtClean="0"/>
-              <a:t>6/29/2015</a:t>
+              <a:t>6/30/2015</a:t>
             </a:fld>
             <a:endParaRPr lang="en-US"/>
           </a:p>
@@ -7834,7 +7280,7 @@
           <a:p>
             <a:fld id="{16D2D749-03DE-4EC2-8C00-F102FCD2936A}" type="datetimeFigureOut">
               <a:rPr lang="en-US" smtClean="0"/>
-              <a:t>6/29/2015</a:t>
+              <a:t>6/30/2015</a:t>
             </a:fld>
             <a:endParaRPr lang="en-US"/>
           </a:p>
@@ -8201,7 +7647,7 @@
           <a:p>
             <a:fld id="{16D2D749-03DE-4EC2-8C00-F102FCD2936A}" type="datetimeFigureOut">
               <a:rPr lang="en-US" smtClean="0"/>
-              <a:t>6/29/2015</a:t>
+              <a:t>6/30/2015</a:t>
             </a:fld>
             <a:endParaRPr lang="en-US"/>
           </a:p>
@@ -8319,7 +7765,7 @@
           <a:p>
             <a:fld id="{16D2D749-03DE-4EC2-8C00-F102FCD2936A}" type="datetimeFigureOut">
               <a:rPr lang="en-US" smtClean="0"/>
-              <a:t>6/29/2015</a:t>
+              <a:t>6/30/2015</a:t>
             </a:fld>
             <a:endParaRPr lang="en-US"/>
           </a:p>
@@ -8414,7 +7860,7 @@
           <a:p>
             <a:fld id="{16D2D749-03DE-4EC2-8C00-F102FCD2936A}" type="datetimeFigureOut">
               <a:rPr lang="en-US" smtClean="0"/>
-              <a:t>6/29/2015</a:t>
+              <a:t>6/30/2015</a:t>
             </a:fld>
             <a:endParaRPr lang="en-US"/>
           </a:p>
@@ -8691,7 +8137,7 @@
           <a:p>
             <a:fld id="{16D2D749-03DE-4EC2-8C00-F102FCD2936A}" type="datetimeFigureOut">
               <a:rPr lang="en-US" smtClean="0"/>
-              <a:t>6/29/2015</a:t>
+              <a:t>6/30/2015</a:t>
             </a:fld>
             <a:endParaRPr lang="en-US"/>
           </a:p>
@@ -8944,7 +8390,7 @@
           <a:p>
             <a:fld id="{16D2D749-03DE-4EC2-8C00-F102FCD2936A}" type="datetimeFigureOut">
               <a:rPr lang="en-US" smtClean="0"/>
-              <a:t>6/29/2015</a:t>
+              <a:t>6/30/2015</a:t>
             </a:fld>
             <a:endParaRPr lang="en-US"/>
           </a:p>
@@ -9157,7 +8603,7 @@
           <a:p>
             <a:fld id="{16D2D749-03DE-4EC2-8C00-F102FCD2936A}" type="datetimeFigureOut">
               <a:rPr lang="en-US" smtClean="0"/>
-              <a:t>6/29/2015</a:t>
+              <a:t>6/30/2015</a:t>
             </a:fld>
             <a:endParaRPr lang="en-US"/>
           </a:p>
@@ -9650,6 +9096,1252 @@
       </p:par>
     </p:tnLst>
   </p:timing>
+</p:sld>
+</file>
+
+<file path=ppt/slides/slide10.xml><?xml version="1.0" encoding="utf-8"?>
+<p:sld xmlns:a="http://schemas.openxmlformats.org/drawingml/2006/main" xmlns:r="http://schemas.openxmlformats.org/officeDocument/2006/relationships" xmlns:p="http://schemas.openxmlformats.org/presentationml/2006/main">
+  <p:cSld>
+    <p:spTree>
+      <p:nvGrpSpPr>
+        <p:cNvPr id="1" name=""/>
+        <p:cNvGrpSpPr/>
+        <p:nvPr/>
+      </p:nvGrpSpPr>
+      <p:grpSpPr>
+        <a:xfrm>
+          <a:off x="0" y="0"/>
+          <a:ext cx="0" cy="0"/>
+          <a:chOff x="0" y="0"/>
+          <a:chExt cx="0" cy="0"/>
+        </a:xfrm>
+      </p:grpSpPr>
+      <p:sp>
+        <p:nvSpPr>
+          <p:cNvPr id="4" name="TextBox 3"/>
+          <p:cNvSpPr txBox="1"/>
+          <p:nvPr/>
+        </p:nvSpPr>
+        <p:spPr>
+          <a:xfrm>
+            <a:off x="753979" y="5807242"/>
+            <a:ext cx="1168910" cy="646331"/>
+          </a:xfrm>
+          <a:prstGeom prst="rect">
+            <a:avLst/>
+          </a:prstGeom>
+          <a:noFill/>
+        </p:spPr>
+        <p:txBody>
+          <a:bodyPr wrap="none" rtlCol="0">
+            <a:spAutoFit/>
+          </a:bodyPr>
+          <a:lstStyle/>
+          <a:p>
+            <a:r>
+              <a:rPr lang="en-US" sz="3600" dirty="0" smtClean="0"/>
+              <a:t>Hook</a:t>
+            </a:r>
+          </a:p>
+        </p:txBody>
+      </p:sp>
+      <p:sp>
+        <p:nvSpPr>
+          <p:cNvPr id="5" name="Rounded Rectangle 4"/>
+          <p:cNvSpPr/>
+          <p:nvPr/>
+        </p:nvSpPr>
+        <p:spPr>
+          <a:xfrm>
+            <a:off x="2759242" y="1026695"/>
+            <a:ext cx="6769769" cy="3641558"/>
+          </a:xfrm>
+          <a:prstGeom prst="roundRect">
+            <a:avLst/>
+          </a:prstGeom>
+          <a:solidFill>
+            <a:srgbClr val="E9EDEC"/>
+          </a:solidFill>
+        </p:spPr>
+        <p:style>
+          <a:lnRef idx="2">
+            <a:schemeClr val="accent1">
+              <a:shade val="50000"/>
+            </a:schemeClr>
+          </a:lnRef>
+          <a:fillRef idx="1">
+            <a:schemeClr val="accent1"/>
+          </a:fillRef>
+          <a:effectRef idx="0">
+            <a:schemeClr val="accent1"/>
+          </a:effectRef>
+          <a:fontRef idx="minor">
+            <a:schemeClr val="lt1"/>
+          </a:fontRef>
+        </p:style>
+        <p:txBody>
+          <a:bodyPr rtlCol="0" anchor="ctr"/>
+          <a:lstStyle/>
+          <a:p>
+            <a:pPr algn="ctr"/>
+            <a:endParaRPr lang="en-US" dirty="0"/>
+          </a:p>
+        </p:txBody>
+      </p:sp>
+      <p:sp>
+        <p:nvSpPr>
+          <p:cNvPr id="6" name="Rounded Rectangle 5"/>
+          <p:cNvSpPr/>
+          <p:nvPr/>
+        </p:nvSpPr>
+        <p:spPr>
+          <a:xfrm>
+            <a:off x="3031958" y="2967790"/>
+            <a:ext cx="2406316" cy="930442"/>
+          </a:xfrm>
+          <a:prstGeom prst="roundRect">
+            <a:avLst/>
+          </a:prstGeom>
+          <a:gradFill flip="none" rotWithShape="1">
+            <a:gsLst>
+              <a:gs pos="0">
+                <a:schemeClr val="accent1">
+                  <a:lumMod val="0"/>
+                  <a:lumOff val="100000"/>
+                </a:schemeClr>
+              </a:gs>
+              <a:gs pos="29000">
+                <a:schemeClr val="accent1">
+                  <a:lumMod val="0"/>
+                  <a:lumOff val="100000"/>
+                </a:schemeClr>
+              </a:gs>
+              <a:gs pos="100000">
+                <a:schemeClr val="accent1">
+                  <a:lumMod val="100000"/>
+                </a:schemeClr>
+              </a:gs>
+            </a:gsLst>
+            <a:path path="circle">
+              <a:fillToRect l="50000" t="-80000" r="50000" b="180000"/>
+            </a:path>
+            <a:tileRect/>
+          </a:gradFill>
+        </p:spPr>
+        <p:style>
+          <a:lnRef idx="2">
+            <a:schemeClr val="accent1">
+              <a:shade val="50000"/>
+            </a:schemeClr>
+          </a:lnRef>
+          <a:fillRef idx="1">
+            <a:schemeClr val="accent1"/>
+          </a:fillRef>
+          <a:effectRef idx="0">
+            <a:schemeClr val="accent1"/>
+          </a:effectRef>
+          <a:fontRef idx="minor">
+            <a:schemeClr val="lt1"/>
+          </a:fontRef>
+        </p:style>
+        <p:txBody>
+          <a:bodyPr rtlCol="0" anchor="ctr"/>
+          <a:lstStyle/>
+          <a:p>
+            <a:pPr algn="ctr"/>
+            <a:r>
+              <a:rPr lang="en-US" sz="2800" b="1" dirty="0" smtClean="0">
+                <a:solidFill>
+                  <a:schemeClr val="tx1"/>
+                </a:solidFill>
+              </a:rPr>
+              <a:t>Inject DLL</a:t>
+            </a:r>
+            <a:endParaRPr lang="en-US" sz="2800" b="1" dirty="0">
+              <a:solidFill>
+                <a:schemeClr val="tx1"/>
+              </a:solidFill>
+            </a:endParaRPr>
+          </a:p>
+        </p:txBody>
+      </p:sp>
+      <p:sp>
+        <p:nvSpPr>
+          <p:cNvPr id="7" name="Rounded Rectangle 6"/>
+          <p:cNvSpPr/>
+          <p:nvPr/>
+        </p:nvSpPr>
+        <p:spPr>
+          <a:xfrm>
+            <a:off x="6849980" y="2967790"/>
+            <a:ext cx="2406316" cy="930442"/>
+          </a:xfrm>
+          <a:prstGeom prst="roundRect">
+            <a:avLst/>
+          </a:prstGeom>
+          <a:gradFill flip="none" rotWithShape="1">
+            <a:gsLst>
+              <a:gs pos="0">
+                <a:schemeClr val="accent1">
+                  <a:lumMod val="0"/>
+                  <a:lumOff val="100000"/>
+                </a:schemeClr>
+              </a:gs>
+              <a:gs pos="29000">
+                <a:schemeClr val="accent1">
+                  <a:lumMod val="0"/>
+                  <a:lumOff val="100000"/>
+                </a:schemeClr>
+              </a:gs>
+              <a:gs pos="100000">
+                <a:schemeClr val="accent1">
+                  <a:lumMod val="100000"/>
+                </a:schemeClr>
+              </a:gs>
+            </a:gsLst>
+            <a:path path="circle">
+              <a:fillToRect l="50000" t="-80000" r="50000" b="180000"/>
+            </a:path>
+            <a:tileRect/>
+          </a:gradFill>
+        </p:spPr>
+        <p:style>
+          <a:lnRef idx="2">
+            <a:schemeClr val="accent1">
+              <a:shade val="50000"/>
+            </a:schemeClr>
+          </a:lnRef>
+          <a:fillRef idx="1">
+            <a:schemeClr val="accent1"/>
+          </a:fillRef>
+          <a:effectRef idx="0">
+            <a:schemeClr val="accent1"/>
+          </a:effectRef>
+          <a:fontRef idx="minor">
+            <a:schemeClr val="lt1"/>
+          </a:fontRef>
+        </p:style>
+        <p:txBody>
+          <a:bodyPr rtlCol="0" anchor="ctr"/>
+          <a:lstStyle/>
+          <a:p>
+            <a:pPr algn="ctr"/>
+            <a:r>
+              <a:rPr lang="en-US" sz="2800" dirty="0" smtClean="0">
+                <a:solidFill>
+                  <a:schemeClr val="tx1"/>
+                </a:solidFill>
+              </a:rPr>
+              <a:t>Intercept API</a:t>
+            </a:r>
+            <a:endParaRPr lang="en-US" sz="2800" dirty="0">
+              <a:solidFill>
+                <a:schemeClr val="tx1"/>
+              </a:solidFill>
+            </a:endParaRPr>
+          </a:p>
+        </p:txBody>
+      </p:sp>
+      <p:sp>
+        <p:nvSpPr>
+          <p:cNvPr id="8" name="TextBox 7"/>
+          <p:cNvSpPr txBox="1"/>
+          <p:nvPr/>
+        </p:nvSpPr>
+        <p:spPr>
+          <a:xfrm>
+            <a:off x="4918470" y="1299410"/>
+            <a:ext cx="2504212" cy="584775"/>
+          </a:xfrm>
+          <a:prstGeom prst="rect">
+            <a:avLst/>
+          </a:prstGeom>
+          <a:noFill/>
+        </p:spPr>
+        <p:txBody>
+          <a:bodyPr wrap="none" rtlCol="0">
+            <a:spAutoFit/>
+          </a:bodyPr>
+          <a:lstStyle/>
+          <a:p>
+            <a:r>
+              <a:rPr lang="en-US" sz="3200" b="1" dirty="0" smtClean="0">
+                <a:solidFill>
+                  <a:schemeClr val="accent2">
+                    <a:lumMod val="75000"/>
+                  </a:schemeClr>
+                </a:solidFill>
+              </a:rPr>
+              <a:t>Hook Module</a:t>
+            </a:r>
+            <a:endParaRPr lang="en-US" sz="3200" b="1" dirty="0">
+              <a:solidFill>
+                <a:schemeClr val="accent2">
+                  <a:lumMod val="75000"/>
+                </a:schemeClr>
+              </a:solidFill>
+            </a:endParaRPr>
+          </a:p>
+        </p:txBody>
+      </p:sp>
+      <p:cxnSp>
+        <p:nvCxnSpPr>
+          <p:cNvPr id="10" name="Straight Arrow Connector 9"/>
+          <p:cNvCxnSpPr>
+            <a:stCxn id="6" idx="3"/>
+            <a:endCxn id="7" idx="1"/>
+          </p:cNvCxnSpPr>
+          <p:nvPr/>
+        </p:nvCxnSpPr>
+        <p:spPr>
+          <a:xfrm>
+            <a:off x="5438274" y="3433011"/>
+            <a:ext cx="1411706" cy="0"/>
+          </a:xfrm>
+          <a:prstGeom prst="straightConnector1">
+            <a:avLst/>
+          </a:prstGeom>
+          <a:ln w="76200">
+            <a:tailEnd type="triangle"/>
+          </a:ln>
+        </p:spPr>
+        <p:style>
+          <a:lnRef idx="1">
+            <a:schemeClr val="accent1"/>
+          </a:lnRef>
+          <a:fillRef idx="0">
+            <a:schemeClr val="accent1"/>
+          </a:fillRef>
+          <a:effectRef idx="0">
+            <a:schemeClr val="accent1"/>
+          </a:effectRef>
+          <a:fontRef idx="minor">
+            <a:schemeClr val="tx1"/>
+          </a:fontRef>
+        </p:style>
+      </p:cxnSp>
+    </p:spTree>
+    <p:extLst>
+      <p:ext uri="{BB962C8B-B14F-4D97-AF65-F5344CB8AC3E}">
+        <p14:creationId xmlns:p14="http://schemas.microsoft.com/office/powerpoint/2010/main" val="2551322343"/>
+      </p:ext>
+    </p:extLst>
+  </p:cSld>
+  <p:clrMapOvr>
+    <a:masterClrMapping/>
+  </p:clrMapOvr>
+</p:sld>
+</file>
+
+<file path=ppt/slides/slide11.xml><?xml version="1.0" encoding="utf-8"?>
+<p:sld xmlns:a="http://schemas.openxmlformats.org/drawingml/2006/main" xmlns:r="http://schemas.openxmlformats.org/officeDocument/2006/relationships" xmlns:p="http://schemas.openxmlformats.org/presentationml/2006/main">
+  <p:cSld>
+    <p:spTree>
+      <p:nvGrpSpPr>
+        <p:cNvPr id="1" name=""/>
+        <p:cNvGrpSpPr/>
+        <p:nvPr/>
+      </p:nvGrpSpPr>
+      <p:grpSpPr>
+        <a:xfrm>
+          <a:off x="0" y="0"/>
+          <a:ext cx="0" cy="0"/>
+          <a:chOff x="0" y="0"/>
+          <a:chExt cx="0" cy="0"/>
+        </a:xfrm>
+      </p:grpSpPr>
+      <p:sp>
+        <p:nvSpPr>
+          <p:cNvPr id="4" name="TextBox 3"/>
+          <p:cNvSpPr txBox="1"/>
+          <p:nvPr/>
+        </p:nvSpPr>
+        <p:spPr>
+          <a:xfrm>
+            <a:off x="696685" y="6037943"/>
+            <a:ext cx="2229521" cy="584775"/>
+          </a:xfrm>
+          <a:prstGeom prst="rect">
+            <a:avLst/>
+          </a:prstGeom>
+          <a:noFill/>
+        </p:spPr>
+        <p:txBody>
+          <a:bodyPr wrap="none" rtlCol="0">
+            <a:spAutoFit/>
+          </a:bodyPr>
+          <a:lstStyle/>
+          <a:p>
+            <a:r>
+              <a:rPr lang="en-US" sz="3200" dirty="0" smtClean="0"/>
+              <a:t>Protect data</a:t>
+            </a:r>
+            <a:endParaRPr lang="en-US" sz="3200" dirty="0"/>
+          </a:p>
+        </p:txBody>
+      </p:sp>
+      <p:sp>
+        <p:nvSpPr>
+          <p:cNvPr id="5" name="Rounded Rectangle 4"/>
+          <p:cNvSpPr/>
+          <p:nvPr/>
+        </p:nvSpPr>
+        <p:spPr>
+          <a:xfrm>
+            <a:off x="2614099" y="1182533"/>
+            <a:ext cx="6769769" cy="4372619"/>
+          </a:xfrm>
+          <a:prstGeom prst="roundRect">
+            <a:avLst/>
+          </a:prstGeom>
+          <a:solidFill>
+            <a:srgbClr val="E9EDEC"/>
+          </a:solidFill>
+        </p:spPr>
+        <p:style>
+          <a:lnRef idx="2">
+            <a:schemeClr val="accent1">
+              <a:shade val="50000"/>
+            </a:schemeClr>
+          </a:lnRef>
+          <a:fillRef idx="1">
+            <a:schemeClr val="accent1"/>
+          </a:fillRef>
+          <a:effectRef idx="0">
+            <a:schemeClr val="accent1"/>
+          </a:effectRef>
+          <a:fontRef idx="minor">
+            <a:schemeClr val="lt1"/>
+          </a:fontRef>
+        </p:style>
+        <p:txBody>
+          <a:bodyPr rtlCol="0" anchor="ctr"/>
+          <a:lstStyle/>
+          <a:p>
+            <a:pPr algn="ctr"/>
+            <a:endParaRPr lang="en-US" dirty="0"/>
+          </a:p>
+        </p:txBody>
+      </p:sp>
+      <p:sp>
+        <p:nvSpPr>
+          <p:cNvPr id="6" name="Rounded Rectangle 5"/>
+          <p:cNvSpPr/>
+          <p:nvPr/>
+        </p:nvSpPr>
+        <p:spPr>
+          <a:xfrm>
+            <a:off x="3210331" y="4159488"/>
+            <a:ext cx="2406316" cy="930442"/>
+          </a:xfrm>
+          <a:prstGeom prst="roundRect">
+            <a:avLst/>
+          </a:prstGeom>
+          <a:gradFill flip="none" rotWithShape="1">
+            <a:gsLst>
+              <a:gs pos="0">
+                <a:schemeClr val="accent1">
+                  <a:lumMod val="0"/>
+                  <a:lumOff val="100000"/>
+                </a:schemeClr>
+              </a:gs>
+              <a:gs pos="29000">
+                <a:schemeClr val="accent1">
+                  <a:lumMod val="0"/>
+                  <a:lumOff val="100000"/>
+                </a:schemeClr>
+              </a:gs>
+              <a:gs pos="100000">
+                <a:schemeClr val="accent1">
+                  <a:lumMod val="100000"/>
+                </a:schemeClr>
+              </a:gs>
+            </a:gsLst>
+            <a:path path="circle">
+              <a:fillToRect l="50000" t="-80000" r="50000" b="180000"/>
+            </a:path>
+            <a:tileRect/>
+          </a:gradFill>
+        </p:spPr>
+        <p:style>
+          <a:lnRef idx="2">
+            <a:schemeClr val="accent1">
+              <a:shade val="50000"/>
+            </a:schemeClr>
+          </a:lnRef>
+          <a:fillRef idx="1">
+            <a:schemeClr val="accent1"/>
+          </a:fillRef>
+          <a:effectRef idx="0">
+            <a:schemeClr val="accent1"/>
+          </a:effectRef>
+          <a:fontRef idx="minor">
+            <a:schemeClr val="lt1"/>
+          </a:fontRef>
+        </p:style>
+        <p:txBody>
+          <a:bodyPr rtlCol="0" anchor="ctr"/>
+          <a:lstStyle/>
+          <a:p>
+            <a:pPr algn="ctr"/>
+            <a:r>
+              <a:rPr lang="en-US" sz="2800" b="1" dirty="0" smtClean="0">
+                <a:solidFill>
+                  <a:schemeClr val="tx1"/>
+                </a:solidFill>
+              </a:rPr>
+              <a:t>Key Engine</a:t>
+            </a:r>
+            <a:endParaRPr lang="en-US" sz="2800" b="1" dirty="0">
+              <a:solidFill>
+                <a:schemeClr val="tx1"/>
+              </a:solidFill>
+            </a:endParaRPr>
+          </a:p>
+        </p:txBody>
+      </p:sp>
+      <p:sp>
+        <p:nvSpPr>
+          <p:cNvPr id="7" name="Rounded Rectangle 6"/>
+          <p:cNvSpPr/>
+          <p:nvPr/>
+        </p:nvSpPr>
+        <p:spPr>
+          <a:xfrm>
+            <a:off x="3210331" y="2789226"/>
+            <a:ext cx="2406316" cy="930442"/>
+          </a:xfrm>
+          <a:prstGeom prst="roundRect">
+            <a:avLst/>
+          </a:prstGeom>
+          <a:gradFill flip="none" rotWithShape="1">
+            <a:gsLst>
+              <a:gs pos="0">
+                <a:schemeClr val="accent1">
+                  <a:lumMod val="0"/>
+                  <a:lumOff val="100000"/>
+                </a:schemeClr>
+              </a:gs>
+              <a:gs pos="29000">
+                <a:schemeClr val="accent1">
+                  <a:lumMod val="0"/>
+                  <a:lumOff val="100000"/>
+                </a:schemeClr>
+              </a:gs>
+              <a:gs pos="100000">
+                <a:schemeClr val="accent1">
+                  <a:lumMod val="100000"/>
+                </a:schemeClr>
+              </a:gs>
+            </a:gsLst>
+            <a:path path="circle">
+              <a:fillToRect l="50000" t="-80000" r="50000" b="180000"/>
+            </a:path>
+            <a:tileRect/>
+          </a:gradFill>
+        </p:spPr>
+        <p:style>
+          <a:lnRef idx="2">
+            <a:schemeClr val="accent1">
+              <a:shade val="50000"/>
+            </a:schemeClr>
+          </a:lnRef>
+          <a:fillRef idx="1">
+            <a:schemeClr val="accent1"/>
+          </a:fillRef>
+          <a:effectRef idx="0">
+            <a:schemeClr val="accent1"/>
+          </a:effectRef>
+          <a:fontRef idx="minor">
+            <a:schemeClr val="lt1"/>
+          </a:fontRef>
+        </p:style>
+        <p:txBody>
+          <a:bodyPr rtlCol="0" anchor="ctr"/>
+          <a:lstStyle/>
+          <a:p>
+            <a:pPr algn="ctr"/>
+            <a:r>
+              <a:rPr lang="en-US" sz="2800" b="1" dirty="0" smtClean="0">
+                <a:solidFill>
+                  <a:schemeClr val="tx1"/>
+                </a:solidFill>
+              </a:rPr>
+              <a:t>Metadata</a:t>
+            </a:r>
+            <a:endParaRPr lang="en-US" sz="2800" b="1" dirty="0">
+              <a:solidFill>
+                <a:schemeClr val="tx1"/>
+              </a:solidFill>
+            </a:endParaRPr>
+          </a:p>
+        </p:txBody>
+      </p:sp>
+      <p:sp>
+        <p:nvSpPr>
+          <p:cNvPr id="9" name="Rounded Rectangle 8"/>
+          <p:cNvSpPr/>
+          <p:nvPr/>
+        </p:nvSpPr>
+        <p:spPr>
+          <a:xfrm>
+            <a:off x="6297099" y="2789226"/>
+            <a:ext cx="2406316" cy="930442"/>
+          </a:xfrm>
+          <a:prstGeom prst="roundRect">
+            <a:avLst/>
+          </a:prstGeom>
+          <a:gradFill flip="none" rotWithShape="1">
+            <a:gsLst>
+              <a:gs pos="0">
+                <a:schemeClr val="accent1">
+                  <a:lumMod val="0"/>
+                  <a:lumOff val="100000"/>
+                </a:schemeClr>
+              </a:gs>
+              <a:gs pos="29000">
+                <a:schemeClr val="accent1">
+                  <a:lumMod val="0"/>
+                  <a:lumOff val="100000"/>
+                </a:schemeClr>
+              </a:gs>
+              <a:gs pos="100000">
+                <a:schemeClr val="accent1">
+                  <a:lumMod val="100000"/>
+                </a:schemeClr>
+              </a:gs>
+            </a:gsLst>
+            <a:path path="circle">
+              <a:fillToRect l="50000" t="-80000" r="50000" b="180000"/>
+            </a:path>
+            <a:tileRect/>
+          </a:gradFill>
+        </p:spPr>
+        <p:style>
+          <a:lnRef idx="2">
+            <a:schemeClr val="accent1">
+              <a:shade val="50000"/>
+            </a:schemeClr>
+          </a:lnRef>
+          <a:fillRef idx="1">
+            <a:schemeClr val="accent1"/>
+          </a:fillRef>
+          <a:effectRef idx="0">
+            <a:schemeClr val="accent1"/>
+          </a:effectRef>
+          <a:fontRef idx="minor">
+            <a:schemeClr val="lt1"/>
+          </a:fontRef>
+        </p:style>
+        <p:txBody>
+          <a:bodyPr rtlCol="0" anchor="ctr"/>
+          <a:lstStyle/>
+          <a:p>
+            <a:pPr algn="ctr"/>
+            <a:r>
+              <a:rPr lang="en-US" sz="2800" b="1" dirty="0" smtClean="0">
+                <a:solidFill>
+                  <a:schemeClr val="tx1"/>
+                </a:solidFill>
+              </a:rPr>
+              <a:t>Crypto Engine</a:t>
+            </a:r>
+            <a:endParaRPr lang="en-US" sz="2800" b="1" dirty="0">
+              <a:solidFill>
+                <a:schemeClr val="tx1"/>
+              </a:solidFill>
+            </a:endParaRPr>
+          </a:p>
+        </p:txBody>
+      </p:sp>
+      <p:sp>
+        <p:nvSpPr>
+          <p:cNvPr id="10" name="TextBox 9"/>
+          <p:cNvSpPr txBox="1"/>
+          <p:nvPr/>
+        </p:nvSpPr>
+        <p:spPr>
+          <a:xfrm>
+            <a:off x="4842352" y="1299410"/>
+            <a:ext cx="2313262" cy="584775"/>
+          </a:xfrm>
+          <a:prstGeom prst="rect">
+            <a:avLst/>
+          </a:prstGeom>
+          <a:noFill/>
+        </p:spPr>
+        <p:txBody>
+          <a:bodyPr wrap="none" rtlCol="0">
+            <a:spAutoFit/>
+          </a:bodyPr>
+          <a:lstStyle/>
+          <a:p>
+            <a:r>
+              <a:rPr lang="en-US" sz="3200" b="1" dirty="0" smtClean="0">
+                <a:solidFill>
+                  <a:schemeClr val="accent2">
+                    <a:lumMod val="75000"/>
+                  </a:schemeClr>
+                </a:solidFill>
+              </a:rPr>
+              <a:t>Protect Data</a:t>
+            </a:r>
+            <a:endParaRPr lang="en-US" sz="3200" b="1" dirty="0">
+              <a:solidFill>
+                <a:schemeClr val="accent2">
+                  <a:lumMod val="75000"/>
+                </a:schemeClr>
+              </a:solidFill>
+            </a:endParaRPr>
+          </a:p>
+        </p:txBody>
+      </p:sp>
+    </p:spTree>
+    <p:extLst>
+      <p:ext uri="{BB962C8B-B14F-4D97-AF65-F5344CB8AC3E}">
+        <p14:creationId xmlns:p14="http://schemas.microsoft.com/office/powerpoint/2010/main" val="163544976"/>
+      </p:ext>
+    </p:extLst>
+  </p:cSld>
+  <p:clrMapOvr>
+    <a:masterClrMapping/>
+  </p:clrMapOvr>
+</p:sld>
+</file>
+
+<file path=ppt/slides/slide12.xml><?xml version="1.0" encoding="utf-8"?>
+<p:sld xmlns:a="http://schemas.openxmlformats.org/drawingml/2006/main" xmlns:r="http://schemas.openxmlformats.org/officeDocument/2006/relationships" xmlns:p="http://schemas.openxmlformats.org/presentationml/2006/main">
+  <p:cSld>
+    <p:spTree>
+      <p:nvGrpSpPr>
+        <p:cNvPr id="1" name=""/>
+        <p:cNvGrpSpPr/>
+        <p:nvPr/>
+      </p:nvGrpSpPr>
+      <p:grpSpPr>
+        <a:xfrm>
+          <a:off x="0" y="0"/>
+          <a:ext cx="0" cy="0"/>
+          <a:chOff x="0" y="0"/>
+          <a:chExt cx="0" cy="0"/>
+        </a:xfrm>
+      </p:grpSpPr>
+      <p:sp>
+        <p:nvSpPr>
+          <p:cNvPr id="4" name="TextBox 3"/>
+          <p:cNvSpPr txBox="1"/>
+          <p:nvPr/>
+        </p:nvSpPr>
+        <p:spPr>
+          <a:xfrm>
+            <a:off x="625642" y="6144126"/>
+            <a:ext cx="2534476" cy="584775"/>
+          </a:xfrm>
+          <a:prstGeom prst="rect">
+            <a:avLst/>
+          </a:prstGeom>
+          <a:noFill/>
+        </p:spPr>
+        <p:txBody>
+          <a:bodyPr wrap="none" rtlCol="0">
+            <a:spAutoFit/>
+          </a:bodyPr>
+          <a:lstStyle/>
+          <a:p>
+            <a:r>
+              <a:rPr lang="en-US" sz="3200" dirty="0" smtClean="0"/>
+              <a:t>User Interface</a:t>
+            </a:r>
+            <a:endParaRPr lang="en-US" sz="3200" dirty="0"/>
+          </a:p>
+        </p:txBody>
+      </p:sp>
+      <p:sp>
+        <p:nvSpPr>
+          <p:cNvPr id="5" name="Rounded Rectangle 4"/>
+          <p:cNvSpPr/>
+          <p:nvPr/>
+        </p:nvSpPr>
+        <p:spPr>
+          <a:xfrm>
+            <a:off x="2727159" y="834190"/>
+            <a:ext cx="7026441" cy="3801978"/>
+          </a:xfrm>
+          <a:prstGeom prst="roundRect">
+            <a:avLst/>
+          </a:prstGeom>
+          <a:solidFill>
+            <a:srgbClr val="E9EDEC"/>
+          </a:solidFill>
+        </p:spPr>
+        <p:style>
+          <a:lnRef idx="2">
+            <a:schemeClr val="accent1">
+              <a:shade val="50000"/>
+            </a:schemeClr>
+          </a:lnRef>
+          <a:fillRef idx="1">
+            <a:schemeClr val="accent1"/>
+          </a:fillRef>
+          <a:effectRef idx="0">
+            <a:schemeClr val="accent1"/>
+          </a:effectRef>
+          <a:fontRef idx="minor">
+            <a:schemeClr val="lt1"/>
+          </a:fontRef>
+        </p:style>
+        <p:txBody>
+          <a:bodyPr rtlCol="0" anchor="ctr"/>
+          <a:lstStyle/>
+          <a:p>
+            <a:pPr algn="ctr"/>
+            <a:endParaRPr lang="en-US"/>
+          </a:p>
+        </p:txBody>
+      </p:sp>
+      <p:sp>
+        <p:nvSpPr>
+          <p:cNvPr id="6" name="Rounded Rectangle 5"/>
+          <p:cNvSpPr/>
+          <p:nvPr/>
+        </p:nvSpPr>
+        <p:spPr>
+          <a:xfrm>
+            <a:off x="3367840" y="3384883"/>
+            <a:ext cx="2518612" cy="737937"/>
+          </a:xfrm>
+          <a:prstGeom prst="roundRect">
+            <a:avLst/>
+          </a:prstGeom>
+          <a:gradFill flip="none" rotWithShape="1">
+            <a:gsLst>
+              <a:gs pos="0">
+                <a:schemeClr val="accent1">
+                  <a:lumMod val="20000"/>
+                  <a:lumOff val="80000"/>
+                </a:schemeClr>
+              </a:gs>
+              <a:gs pos="73000">
+                <a:schemeClr val="accent1">
+                  <a:lumMod val="40000"/>
+                  <a:lumOff val="60000"/>
+                </a:schemeClr>
+              </a:gs>
+              <a:gs pos="100000">
+                <a:schemeClr val="accent1"/>
+              </a:gs>
+            </a:gsLst>
+            <a:lin ang="5400000" scaled="1"/>
+            <a:tileRect/>
+          </a:gradFill>
+        </p:spPr>
+        <p:style>
+          <a:lnRef idx="2">
+            <a:schemeClr val="accent1">
+              <a:shade val="50000"/>
+            </a:schemeClr>
+          </a:lnRef>
+          <a:fillRef idx="1">
+            <a:schemeClr val="accent1"/>
+          </a:fillRef>
+          <a:effectRef idx="0">
+            <a:schemeClr val="accent1"/>
+          </a:effectRef>
+          <a:fontRef idx="minor">
+            <a:schemeClr val="lt1"/>
+          </a:fontRef>
+        </p:style>
+        <p:txBody>
+          <a:bodyPr rtlCol="0" anchor="ctr"/>
+          <a:lstStyle/>
+          <a:p>
+            <a:pPr algn="ctr"/>
+            <a:r>
+              <a:rPr lang="en-US" sz="2800" b="1" dirty="0" smtClean="0">
+                <a:solidFill>
+                  <a:schemeClr val="tx1"/>
+                </a:solidFill>
+              </a:rPr>
+              <a:t>System Stray</a:t>
+            </a:r>
+            <a:endParaRPr lang="en-US" sz="2800" b="1" dirty="0">
+              <a:solidFill>
+                <a:schemeClr val="tx1"/>
+              </a:solidFill>
+            </a:endParaRPr>
+          </a:p>
+        </p:txBody>
+      </p:sp>
+      <p:sp>
+        <p:nvSpPr>
+          <p:cNvPr id="8" name="Rounded Rectangle 7"/>
+          <p:cNvSpPr/>
+          <p:nvPr/>
+        </p:nvSpPr>
+        <p:spPr>
+          <a:xfrm>
+            <a:off x="6544678" y="3384882"/>
+            <a:ext cx="2518612" cy="737937"/>
+          </a:xfrm>
+          <a:prstGeom prst="roundRect">
+            <a:avLst/>
+          </a:prstGeom>
+          <a:gradFill flip="none" rotWithShape="1">
+            <a:gsLst>
+              <a:gs pos="0">
+                <a:schemeClr val="accent1">
+                  <a:lumMod val="20000"/>
+                  <a:lumOff val="80000"/>
+                </a:schemeClr>
+              </a:gs>
+              <a:gs pos="73000">
+                <a:schemeClr val="accent1">
+                  <a:lumMod val="40000"/>
+                  <a:lumOff val="60000"/>
+                </a:schemeClr>
+              </a:gs>
+              <a:gs pos="100000">
+                <a:schemeClr val="accent1"/>
+              </a:gs>
+            </a:gsLst>
+            <a:lin ang="5400000" scaled="1"/>
+            <a:tileRect/>
+          </a:gradFill>
+        </p:spPr>
+        <p:style>
+          <a:lnRef idx="2">
+            <a:schemeClr val="accent1">
+              <a:shade val="50000"/>
+            </a:schemeClr>
+          </a:lnRef>
+          <a:fillRef idx="1">
+            <a:schemeClr val="accent1"/>
+          </a:fillRef>
+          <a:effectRef idx="0">
+            <a:schemeClr val="accent1"/>
+          </a:effectRef>
+          <a:fontRef idx="minor">
+            <a:schemeClr val="lt1"/>
+          </a:fontRef>
+        </p:style>
+        <p:txBody>
+          <a:bodyPr rtlCol="0" anchor="ctr"/>
+          <a:lstStyle/>
+          <a:p>
+            <a:pPr algn="ctr"/>
+            <a:r>
+              <a:rPr lang="en-US" sz="2800" b="1" dirty="0" smtClean="0">
+                <a:solidFill>
+                  <a:schemeClr val="tx1"/>
+                </a:solidFill>
+              </a:rPr>
+              <a:t>Authentication</a:t>
+            </a:r>
+            <a:endParaRPr lang="en-US" sz="2800" b="1" dirty="0">
+              <a:solidFill>
+                <a:schemeClr val="tx1"/>
+              </a:solidFill>
+            </a:endParaRPr>
+          </a:p>
+        </p:txBody>
+      </p:sp>
+      <p:sp>
+        <p:nvSpPr>
+          <p:cNvPr id="9" name="Rounded Rectangle 8"/>
+          <p:cNvSpPr/>
+          <p:nvPr/>
+        </p:nvSpPr>
+        <p:spPr>
+          <a:xfrm>
+            <a:off x="6559216" y="2366211"/>
+            <a:ext cx="2518612" cy="737937"/>
+          </a:xfrm>
+          <a:prstGeom prst="roundRect">
+            <a:avLst/>
+          </a:prstGeom>
+          <a:gradFill flip="none" rotWithShape="1">
+            <a:gsLst>
+              <a:gs pos="0">
+                <a:schemeClr val="accent1">
+                  <a:lumMod val="20000"/>
+                  <a:lumOff val="80000"/>
+                </a:schemeClr>
+              </a:gs>
+              <a:gs pos="73000">
+                <a:schemeClr val="accent1">
+                  <a:lumMod val="40000"/>
+                  <a:lumOff val="60000"/>
+                </a:schemeClr>
+              </a:gs>
+              <a:gs pos="100000">
+                <a:schemeClr val="accent1"/>
+              </a:gs>
+            </a:gsLst>
+            <a:lin ang="5400000" scaled="1"/>
+            <a:tileRect/>
+          </a:gradFill>
+        </p:spPr>
+        <p:style>
+          <a:lnRef idx="2">
+            <a:schemeClr val="accent1">
+              <a:shade val="50000"/>
+            </a:schemeClr>
+          </a:lnRef>
+          <a:fillRef idx="1">
+            <a:schemeClr val="accent1"/>
+          </a:fillRef>
+          <a:effectRef idx="0">
+            <a:schemeClr val="accent1"/>
+          </a:effectRef>
+          <a:fontRef idx="minor">
+            <a:schemeClr val="lt1"/>
+          </a:fontRef>
+        </p:style>
+        <p:txBody>
+          <a:bodyPr rot="0" spcFirstLastPara="0" vert="horz" wrap="square" lIns="91440" tIns="45720" rIns="91440" bIns="45720" numCol="1" spcCol="0" rtlCol="0" fromWordArt="0" anchor="ctr" anchorCtr="0" forceAA="0" compatLnSpc="1">
+            <a:prstTxWarp prst="textNoShape">
+              <a:avLst/>
+            </a:prstTxWarp>
+            <a:noAutofit/>
+          </a:bodyPr>
+          <a:lstStyle>
+            <a:defPPr>
+              <a:defRPr lang="en-US"/>
+            </a:defPPr>
+            <a:lvl1pPr marL="0" algn="l" defTabSz="914400" rtl="0" eaLnBrk="1" latinLnBrk="0" hangingPunct="1">
+              <a:defRPr sz="1800" kern="1200">
+                <a:solidFill>
+                  <a:schemeClr val="lt1"/>
+                </a:solidFill>
+                <a:latin typeface="+mn-lt"/>
+                <a:ea typeface="+mn-ea"/>
+                <a:cs typeface="+mn-cs"/>
+              </a:defRPr>
+            </a:lvl1pPr>
+            <a:lvl2pPr marL="457200" algn="l" defTabSz="914400" rtl="0" eaLnBrk="1" latinLnBrk="0" hangingPunct="1">
+              <a:defRPr sz="1800" kern="1200">
+                <a:solidFill>
+                  <a:schemeClr val="lt1"/>
+                </a:solidFill>
+                <a:latin typeface="+mn-lt"/>
+                <a:ea typeface="+mn-ea"/>
+                <a:cs typeface="+mn-cs"/>
+              </a:defRPr>
+            </a:lvl2pPr>
+            <a:lvl3pPr marL="914400" algn="l" defTabSz="914400" rtl="0" eaLnBrk="1" latinLnBrk="0" hangingPunct="1">
+              <a:defRPr sz="1800" kern="1200">
+                <a:solidFill>
+                  <a:schemeClr val="lt1"/>
+                </a:solidFill>
+                <a:latin typeface="+mn-lt"/>
+                <a:ea typeface="+mn-ea"/>
+                <a:cs typeface="+mn-cs"/>
+              </a:defRPr>
+            </a:lvl3pPr>
+            <a:lvl4pPr marL="1371600" algn="l" defTabSz="914400" rtl="0" eaLnBrk="1" latinLnBrk="0" hangingPunct="1">
+              <a:defRPr sz="1800" kern="1200">
+                <a:solidFill>
+                  <a:schemeClr val="lt1"/>
+                </a:solidFill>
+                <a:latin typeface="+mn-lt"/>
+                <a:ea typeface="+mn-ea"/>
+                <a:cs typeface="+mn-cs"/>
+              </a:defRPr>
+            </a:lvl4pPr>
+            <a:lvl5pPr marL="1828800" algn="l" defTabSz="914400" rtl="0" eaLnBrk="1" latinLnBrk="0" hangingPunct="1">
+              <a:defRPr sz="1800" kern="1200">
+                <a:solidFill>
+                  <a:schemeClr val="lt1"/>
+                </a:solidFill>
+                <a:latin typeface="+mn-lt"/>
+                <a:ea typeface="+mn-ea"/>
+                <a:cs typeface="+mn-cs"/>
+              </a:defRPr>
+            </a:lvl5pPr>
+            <a:lvl6pPr marL="2286000" algn="l" defTabSz="914400" rtl="0" eaLnBrk="1" latinLnBrk="0" hangingPunct="1">
+              <a:defRPr sz="1800" kern="1200">
+                <a:solidFill>
+                  <a:schemeClr val="lt1"/>
+                </a:solidFill>
+                <a:latin typeface="+mn-lt"/>
+                <a:ea typeface="+mn-ea"/>
+                <a:cs typeface="+mn-cs"/>
+              </a:defRPr>
+            </a:lvl6pPr>
+            <a:lvl7pPr marL="2743200" algn="l" defTabSz="914400" rtl="0" eaLnBrk="1" latinLnBrk="0" hangingPunct="1">
+              <a:defRPr sz="1800" kern="1200">
+                <a:solidFill>
+                  <a:schemeClr val="lt1"/>
+                </a:solidFill>
+                <a:latin typeface="+mn-lt"/>
+                <a:ea typeface="+mn-ea"/>
+                <a:cs typeface="+mn-cs"/>
+              </a:defRPr>
+            </a:lvl7pPr>
+            <a:lvl8pPr marL="3200400" algn="l" defTabSz="914400" rtl="0" eaLnBrk="1" latinLnBrk="0" hangingPunct="1">
+              <a:defRPr sz="1800" kern="1200">
+                <a:solidFill>
+                  <a:schemeClr val="lt1"/>
+                </a:solidFill>
+                <a:latin typeface="+mn-lt"/>
+                <a:ea typeface="+mn-ea"/>
+                <a:cs typeface="+mn-cs"/>
+              </a:defRPr>
+            </a:lvl8pPr>
+            <a:lvl9pPr marL="3657600" algn="l" defTabSz="914400" rtl="0" eaLnBrk="1" latinLnBrk="0" hangingPunct="1">
+              <a:defRPr sz="1800" kern="1200">
+                <a:solidFill>
+                  <a:schemeClr val="lt1"/>
+                </a:solidFill>
+                <a:latin typeface="+mn-lt"/>
+                <a:ea typeface="+mn-ea"/>
+                <a:cs typeface="+mn-cs"/>
+              </a:defRPr>
+            </a:lvl9pPr>
+          </a:lstStyle>
+          <a:p>
+            <a:pPr algn="ctr"/>
+            <a:r>
+              <a:rPr lang="en-US" sz="2800" b="1" dirty="0" smtClean="0">
+                <a:solidFill>
+                  <a:schemeClr val="tx1"/>
+                </a:solidFill>
+              </a:rPr>
+              <a:t>File Extension</a:t>
+            </a:r>
+            <a:endParaRPr lang="en-US" sz="2800" b="1" dirty="0">
+              <a:solidFill>
+                <a:schemeClr val="tx1"/>
+              </a:solidFill>
+            </a:endParaRPr>
+          </a:p>
+        </p:txBody>
+      </p:sp>
+      <p:sp>
+        <p:nvSpPr>
+          <p:cNvPr id="10" name="Rounded Rectangle 9"/>
+          <p:cNvSpPr/>
+          <p:nvPr/>
+        </p:nvSpPr>
+        <p:spPr>
+          <a:xfrm>
+            <a:off x="3364832" y="2366211"/>
+            <a:ext cx="2518612" cy="737937"/>
+          </a:xfrm>
+          <a:prstGeom prst="roundRect">
+            <a:avLst/>
+          </a:prstGeom>
+          <a:gradFill flip="none" rotWithShape="1">
+            <a:gsLst>
+              <a:gs pos="0">
+                <a:schemeClr val="accent1">
+                  <a:lumMod val="20000"/>
+                  <a:lumOff val="80000"/>
+                </a:schemeClr>
+              </a:gs>
+              <a:gs pos="73000">
+                <a:schemeClr val="accent1">
+                  <a:lumMod val="40000"/>
+                  <a:lumOff val="60000"/>
+                </a:schemeClr>
+              </a:gs>
+              <a:gs pos="100000">
+                <a:schemeClr val="accent1"/>
+              </a:gs>
+            </a:gsLst>
+            <a:lin ang="5400000" scaled="1"/>
+            <a:tileRect/>
+          </a:gradFill>
+        </p:spPr>
+        <p:style>
+          <a:lnRef idx="2">
+            <a:schemeClr val="accent1">
+              <a:shade val="50000"/>
+            </a:schemeClr>
+          </a:lnRef>
+          <a:fillRef idx="1">
+            <a:schemeClr val="accent1"/>
+          </a:fillRef>
+          <a:effectRef idx="0">
+            <a:schemeClr val="accent1"/>
+          </a:effectRef>
+          <a:fontRef idx="minor">
+            <a:schemeClr val="lt1"/>
+          </a:fontRef>
+        </p:style>
+        <p:txBody>
+          <a:bodyPr rtlCol="0" anchor="ctr"/>
+          <a:lstStyle/>
+          <a:p>
+            <a:pPr algn="ctr"/>
+            <a:r>
+              <a:rPr lang="en-US" sz="2800" b="1" dirty="0" smtClean="0">
+                <a:solidFill>
+                  <a:schemeClr val="tx1"/>
+                </a:solidFill>
+              </a:rPr>
+              <a:t>Explorer</a:t>
+            </a:r>
+            <a:endParaRPr lang="en-US" sz="2800" b="1" dirty="0">
+              <a:solidFill>
+                <a:schemeClr val="tx1"/>
+              </a:solidFill>
+            </a:endParaRPr>
+          </a:p>
+        </p:txBody>
+      </p:sp>
+      <p:sp>
+        <p:nvSpPr>
+          <p:cNvPr id="11" name="TextBox 10"/>
+          <p:cNvSpPr txBox="1"/>
+          <p:nvPr/>
+        </p:nvSpPr>
+        <p:spPr>
+          <a:xfrm>
+            <a:off x="4950282" y="1015425"/>
+            <a:ext cx="2580194" cy="584775"/>
+          </a:xfrm>
+          <a:prstGeom prst="rect">
+            <a:avLst/>
+          </a:prstGeom>
+          <a:noFill/>
+        </p:spPr>
+        <p:txBody>
+          <a:bodyPr wrap="none" rtlCol="0">
+            <a:spAutoFit/>
+          </a:bodyPr>
+          <a:lstStyle/>
+          <a:p>
+            <a:r>
+              <a:rPr lang="en-US" sz="3200" b="1" dirty="0" smtClean="0">
+                <a:solidFill>
+                  <a:schemeClr val="accent2">
+                    <a:lumMod val="75000"/>
+                  </a:schemeClr>
+                </a:solidFill>
+              </a:rPr>
+              <a:t>User Interface</a:t>
+            </a:r>
+            <a:endParaRPr lang="en-US" sz="3200" b="1" dirty="0">
+              <a:solidFill>
+                <a:schemeClr val="accent2">
+                  <a:lumMod val="75000"/>
+                </a:schemeClr>
+              </a:solidFill>
+            </a:endParaRPr>
+          </a:p>
+        </p:txBody>
+      </p:sp>
+    </p:spTree>
+    <p:extLst>
+      <p:ext uri="{BB962C8B-B14F-4D97-AF65-F5344CB8AC3E}">
+        <p14:creationId xmlns:p14="http://schemas.microsoft.com/office/powerpoint/2010/main" val="2434521687"/>
+      </p:ext>
+    </p:extLst>
+  </p:cSld>
+  <p:clrMapOvr>
+    <a:masterClrMapping/>
+  </p:clrMapOvr>
 </p:sld>
 </file>
 
@@ -11112,7 +11804,6 @@
               <a:rPr lang="en-US" sz="1400" b="1" dirty="0"/>
               <a:t>0</a:t>
             </a:r>
-            <a:endParaRPr lang="en-US" sz="1400" b="1" dirty="0"/>
           </a:p>
         </p:txBody>
       </p:sp>
@@ -11181,7 +11872,6 @@
               <a:rPr lang="en-US" sz="1400" b="1" dirty="0"/>
               <a:t>1</a:t>
             </a:r>
-            <a:endParaRPr lang="en-US" sz="1400" b="1" dirty="0"/>
           </a:p>
         </p:txBody>
       </p:sp>
@@ -11640,7 +12330,6 @@
               <a:rPr lang="en-US" sz="1400" b="1" dirty="0"/>
               <a:t>n-1</a:t>
             </a:r>
-            <a:endParaRPr lang="en-US" sz="1400" b="1" dirty="0"/>
           </a:p>
         </p:txBody>
       </p:sp>
@@ -11888,7 +12577,6 @@
               <a:rPr lang="en-US" sz="1400" b="1" dirty="0"/>
               <a:t>1</a:t>
             </a:r>
-            <a:endParaRPr lang="en-US" sz="1400" b="1" dirty="0"/>
           </a:p>
         </p:txBody>
       </p:sp>
@@ -12403,7 +13091,6 @@
               <a:rPr lang="en-US" sz="1400" b="1" dirty="0"/>
               <a:t>n-1</a:t>
             </a:r>
-            <a:endParaRPr lang="en-US" sz="1400" b="1" dirty="0"/>
           </a:p>
         </p:txBody>
       </p:sp>
@@ -13036,7 +13723,6 @@
               <a:rPr lang="en-US" sz="1400" b="1" dirty="0"/>
               <a:t>1</a:t>
             </a:r>
-            <a:endParaRPr lang="en-US" sz="1400" b="1" dirty="0"/>
           </a:p>
         </p:txBody>
       </p:sp>
@@ -13530,7 +14216,6 @@
               <a:rPr lang="en-US" sz="1400" b="1" dirty="0"/>
               <a:t>n-1</a:t>
             </a:r>
-            <a:endParaRPr lang="en-US" sz="1400" b="1" dirty="0"/>
           </a:p>
         </p:txBody>
       </p:sp>
@@ -15164,7 +15849,6 @@
               <a:rPr lang="en-US" sz="2400" b="1" dirty="0"/>
               <a:t>Rfc2898DeriveBytes </a:t>
             </a:r>
-            <a:endParaRPr lang="en-US" sz="2400" b="1" dirty="0"/>
           </a:p>
         </p:txBody>
       </p:sp>
@@ -15757,7 +16441,6 @@
               <a:rPr lang="en-US" dirty="0"/>
               <a:t>D0</a:t>
             </a:r>
-            <a:endParaRPr lang="en-US" dirty="0"/>
           </a:p>
         </p:txBody>
       </p:sp>
@@ -15835,7 +16518,6 @@
               <a:rPr lang="en-US" dirty="0"/>
               <a:t>D1</a:t>
             </a:r>
-            <a:endParaRPr lang="en-US" dirty="0"/>
           </a:p>
         </p:txBody>
       </p:sp>
@@ -15913,7 +16595,6 @@
               <a:rPr lang="en-US" dirty="0"/>
               <a:t>…</a:t>
             </a:r>
-            <a:endParaRPr lang="en-US" dirty="0"/>
           </a:p>
         </p:txBody>
       </p:sp>
@@ -16116,11 +16797,7 @@
             <a:pPr algn="ctr"/>
             <a:r>
               <a:rPr lang="en-US" dirty="0"/>
-              <a:t>E</a:t>
-            </a:r>
-            <a:r>
-              <a:rPr lang="en-US" dirty="0"/>
-              <a:t>1</a:t>
+              <a:t>E1</a:t>
             </a:r>
           </a:p>
         </p:txBody>
@@ -16187,7 +16864,6 @@
               <a:rPr lang="en-US" dirty="0"/>
               <a:t>…</a:t>
             </a:r>
-            <a:endParaRPr lang="en-US" dirty="0"/>
           </a:p>
         </p:txBody>
       </p:sp>
@@ -17306,7 +17982,6 @@
               <a:rPr lang="en-US" dirty="0"/>
               <a:t>D0</a:t>
             </a:r>
-            <a:endParaRPr lang="en-US" dirty="0"/>
           </a:p>
         </p:txBody>
       </p:sp>
@@ -17384,7 +18059,6 @@
               <a:rPr lang="en-US" dirty="0"/>
               <a:t>…</a:t>
             </a:r>
-            <a:endParaRPr lang="en-US" dirty="0"/>
           </a:p>
         </p:txBody>
       </p:sp>
@@ -17462,7 +18136,6 @@
               <a:rPr lang="en-US" dirty="0"/>
               <a:t>Dn-1</a:t>
             </a:r>
-            <a:endParaRPr lang="en-US" dirty="0"/>
           </a:p>
         </p:txBody>
       </p:sp>
@@ -17528,7 +18201,6 @@
               <a:rPr lang="en-US" dirty="0"/>
               <a:t>E0</a:t>
             </a:r>
-            <a:endParaRPr lang="en-US" dirty="0"/>
           </a:p>
         </p:txBody>
       </p:sp>
@@ -17597,7 +18269,6 @@
               <a:rPr lang="en-US" sz="1600" dirty="0"/>
               <a:t>MD</a:t>
             </a:r>
-            <a:endParaRPr lang="en-US" sz="1600" dirty="0"/>
           </a:p>
         </p:txBody>
       </p:sp>
@@ -17663,7 +18334,6 @@
               <a:rPr lang="en-US" dirty="0"/>
               <a:t>…</a:t>
             </a:r>
-            <a:endParaRPr lang="en-US" dirty="0"/>
           </a:p>
         </p:txBody>
       </p:sp>
@@ -17729,7 +18399,6 @@
               <a:rPr lang="en-US" dirty="0"/>
               <a:t>En-1</a:t>
             </a:r>
-            <a:endParaRPr lang="en-US" dirty="0"/>
           </a:p>
         </p:txBody>
       </p:sp>
@@ -18098,7 +18767,6 @@
               <a:rPr lang="en-US" dirty="0"/>
               <a:t>E0-MD</a:t>
             </a:r>
-            <a:endParaRPr lang="en-US" dirty="0"/>
           </a:p>
         </p:txBody>
       </p:sp>
@@ -18167,7 +18835,6 @@
               <a:rPr lang="en-US" dirty="0"/>
               <a:t>…</a:t>
             </a:r>
-            <a:endParaRPr lang="en-US" dirty="0"/>
           </a:p>
         </p:txBody>
       </p:sp>
@@ -18236,7 +18903,6 @@
               <a:rPr lang="en-US" dirty="0"/>
               <a:t>En-1</a:t>
             </a:r>
-            <a:endParaRPr lang="en-US" dirty="0"/>
           </a:p>
         </p:txBody>
       </p:sp>
@@ -18708,6 +19374,624 @@
       </p:par>
     </p:tnLst>
   </p:timing>
+</p:sld>
+</file>
+
+<file path=ppt/slides/slide9.xml><?xml version="1.0" encoding="utf-8"?>
+<p:sld xmlns:a="http://schemas.openxmlformats.org/drawingml/2006/main" xmlns:r="http://schemas.openxmlformats.org/officeDocument/2006/relationships" xmlns:p="http://schemas.openxmlformats.org/presentationml/2006/main">
+  <p:cSld>
+    <p:spTree>
+      <p:nvGrpSpPr>
+        <p:cNvPr id="1" name=""/>
+        <p:cNvGrpSpPr/>
+        <p:nvPr/>
+      </p:nvGrpSpPr>
+      <p:grpSpPr>
+        <a:xfrm>
+          <a:off x="0" y="0"/>
+          <a:ext cx="0" cy="0"/>
+          <a:chOff x="0" y="0"/>
+          <a:chExt cx="0" cy="0"/>
+        </a:xfrm>
+      </p:grpSpPr>
+      <p:sp>
+        <p:nvSpPr>
+          <p:cNvPr id="4" name="Rounded Rectangle 3"/>
+          <p:cNvSpPr/>
+          <p:nvPr/>
+        </p:nvSpPr>
+        <p:spPr>
+          <a:xfrm>
+            <a:off x="4572000" y="638017"/>
+            <a:ext cx="2112135" cy="1017431"/>
+          </a:xfrm>
+          <a:prstGeom prst="roundRect">
+            <a:avLst/>
+          </a:prstGeom>
+          <a:gradFill>
+            <a:gsLst>
+              <a:gs pos="0">
+                <a:schemeClr val="accent1">
+                  <a:lumMod val="5000"/>
+                  <a:lumOff val="95000"/>
+                </a:schemeClr>
+              </a:gs>
+              <a:gs pos="54000">
+                <a:schemeClr val="accent1">
+                  <a:lumMod val="45000"/>
+                  <a:lumOff val="55000"/>
+                </a:schemeClr>
+              </a:gs>
+              <a:gs pos="100000">
+                <a:schemeClr val="accent1">
+                  <a:lumMod val="45000"/>
+                  <a:lumOff val="55000"/>
+                </a:schemeClr>
+              </a:gs>
+              <a:gs pos="100000">
+                <a:schemeClr val="accent1">
+                  <a:lumMod val="30000"/>
+                  <a:lumOff val="70000"/>
+                </a:schemeClr>
+              </a:gs>
+            </a:gsLst>
+            <a:lin ang="5400000" scaled="1"/>
+          </a:gradFill>
+        </p:spPr>
+        <p:style>
+          <a:lnRef idx="2">
+            <a:schemeClr val="accent1">
+              <a:shade val="50000"/>
+            </a:schemeClr>
+          </a:lnRef>
+          <a:fillRef idx="1">
+            <a:schemeClr val="accent1"/>
+          </a:fillRef>
+          <a:effectRef idx="0">
+            <a:schemeClr val="accent1"/>
+          </a:effectRef>
+          <a:fontRef idx="minor">
+            <a:schemeClr val="lt1"/>
+          </a:fontRef>
+        </p:style>
+        <p:txBody>
+          <a:bodyPr rtlCol="0" anchor="ctr"/>
+          <a:lstStyle/>
+          <a:p>
+            <a:pPr algn="ctr"/>
+            <a:r>
+              <a:rPr lang="en-US" sz="2400" b="1" dirty="0" smtClean="0">
+                <a:solidFill>
+                  <a:schemeClr val="tx1"/>
+                </a:solidFill>
+              </a:rPr>
+              <a:t>User Interface</a:t>
+            </a:r>
+            <a:endParaRPr lang="en-US" sz="2400" b="1" dirty="0">
+              <a:solidFill>
+                <a:schemeClr val="tx1"/>
+              </a:solidFill>
+            </a:endParaRPr>
+          </a:p>
+        </p:txBody>
+      </p:sp>
+      <p:sp>
+        <p:nvSpPr>
+          <p:cNvPr id="5" name="Rounded Rectangle 4"/>
+          <p:cNvSpPr/>
+          <p:nvPr/>
+        </p:nvSpPr>
+        <p:spPr>
+          <a:xfrm>
+            <a:off x="4571999" y="2539006"/>
+            <a:ext cx="2112135" cy="1017431"/>
+          </a:xfrm>
+          <a:prstGeom prst="roundRect">
+            <a:avLst/>
+          </a:prstGeom>
+          <a:gradFill>
+            <a:gsLst>
+              <a:gs pos="0">
+                <a:schemeClr val="accent1">
+                  <a:lumMod val="5000"/>
+                  <a:lumOff val="95000"/>
+                </a:schemeClr>
+              </a:gs>
+              <a:gs pos="54000">
+                <a:schemeClr val="accent1">
+                  <a:lumMod val="45000"/>
+                  <a:lumOff val="55000"/>
+                </a:schemeClr>
+              </a:gs>
+              <a:gs pos="100000">
+                <a:schemeClr val="accent1">
+                  <a:lumMod val="45000"/>
+                  <a:lumOff val="55000"/>
+                </a:schemeClr>
+              </a:gs>
+              <a:gs pos="100000">
+                <a:schemeClr val="accent1">
+                  <a:lumMod val="30000"/>
+                  <a:lumOff val="70000"/>
+                </a:schemeClr>
+              </a:gs>
+            </a:gsLst>
+            <a:lin ang="5400000" scaled="1"/>
+          </a:gradFill>
+        </p:spPr>
+        <p:style>
+          <a:lnRef idx="2">
+            <a:schemeClr val="accent1">
+              <a:shade val="50000"/>
+            </a:schemeClr>
+          </a:lnRef>
+          <a:fillRef idx="1">
+            <a:schemeClr val="accent1"/>
+          </a:fillRef>
+          <a:effectRef idx="0">
+            <a:schemeClr val="accent1"/>
+          </a:effectRef>
+          <a:fontRef idx="minor">
+            <a:schemeClr val="lt1"/>
+          </a:fontRef>
+        </p:style>
+        <p:txBody>
+          <a:bodyPr rtlCol="0" anchor="ctr"/>
+          <a:lstStyle/>
+          <a:p>
+            <a:pPr algn="ctr"/>
+            <a:r>
+              <a:rPr lang="en-US" sz="2400" b="1" dirty="0" smtClean="0">
+                <a:solidFill>
+                  <a:schemeClr val="tx1"/>
+                </a:solidFill>
+              </a:rPr>
+              <a:t>Protect data</a:t>
+            </a:r>
+            <a:endParaRPr lang="en-US" sz="2400" b="1" dirty="0">
+              <a:solidFill>
+                <a:schemeClr val="tx1"/>
+              </a:solidFill>
+            </a:endParaRPr>
+          </a:p>
+        </p:txBody>
+      </p:sp>
+      <p:sp>
+        <p:nvSpPr>
+          <p:cNvPr id="6" name="Rounded Rectangle 5"/>
+          <p:cNvSpPr/>
+          <p:nvPr/>
+        </p:nvSpPr>
+        <p:spPr>
+          <a:xfrm>
+            <a:off x="3984328" y="261257"/>
+            <a:ext cx="3234620" cy="5529943"/>
+          </a:xfrm>
+          <a:prstGeom prst="roundRect">
+            <a:avLst/>
+          </a:prstGeom>
+          <a:noFill/>
+        </p:spPr>
+        <p:style>
+          <a:lnRef idx="2">
+            <a:schemeClr val="accent1">
+              <a:shade val="50000"/>
+            </a:schemeClr>
+          </a:lnRef>
+          <a:fillRef idx="1">
+            <a:schemeClr val="accent1"/>
+          </a:fillRef>
+          <a:effectRef idx="0">
+            <a:schemeClr val="accent1"/>
+          </a:effectRef>
+          <a:fontRef idx="minor">
+            <a:schemeClr val="lt1"/>
+          </a:fontRef>
+        </p:style>
+        <p:txBody>
+          <a:bodyPr rtlCol="0" anchor="ctr"/>
+          <a:lstStyle/>
+          <a:p>
+            <a:pPr algn="ctr"/>
+            <a:endParaRPr lang="en-US"/>
+          </a:p>
+        </p:txBody>
+      </p:sp>
+      <p:cxnSp>
+        <p:nvCxnSpPr>
+          <p:cNvPr id="8" name="Straight Arrow Connector 7"/>
+          <p:cNvCxnSpPr>
+            <a:stCxn id="4" idx="2"/>
+            <a:endCxn id="5" idx="0"/>
+          </p:cNvCxnSpPr>
+          <p:nvPr/>
+        </p:nvCxnSpPr>
+        <p:spPr>
+          <a:xfrm flipH="1">
+            <a:off x="5628067" y="1655448"/>
+            <a:ext cx="1" cy="883558"/>
+          </a:xfrm>
+          <a:prstGeom prst="straightConnector1">
+            <a:avLst/>
+          </a:prstGeom>
+          <a:ln w="79375">
+            <a:headEnd type="triangle"/>
+            <a:tailEnd type="triangle"/>
+          </a:ln>
+        </p:spPr>
+        <p:style>
+          <a:lnRef idx="1">
+            <a:schemeClr val="accent1"/>
+          </a:lnRef>
+          <a:fillRef idx="0">
+            <a:schemeClr val="accent1"/>
+          </a:fillRef>
+          <a:effectRef idx="0">
+            <a:schemeClr val="accent1"/>
+          </a:effectRef>
+          <a:fontRef idx="minor">
+            <a:schemeClr val="tx1"/>
+          </a:fontRef>
+        </p:style>
+      </p:cxnSp>
+      <p:sp>
+        <p:nvSpPr>
+          <p:cNvPr id="9" name="TextBox 8"/>
+          <p:cNvSpPr txBox="1"/>
+          <p:nvPr/>
+        </p:nvSpPr>
+        <p:spPr>
+          <a:xfrm>
+            <a:off x="721895" y="6096000"/>
+            <a:ext cx="3262432" cy="584775"/>
+          </a:xfrm>
+          <a:prstGeom prst="rect">
+            <a:avLst/>
+          </a:prstGeom>
+          <a:noFill/>
+        </p:spPr>
+        <p:txBody>
+          <a:bodyPr wrap="none" rtlCol="0">
+            <a:spAutoFit/>
+          </a:bodyPr>
+          <a:lstStyle/>
+          <a:p>
+            <a:r>
+              <a:rPr lang="en-US" sz="3200" dirty="0" err="1" smtClean="0"/>
+              <a:t>Kiến</a:t>
+            </a:r>
+            <a:r>
+              <a:rPr lang="en-US" sz="3200" dirty="0" smtClean="0"/>
+              <a:t> </a:t>
+            </a:r>
+            <a:r>
+              <a:rPr lang="en-US" sz="3200" dirty="0" err="1" smtClean="0"/>
+              <a:t>trúc</a:t>
+            </a:r>
+            <a:r>
+              <a:rPr lang="en-US" sz="3200" dirty="0" smtClean="0"/>
+              <a:t> </a:t>
+            </a:r>
+            <a:r>
+              <a:rPr lang="en-US" sz="3200" dirty="0" err="1" smtClean="0"/>
+              <a:t>hệ</a:t>
+            </a:r>
+            <a:r>
+              <a:rPr lang="en-US" sz="3200" dirty="0" smtClean="0"/>
+              <a:t> </a:t>
+            </a:r>
+            <a:r>
+              <a:rPr lang="en-US" sz="3200" dirty="0" err="1" smtClean="0"/>
+              <a:t>thống</a:t>
+            </a:r>
+            <a:endParaRPr lang="en-US" sz="3200" dirty="0"/>
+          </a:p>
+        </p:txBody>
+      </p:sp>
+      <p:pic>
+        <p:nvPicPr>
+          <p:cNvPr id="10" name="Picture 9"/>
+          <p:cNvPicPr>
+            <a:picLocks noChangeAspect="1"/>
+          </p:cNvPicPr>
+          <p:nvPr/>
+        </p:nvPicPr>
+        <p:blipFill>
+          <a:blip r:embed="rId2">
+            <a:extLst>
+              <a:ext uri="{28A0092B-C50C-407E-A947-70E740481C1C}">
+                <a14:useLocalDpi xmlns:a14="http://schemas.microsoft.com/office/drawing/2010/main" val="0"/>
+              </a:ext>
+            </a:extLst>
+          </a:blip>
+          <a:stretch>
+            <a:fillRect/>
+          </a:stretch>
+        </p:blipFill>
+        <p:spPr>
+          <a:xfrm>
+            <a:off x="8275014" y="112694"/>
+            <a:ext cx="1542754" cy="1542754"/>
+          </a:xfrm>
+          <a:prstGeom prst="rect">
+            <a:avLst/>
+          </a:prstGeom>
+        </p:spPr>
+      </p:pic>
+      <p:cxnSp>
+        <p:nvCxnSpPr>
+          <p:cNvPr id="12" name="Straight Arrow Connector 11"/>
+          <p:cNvCxnSpPr>
+            <a:stCxn id="4" idx="3"/>
+          </p:cNvCxnSpPr>
+          <p:nvPr/>
+        </p:nvCxnSpPr>
+        <p:spPr>
+          <a:xfrm flipV="1">
+            <a:off x="6684135" y="1146732"/>
+            <a:ext cx="1590879" cy="1"/>
+          </a:xfrm>
+          <a:prstGeom prst="straightConnector1">
+            <a:avLst/>
+          </a:prstGeom>
+          <a:ln w="76200">
+            <a:headEnd type="triangle"/>
+            <a:tailEnd type="triangle"/>
+          </a:ln>
+        </p:spPr>
+        <p:style>
+          <a:lnRef idx="1">
+            <a:schemeClr val="accent1"/>
+          </a:lnRef>
+          <a:fillRef idx="0">
+            <a:schemeClr val="accent1"/>
+          </a:fillRef>
+          <a:effectRef idx="0">
+            <a:schemeClr val="accent1"/>
+          </a:effectRef>
+          <a:fontRef idx="minor">
+            <a:schemeClr val="tx1"/>
+          </a:fontRef>
+        </p:style>
+      </p:cxnSp>
+      <p:sp>
+        <p:nvSpPr>
+          <p:cNvPr id="13" name="Oval 12"/>
+          <p:cNvSpPr/>
+          <p:nvPr/>
+        </p:nvSpPr>
+        <p:spPr>
+          <a:xfrm>
+            <a:off x="8360393" y="4260311"/>
+            <a:ext cx="1604211" cy="1376797"/>
+          </a:xfrm>
+          <a:prstGeom prst="ellipse">
+            <a:avLst/>
+          </a:prstGeom>
+          <a:gradFill flip="none" rotWithShape="1">
+            <a:gsLst>
+              <a:gs pos="20000">
+                <a:schemeClr val="accent2">
+                  <a:lumMod val="67000"/>
+                </a:schemeClr>
+              </a:gs>
+              <a:gs pos="74000">
+                <a:schemeClr val="accent2">
+                  <a:lumMod val="97000"/>
+                  <a:lumOff val="3000"/>
+                </a:schemeClr>
+              </a:gs>
+              <a:gs pos="88000">
+                <a:schemeClr val="accent2">
+                  <a:lumMod val="60000"/>
+                  <a:lumOff val="40000"/>
+                </a:schemeClr>
+              </a:gs>
+            </a:gsLst>
+            <a:lin ang="16200000" scaled="1"/>
+            <a:tileRect/>
+          </a:gradFill>
+        </p:spPr>
+        <p:style>
+          <a:lnRef idx="2">
+            <a:schemeClr val="accent1">
+              <a:shade val="50000"/>
+            </a:schemeClr>
+          </a:lnRef>
+          <a:fillRef idx="1">
+            <a:schemeClr val="accent1"/>
+          </a:fillRef>
+          <a:effectRef idx="0">
+            <a:schemeClr val="accent1"/>
+          </a:effectRef>
+          <a:fontRef idx="minor">
+            <a:schemeClr val="lt1"/>
+          </a:fontRef>
+        </p:style>
+        <p:txBody>
+          <a:bodyPr rtlCol="0" anchor="ctr"/>
+          <a:lstStyle/>
+          <a:p>
+            <a:pPr algn="ctr"/>
+            <a:r>
+              <a:rPr lang="en-US" sz="2400" b="1" dirty="0" smtClean="0">
+                <a:solidFill>
+                  <a:schemeClr val="bg1">
+                    <a:lumMod val="95000"/>
+                  </a:schemeClr>
+                </a:solidFill>
+              </a:rPr>
+              <a:t>API</a:t>
+            </a:r>
+            <a:endParaRPr lang="en-US" sz="2400" b="1" dirty="0">
+              <a:solidFill>
+                <a:schemeClr val="bg1">
+                  <a:lumMod val="95000"/>
+                </a:schemeClr>
+              </a:solidFill>
+            </a:endParaRPr>
+          </a:p>
+        </p:txBody>
+      </p:sp>
+      <p:cxnSp>
+        <p:nvCxnSpPr>
+          <p:cNvPr id="14" name="Straight Arrow Connector 13"/>
+          <p:cNvCxnSpPr/>
+          <p:nvPr/>
+        </p:nvCxnSpPr>
+        <p:spPr>
+          <a:xfrm flipV="1">
+            <a:off x="6674335" y="4948710"/>
+            <a:ext cx="1590879" cy="1"/>
+          </a:xfrm>
+          <a:prstGeom prst="straightConnector1">
+            <a:avLst/>
+          </a:prstGeom>
+          <a:ln w="76200">
+            <a:headEnd type="triangle"/>
+            <a:tailEnd type="triangle"/>
+          </a:ln>
+        </p:spPr>
+        <p:style>
+          <a:lnRef idx="1">
+            <a:schemeClr val="accent1"/>
+          </a:lnRef>
+          <a:fillRef idx="0">
+            <a:schemeClr val="accent1"/>
+          </a:fillRef>
+          <a:effectRef idx="0">
+            <a:schemeClr val="accent1"/>
+          </a:effectRef>
+          <a:fontRef idx="minor">
+            <a:schemeClr val="tx1"/>
+          </a:fontRef>
+        </p:style>
+      </p:cxnSp>
+      <p:sp>
+        <p:nvSpPr>
+          <p:cNvPr id="16" name="Rounded Rectangle 15"/>
+          <p:cNvSpPr/>
+          <p:nvPr/>
+        </p:nvSpPr>
+        <p:spPr>
+          <a:xfrm>
+            <a:off x="4571998" y="4439995"/>
+            <a:ext cx="2112135" cy="1017431"/>
+          </a:xfrm>
+          <a:prstGeom prst="roundRect">
+            <a:avLst/>
+          </a:prstGeom>
+          <a:gradFill>
+            <a:gsLst>
+              <a:gs pos="0">
+                <a:schemeClr val="accent1">
+                  <a:lumMod val="5000"/>
+                  <a:lumOff val="95000"/>
+                </a:schemeClr>
+              </a:gs>
+              <a:gs pos="54000">
+                <a:schemeClr val="accent1">
+                  <a:lumMod val="45000"/>
+                  <a:lumOff val="55000"/>
+                </a:schemeClr>
+              </a:gs>
+              <a:gs pos="100000">
+                <a:schemeClr val="accent1">
+                  <a:lumMod val="45000"/>
+                  <a:lumOff val="55000"/>
+                </a:schemeClr>
+              </a:gs>
+              <a:gs pos="100000">
+                <a:schemeClr val="accent1">
+                  <a:lumMod val="30000"/>
+                  <a:lumOff val="70000"/>
+                </a:schemeClr>
+              </a:gs>
+            </a:gsLst>
+            <a:lin ang="5400000" scaled="1"/>
+          </a:gradFill>
+        </p:spPr>
+        <p:style>
+          <a:lnRef idx="2">
+            <a:schemeClr val="accent1">
+              <a:shade val="50000"/>
+            </a:schemeClr>
+          </a:lnRef>
+          <a:fillRef idx="1">
+            <a:schemeClr val="accent1"/>
+          </a:fillRef>
+          <a:effectRef idx="0">
+            <a:schemeClr val="accent1"/>
+          </a:effectRef>
+          <a:fontRef idx="minor">
+            <a:schemeClr val="lt1"/>
+          </a:fontRef>
+        </p:style>
+        <p:txBody>
+          <a:bodyPr rtlCol="0" anchor="ctr"/>
+          <a:lstStyle/>
+          <a:p>
+            <a:pPr algn="ctr"/>
+            <a:r>
+              <a:rPr lang="en-US" sz="2400" b="1" dirty="0" smtClean="0">
+                <a:solidFill>
+                  <a:schemeClr val="tx1"/>
+                </a:solidFill>
+              </a:rPr>
+              <a:t>Hook Module</a:t>
+            </a:r>
+            <a:endParaRPr lang="en-US" sz="2400" b="1" dirty="0">
+              <a:solidFill>
+                <a:schemeClr val="tx1"/>
+              </a:solidFill>
+            </a:endParaRPr>
+          </a:p>
+        </p:txBody>
+      </p:sp>
+      <p:cxnSp>
+        <p:nvCxnSpPr>
+          <p:cNvPr id="17" name="Straight Arrow Connector 16"/>
+          <p:cNvCxnSpPr/>
+          <p:nvPr/>
+        </p:nvCxnSpPr>
+        <p:spPr>
+          <a:xfrm flipH="1">
+            <a:off x="5628065" y="3584472"/>
+            <a:ext cx="1" cy="883558"/>
+          </a:xfrm>
+          <a:prstGeom prst="straightConnector1">
+            <a:avLst/>
+          </a:prstGeom>
+          <a:ln w="79375">
+            <a:headEnd type="triangle"/>
+            <a:tailEnd type="triangle"/>
+          </a:ln>
+        </p:spPr>
+        <p:style>
+          <a:lnRef idx="1">
+            <a:schemeClr val="accent1"/>
+          </a:lnRef>
+          <a:fillRef idx="0">
+            <a:schemeClr val="accent1"/>
+          </a:fillRef>
+          <a:effectRef idx="0">
+            <a:schemeClr val="accent1"/>
+          </a:effectRef>
+          <a:fontRef idx="minor">
+            <a:schemeClr val="tx1"/>
+          </a:fontRef>
+        </p:style>
+      </p:cxnSp>
+    </p:spTree>
+    <p:extLst>
+      <p:ext uri="{BB962C8B-B14F-4D97-AF65-F5344CB8AC3E}">
+        <p14:creationId xmlns:p14="http://schemas.microsoft.com/office/powerpoint/2010/main" val="4255877774"/>
+      </p:ext>
+    </p:extLst>
+  </p:cSld>
+  <p:clrMapOvr>
+    <a:masterClrMapping/>
+  </p:clrMapOvr>
 </p:sld>
 </file>
 

</xml_diff>

<commit_message>
# Update LUANVAN.docx + Hinh ve co che ma hoa + Global ỏ Local hook # Update SODO.pptx + Hinh ve co che ma hoa
</commit_message>
<xml_diff>
--- a/Document/SODO.pptx
+++ b/Document/SODO.pptx
@@ -10,17 +10,18 @@
     <p:sldId id="258" r:id="rId4"/>
     <p:sldId id="268" r:id="rId5"/>
     <p:sldId id="259" r:id="rId6"/>
-    <p:sldId id="260" r:id="rId7"/>
-    <p:sldId id="263" r:id="rId8"/>
-    <p:sldId id="261" r:id="rId9"/>
-    <p:sldId id="262" r:id="rId10"/>
-    <p:sldId id="264" r:id="rId11"/>
-    <p:sldId id="265" r:id="rId12"/>
-    <p:sldId id="267" r:id="rId13"/>
-    <p:sldId id="266" r:id="rId14"/>
+    <p:sldId id="269" r:id="rId7"/>
+    <p:sldId id="260" r:id="rId8"/>
+    <p:sldId id="263" r:id="rId9"/>
+    <p:sldId id="261" r:id="rId10"/>
+    <p:sldId id="262" r:id="rId11"/>
+    <p:sldId id="264" r:id="rId12"/>
+    <p:sldId id="265" r:id="rId13"/>
+    <p:sldId id="267" r:id="rId14"/>
+    <p:sldId id="266" r:id="rId15"/>
   </p:sldIdLst>
   <p:sldSz cx="12192000" cy="6858000"/>
-  <p:notesSz cx="6858000" cy="9144000"/>
+  <p:notesSz cx="7315200" cy="9601200"/>
   <p:defaultTextStyle>
     <a:defPPr>
       <a:defRPr lang="en-US"/>
@@ -4606,564 +4607,6 @@
       <dsp:cNvGrpSpPr/>
     </dsp:nvGrpSpPr>
     <dsp:grpSpPr/>
-    <dsp:sp modelId="{7F739C37-DE7D-4C78-8F14-BB11D63384A4}">
-      <dsp:nvSpPr>
-        <dsp:cNvPr id="0" name=""/>
-        <dsp:cNvSpPr/>
-      </dsp:nvSpPr>
-      <dsp:spPr>
-        <a:xfrm>
-          <a:off x="2567" y="272267"/>
-          <a:ext cx="2284883" cy="913953"/>
-        </a:xfrm>
-        <a:prstGeom prst="chevron">
-          <a:avLst/>
-        </a:prstGeom>
-        <a:solidFill>
-          <a:schemeClr val="accent1">
-            <a:hueOff val="0"/>
-            <a:satOff val="0"/>
-            <a:lumOff val="0"/>
-            <a:alphaOff val="0"/>
-          </a:schemeClr>
-        </a:solidFill>
-        <a:ln w="12700" cap="flat" cmpd="sng" algn="ctr">
-          <a:solidFill>
-            <a:schemeClr val="lt1">
-              <a:hueOff val="0"/>
-              <a:satOff val="0"/>
-              <a:lumOff val="0"/>
-              <a:alphaOff val="0"/>
-            </a:schemeClr>
-          </a:solidFill>
-          <a:prstDash val="solid"/>
-          <a:miter lim="800000"/>
-        </a:ln>
-        <a:effectLst/>
-      </dsp:spPr>
-      <dsp:style>
-        <a:lnRef idx="2">
-          <a:scrgbClr r="0" g="0" b="0"/>
-        </a:lnRef>
-        <a:fillRef idx="1">
-          <a:scrgbClr r="0" g="0" b="0"/>
-        </a:fillRef>
-        <a:effectRef idx="0">
-          <a:scrgbClr r="0" g="0" b="0"/>
-        </a:effectRef>
-        <a:fontRef idx="minor">
-          <a:schemeClr val="lt1"/>
-        </a:fontRef>
-      </dsp:style>
-      <dsp:txBody>
-        <a:bodyPr spcFirstLastPara="0" vert="horz" wrap="square" lIns="72009" tIns="24003" rIns="24003" bIns="24003" numCol="1" spcCol="1270" anchor="ctr" anchorCtr="0">
-          <a:noAutofit/>
-        </a:bodyPr>
-        <a:lstStyle/>
-        <a:p>
-          <a:pPr lvl="0" algn="ctr" defTabSz="800100">
-            <a:lnSpc>
-              <a:spcPct val="90000"/>
-            </a:lnSpc>
-            <a:spcBef>
-              <a:spcPct val="0"/>
-            </a:spcBef>
-            <a:spcAft>
-              <a:spcPct val="35000"/>
-            </a:spcAft>
-          </a:pPr>
-          <a:r>
-            <a:rPr lang="en-US" sz="1800" kern="1200" dirty="0" err="1" smtClean="0"/>
-            <a:t>Xác</a:t>
-          </a:r>
-          <a:r>
-            <a:rPr lang="en-US" sz="1800" kern="1200" dirty="0" smtClean="0"/>
-            <a:t> </a:t>
-          </a:r>
-          <a:r>
-            <a:rPr lang="en-US" sz="1800" kern="1200" dirty="0" err="1" smtClean="0"/>
-            <a:t>định</a:t>
-          </a:r>
-          <a:r>
-            <a:rPr lang="en-US" sz="1800" kern="1200" dirty="0" smtClean="0"/>
-            <a:t> </a:t>
-          </a:r>
-          <a:r>
-            <a:rPr lang="en-US" sz="1800" kern="1200" dirty="0" err="1" smtClean="0"/>
-            <a:t>địa</a:t>
-          </a:r>
-          <a:r>
-            <a:rPr lang="en-US" sz="1800" kern="1200" dirty="0" smtClean="0"/>
-            <a:t> </a:t>
-          </a:r>
-          <a:r>
-            <a:rPr lang="en-US" sz="1800" kern="1200" dirty="0" err="1" smtClean="0"/>
-            <a:t>chỉ</a:t>
-          </a:r>
-          <a:r>
-            <a:rPr lang="en-US" sz="1800" kern="1200" dirty="0" smtClean="0"/>
-            <a:t> </a:t>
-          </a:r>
-          <a:r>
-            <a:rPr lang="en-US" sz="1800" kern="1200" dirty="0" err="1" smtClean="0"/>
-            <a:t>hàm</a:t>
-          </a:r>
-          <a:r>
-            <a:rPr lang="en-US" sz="1800" kern="1200" dirty="0" smtClean="0"/>
-            <a:t> </a:t>
-          </a:r>
-          <a:r>
-            <a:rPr lang="en-US" sz="1800" kern="1200" dirty="0" err="1" smtClean="0"/>
-            <a:t>gốc</a:t>
-          </a:r>
-          <a:r>
-            <a:rPr lang="en-US" sz="1800" kern="1200" dirty="0" smtClean="0"/>
-            <a:t> (entry point)</a:t>
-          </a:r>
-          <a:endParaRPr lang="en-US" sz="1800" kern="1200" dirty="0"/>
-        </a:p>
-      </dsp:txBody>
-      <dsp:txXfrm>
-        <a:off x="459544" y="272267"/>
-        <a:ext cx="1370930" cy="913953"/>
-      </dsp:txXfrm>
-    </dsp:sp>
-    <dsp:sp modelId="{79E3F17D-5461-4BCB-9DC2-D9574FD49015}">
-      <dsp:nvSpPr>
-        <dsp:cNvPr id="0" name=""/>
-        <dsp:cNvSpPr/>
-      </dsp:nvSpPr>
-      <dsp:spPr>
-        <a:xfrm>
-          <a:off x="2058962" y="272267"/>
-          <a:ext cx="2284883" cy="913953"/>
-        </a:xfrm>
-        <a:prstGeom prst="chevron">
-          <a:avLst/>
-        </a:prstGeom>
-        <a:solidFill>
-          <a:schemeClr val="accent1">
-            <a:hueOff val="0"/>
-            <a:satOff val="0"/>
-            <a:lumOff val="0"/>
-            <a:alphaOff val="0"/>
-          </a:schemeClr>
-        </a:solidFill>
-        <a:ln w="12700" cap="flat" cmpd="sng" algn="ctr">
-          <a:solidFill>
-            <a:schemeClr val="lt1">
-              <a:hueOff val="0"/>
-              <a:satOff val="0"/>
-              <a:lumOff val="0"/>
-              <a:alphaOff val="0"/>
-            </a:schemeClr>
-          </a:solidFill>
-          <a:prstDash val="solid"/>
-          <a:miter lim="800000"/>
-        </a:ln>
-        <a:effectLst/>
-      </dsp:spPr>
-      <dsp:style>
-        <a:lnRef idx="2">
-          <a:scrgbClr r="0" g="0" b="0"/>
-        </a:lnRef>
-        <a:fillRef idx="1">
-          <a:scrgbClr r="0" g="0" b="0"/>
-        </a:fillRef>
-        <a:effectRef idx="0">
-          <a:scrgbClr r="0" g="0" b="0"/>
-        </a:effectRef>
-        <a:fontRef idx="minor">
-          <a:schemeClr val="lt1"/>
-        </a:fontRef>
-      </dsp:style>
-      <dsp:txBody>
-        <a:bodyPr spcFirstLastPara="0" vert="horz" wrap="square" lIns="72009" tIns="24003" rIns="24003" bIns="24003" numCol="1" spcCol="1270" anchor="ctr" anchorCtr="0">
-          <a:noAutofit/>
-        </a:bodyPr>
-        <a:lstStyle/>
-        <a:p>
-          <a:pPr lvl="0" algn="ctr" defTabSz="800100">
-            <a:lnSpc>
-              <a:spcPct val="90000"/>
-            </a:lnSpc>
-            <a:spcBef>
-              <a:spcPct val="0"/>
-            </a:spcBef>
-            <a:spcAft>
-              <a:spcPct val="35000"/>
-            </a:spcAft>
-          </a:pPr>
-          <a:r>
-            <a:rPr lang="en-US" sz="1800" kern="1200" dirty="0" err="1" smtClean="0"/>
-            <a:t>Cấp</a:t>
-          </a:r>
-          <a:r>
-            <a:rPr lang="en-US" sz="1800" kern="1200" dirty="0" smtClean="0"/>
-            <a:t> </a:t>
-          </a:r>
-          <a:r>
-            <a:rPr lang="en-US" sz="1800" kern="1200" dirty="0" err="1" smtClean="0"/>
-            <a:t>phát</a:t>
-          </a:r>
-          <a:r>
-            <a:rPr lang="en-US" sz="1800" kern="1200" dirty="0" smtClean="0"/>
-            <a:t> </a:t>
-          </a:r>
-          <a:r>
-            <a:rPr lang="en-US" sz="1800" kern="1200" dirty="0" err="1" smtClean="0"/>
-            <a:t>vùng</a:t>
-          </a:r>
-          <a:r>
-            <a:rPr lang="en-US" sz="1800" kern="1200" dirty="0" smtClean="0"/>
-            <a:t> </a:t>
-          </a:r>
-          <a:r>
-            <a:rPr lang="en-US" sz="1800" kern="1200" dirty="0" err="1" smtClean="0"/>
-            <a:t>nhớ</a:t>
-          </a:r>
-          <a:r>
-            <a:rPr lang="en-US" sz="1800" kern="1200" dirty="0" smtClean="0"/>
-            <a:t> </a:t>
-          </a:r>
-          <a:r>
-            <a:rPr lang="en-US" sz="1800" kern="1200" dirty="0" err="1" smtClean="0"/>
-            <a:t>lưu</a:t>
-          </a:r>
-          <a:r>
-            <a:rPr lang="en-US" sz="1800" kern="1200" dirty="0" smtClean="0"/>
-            <a:t> </a:t>
-          </a:r>
-          <a:r>
-            <a:rPr lang="en-US" sz="1800" kern="1200" dirty="0" err="1" smtClean="0"/>
-            <a:t>thông</a:t>
-          </a:r>
-          <a:r>
-            <a:rPr lang="en-US" sz="1800" kern="1200" dirty="0" smtClean="0"/>
-            <a:t> tin</a:t>
-          </a:r>
-          <a:endParaRPr lang="en-US" sz="1800" kern="1200" dirty="0"/>
-        </a:p>
-      </dsp:txBody>
-      <dsp:txXfrm>
-        <a:off x="2515939" y="272267"/>
-        <a:ext cx="1370930" cy="913953"/>
-      </dsp:txXfrm>
-    </dsp:sp>
-    <dsp:sp modelId="{342BFAB8-AD99-4644-A7A7-89BFBF6C1002}">
-      <dsp:nvSpPr>
-        <dsp:cNvPr id="0" name=""/>
-        <dsp:cNvSpPr/>
-      </dsp:nvSpPr>
-      <dsp:spPr>
-        <a:xfrm>
-          <a:off x="4115358" y="272267"/>
-          <a:ext cx="2284883" cy="913953"/>
-        </a:xfrm>
-        <a:prstGeom prst="chevron">
-          <a:avLst/>
-        </a:prstGeom>
-        <a:solidFill>
-          <a:schemeClr val="accent1">
-            <a:hueOff val="0"/>
-            <a:satOff val="0"/>
-            <a:lumOff val="0"/>
-            <a:alphaOff val="0"/>
-          </a:schemeClr>
-        </a:solidFill>
-        <a:ln w="12700" cap="flat" cmpd="sng" algn="ctr">
-          <a:solidFill>
-            <a:schemeClr val="lt1">
-              <a:hueOff val="0"/>
-              <a:satOff val="0"/>
-              <a:lumOff val="0"/>
-              <a:alphaOff val="0"/>
-            </a:schemeClr>
-          </a:solidFill>
-          <a:prstDash val="solid"/>
-          <a:miter lim="800000"/>
-        </a:ln>
-        <a:effectLst/>
-      </dsp:spPr>
-      <dsp:style>
-        <a:lnRef idx="2">
-          <a:scrgbClr r="0" g="0" b="0"/>
-        </a:lnRef>
-        <a:fillRef idx="1">
-          <a:scrgbClr r="0" g="0" b="0"/>
-        </a:fillRef>
-        <a:effectRef idx="0">
-          <a:scrgbClr r="0" g="0" b="0"/>
-        </a:effectRef>
-        <a:fontRef idx="minor">
-          <a:schemeClr val="lt1"/>
-        </a:fontRef>
-      </dsp:style>
-      <dsp:txBody>
-        <a:bodyPr spcFirstLastPara="0" vert="horz" wrap="square" lIns="72009" tIns="24003" rIns="24003" bIns="24003" numCol="1" spcCol="1270" anchor="ctr" anchorCtr="0">
-          <a:noAutofit/>
-        </a:bodyPr>
-        <a:lstStyle/>
-        <a:p>
-          <a:pPr lvl="0" algn="ctr" defTabSz="800100">
-            <a:lnSpc>
-              <a:spcPct val="90000"/>
-            </a:lnSpc>
-            <a:spcBef>
-              <a:spcPct val="0"/>
-            </a:spcBef>
-            <a:spcAft>
-              <a:spcPct val="35000"/>
-            </a:spcAft>
-          </a:pPr>
-          <a:r>
-            <a:rPr lang="en-US" sz="1800" kern="1200" dirty="0" err="1" smtClean="0"/>
-            <a:t>Làm</a:t>
-          </a:r>
-          <a:r>
-            <a:rPr lang="en-US" sz="1800" kern="1200" dirty="0" smtClean="0"/>
-            <a:t> </a:t>
-          </a:r>
-          <a:r>
-            <a:rPr lang="en-US" sz="1800" kern="1200" dirty="0" err="1" smtClean="0"/>
-            <a:t>tròn</a:t>
-          </a:r>
-          <a:r>
-            <a:rPr lang="en-US" sz="1800" kern="1200" dirty="0" smtClean="0"/>
-            <a:t> </a:t>
-          </a:r>
-          <a:r>
-            <a:rPr lang="en-US" sz="1800" kern="1200" dirty="0" err="1" smtClean="0"/>
-            <a:t>độ</a:t>
-          </a:r>
-          <a:r>
-            <a:rPr lang="en-US" sz="1800" kern="1200" dirty="0" smtClean="0"/>
-            <a:t> </a:t>
-          </a:r>
-          <a:r>
-            <a:rPr lang="en-US" sz="1800" kern="1200" dirty="0" err="1" smtClean="0"/>
-            <a:t>dài</a:t>
-          </a:r>
-          <a:r>
-            <a:rPr lang="en-US" sz="1800" kern="1200" dirty="0" smtClean="0"/>
-            <a:t> entry point</a:t>
-          </a:r>
-          <a:endParaRPr lang="en-US" sz="1800" kern="1200" dirty="0"/>
-        </a:p>
-      </dsp:txBody>
-      <dsp:txXfrm>
-        <a:off x="4572335" y="272267"/>
-        <a:ext cx="1370930" cy="913953"/>
-      </dsp:txXfrm>
-    </dsp:sp>
-    <dsp:sp modelId="{73C7F563-37A3-4CF6-9658-1DD4E98136F9}">
-      <dsp:nvSpPr>
-        <dsp:cNvPr id="0" name=""/>
-        <dsp:cNvSpPr/>
-      </dsp:nvSpPr>
-      <dsp:spPr>
-        <a:xfrm>
-          <a:off x="6171753" y="272267"/>
-          <a:ext cx="2284883" cy="913953"/>
-        </a:xfrm>
-        <a:prstGeom prst="chevron">
-          <a:avLst/>
-        </a:prstGeom>
-        <a:solidFill>
-          <a:schemeClr val="accent1">
-            <a:hueOff val="0"/>
-            <a:satOff val="0"/>
-            <a:lumOff val="0"/>
-            <a:alphaOff val="0"/>
-          </a:schemeClr>
-        </a:solidFill>
-        <a:ln w="12700" cap="flat" cmpd="sng" algn="ctr">
-          <a:solidFill>
-            <a:schemeClr val="lt1">
-              <a:hueOff val="0"/>
-              <a:satOff val="0"/>
-              <a:lumOff val="0"/>
-              <a:alphaOff val="0"/>
-            </a:schemeClr>
-          </a:solidFill>
-          <a:prstDash val="solid"/>
-          <a:miter lim="800000"/>
-        </a:ln>
-        <a:effectLst/>
-      </dsp:spPr>
-      <dsp:style>
-        <a:lnRef idx="2">
-          <a:scrgbClr r="0" g="0" b="0"/>
-        </a:lnRef>
-        <a:fillRef idx="1">
-          <a:scrgbClr r="0" g="0" b="0"/>
-        </a:fillRef>
-        <a:effectRef idx="0">
-          <a:scrgbClr r="0" g="0" b="0"/>
-        </a:effectRef>
-        <a:fontRef idx="minor">
-          <a:schemeClr val="lt1"/>
-        </a:fontRef>
-      </dsp:style>
-      <dsp:txBody>
-        <a:bodyPr spcFirstLastPara="0" vert="horz" wrap="square" lIns="72009" tIns="24003" rIns="24003" bIns="24003" numCol="1" spcCol="1270" anchor="ctr" anchorCtr="0">
-          <a:noAutofit/>
-        </a:bodyPr>
-        <a:lstStyle/>
-        <a:p>
-          <a:pPr lvl="0" algn="ctr" defTabSz="800100">
-            <a:lnSpc>
-              <a:spcPct val="90000"/>
-            </a:lnSpc>
-            <a:spcBef>
-              <a:spcPct val="0"/>
-            </a:spcBef>
-            <a:spcAft>
-              <a:spcPct val="35000"/>
-            </a:spcAft>
-          </a:pPr>
-          <a:r>
-            <a:rPr lang="en-US" sz="1800" kern="1200" dirty="0" err="1" smtClean="0"/>
-            <a:t>Lưu</a:t>
-          </a:r>
-          <a:r>
-            <a:rPr lang="en-US" sz="1800" kern="1200" dirty="0" smtClean="0"/>
-            <a:t> </a:t>
-          </a:r>
-          <a:r>
-            <a:rPr lang="en-US" sz="1800" kern="1200" dirty="0" err="1" smtClean="0"/>
-            <a:t>địa</a:t>
-          </a:r>
-          <a:r>
-            <a:rPr lang="en-US" sz="1800" kern="1200" dirty="0" smtClean="0"/>
-            <a:t> </a:t>
-          </a:r>
-          <a:r>
-            <a:rPr lang="en-US" sz="1800" kern="1200" dirty="0" err="1" smtClean="0"/>
-            <a:t>chỉ</a:t>
-          </a:r>
-          <a:r>
-            <a:rPr lang="en-US" sz="1800" kern="1200" dirty="0" smtClean="0"/>
-            <a:t> </a:t>
-          </a:r>
-          <a:r>
-            <a:rPr lang="en-US" sz="1800" kern="1200" dirty="0" err="1" smtClean="0"/>
-            <a:t>hàm</a:t>
-          </a:r>
-          <a:r>
-            <a:rPr lang="en-US" sz="1800" kern="1200" dirty="0" smtClean="0"/>
-            <a:t> </a:t>
-          </a:r>
-          <a:r>
-            <a:rPr lang="en-US" sz="1800" kern="1200" dirty="0" err="1" smtClean="0"/>
-            <a:t>gốc</a:t>
-          </a:r>
-          <a:endParaRPr lang="en-US" sz="1800" kern="1200" dirty="0"/>
-        </a:p>
-      </dsp:txBody>
-      <dsp:txXfrm>
-        <a:off x="6628730" y="272267"/>
-        <a:ext cx="1370930" cy="913953"/>
-      </dsp:txXfrm>
-    </dsp:sp>
-    <dsp:sp modelId="{90C7D633-37DA-4C45-B5A5-BFF7A0E0497C}">
-      <dsp:nvSpPr>
-        <dsp:cNvPr id="0" name=""/>
-        <dsp:cNvSpPr/>
-      </dsp:nvSpPr>
-      <dsp:spPr>
-        <a:xfrm>
-          <a:off x="8228148" y="272267"/>
-          <a:ext cx="2284883" cy="913953"/>
-        </a:xfrm>
-        <a:prstGeom prst="chevron">
-          <a:avLst/>
-        </a:prstGeom>
-        <a:solidFill>
-          <a:schemeClr val="accent1">
-            <a:hueOff val="0"/>
-            <a:satOff val="0"/>
-            <a:lumOff val="0"/>
-            <a:alphaOff val="0"/>
-          </a:schemeClr>
-        </a:solidFill>
-        <a:ln w="12700" cap="flat" cmpd="sng" algn="ctr">
-          <a:solidFill>
-            <a:schemeClr val="lt1">
-              <a:hueOff val="0"/>
-              <a:satOff val="0"/>
-              <a:lumOff val="0"/>
-              <a:alphaOff val="0"/>
-            </a:schemeClr>
-          </a:solidFill>
-          <a:prstDash val="solid"/>
-          <a:miter lim="800000"/>
-        </a:ln>
-        <a:effectLst/>
-      </dsp:spPr>
-      <dsp:style>
-        <a:lnRef idx="2">
-          <a:scrgbClr r="0" g="0" b="0"/>
-        </a:lnRef>
-        <a:fillRef idx="1">
-          <a:scrgbClr r="0" g="0" b="0"/>
-        </a:fillRef>
-        <a:effectRef idx="0">
-          <a:scrgbClr r="0" g="0" b="0"/>
-        </a:effectRef>
-        <a:fontRef idx="minor">
-          <a:schemeClr val="lt1"/>
-        </a:fontRef>
-      </dsp:style>
-      <dsp:txBody>
-        <a:bodyPr spcFirstLastPara="0" vert="horz" wrap="square" lIns="72009" tIns="24003" rIns="24003" bIns="24003" numCol="1" spcCol="1270" anchor="ctr" anchorCtr="0">
-          <a:noAutofit/>
-        </a:bodyPr>
-        <a:lstStyle/>
-        <a:p>
-          <a:pPr lvl="0" algn="ctr" defTabSz="800100">
-            <a:lnSpc>
-              <a:spcPct val="90000"/>
-            </a:lnSpc>
-            <a:spcBef>
-              <a:spcPct val="0"/>
-            </a:spcBef>
-            <a:spcAft>
-              <a:spcPct val="35000"/>
-            </a:spcAft>
-          </a:pPr>
-          <a:r>
-            <a:rPr lang="en-US" sz="1800" kern="1200" dirty="0" err="1" smtClean="0"/>
-            <a:t>Nhảy</a:t>
-          </a:r>
-          <a:r>
-            <a:rPr lang="en-US" sz="1800" kern="1200" dirty="0" smtClean="0"/>
-            <a:t> </a:t>
-          </a:r>
-          <a:r>
-            <a:rPr lang="en-US" sz="1800" kern="1200" dirty="0" err="1" smtClean="0"/>
-            <a:t>tới</a:t>
-          </a:r>
-          <a:r>
-            <a:rPr lang="en-US" sz="1800" kern="1200" dirty="0" smtClean="0"/>
-            <a:t> </a:t>
-          </a:r>
-          <a:r>
-            <a:rPr lang="en-US" sz="1800" kern="1200" dirty="0" err="1" smtClean="0"/>
-            <a:t>hàm</a:t>
-          </a:r>
-          <a:r>
-            <a:rPr lang="en-US" sz="1800" kern="1200" dirty="0" smtClean="0"/>
-            <a:t> hook</a:t>
-          </a:r>
-          <a:endParaRPr lang="en-US" sz="1800" kern="1200" dirty="0"/>
-        </a:p>
-      </dsp:txBody>
-      <dsp:txXfrm>
-        <a:off x="8685125" y="272267"/>
-        <a:ext cx="1370930" cy="913953"/>
-      </dsp:txXfrm>
-    </dsp:sp>
   </dsp:spTree>
 </dsp:drawing>
 </file>
@@ -7796,7 +7239,7 @@
           <a:p>
             <a:fld id="{16D2D749-03DE-4EC2-8C00-F102FCD2936A}" type="datetimeFigureOut">
               <a:rPr lang="en-US" smtClean="0"/>
-              <a:t>7/2/2015</a:t>
+              <a:t>7/3/2015</a:t>
             </a:fld>
             <a:endParaRPr lang="en-US"/>
           </a:p>
@@ -7966,7 +7409,7 @@
           <a:p>
             <a:fld id="{16D2D749-03DE-4EC2-8C00-F102FCD2936A}" type="datetimeFigureOut">
               <a:rPr lang="en-US" smtClean="0"/>
-              <a:t>7/2/2015</a:t>
+              <a:t>7/3/2015</a:t>
             </a:fld>
             <a:endParaRPr lang="en-US"/>
           </a:p>
@@ -8146,7 +7589,7 @@
           <a:p>
             <a:fld id="{16D2D749-03DE-4EC2-8C00-F102FCD2936A}" type="datetimeFigureOut">
               <a:rPr lang="en-US" smtClean="0"/>
-              <a:t>7/2/2015</a:t>
+              <a:t>7/3/2015</a:t>
             </a:fld>
             <a:endParaRPr lang="en-US"/>
           </a:p>
@@ -8316,7 +7759,7 @@
           <a:p>
             <a:fld id="{16D2D749-03DE-4EC2-8C00-F102FCD2936A}" type="datetimeFigureOut">
               <a:rPr lang="en-US" smtClean="0"/>
-              <a:t>7/2/2015</a:t>
+              <a:t>7/3/2015</a:t>
             </a:fld>
             <a:endParaRPr lang="en-US"/>
           </a:p>
@@ -8562,7 +8005,7 @@
           <a:p>
             <a:fld id="{16D2D749-03DE-4EC2-8C00-F102FCD2936A}" type="datetimeFigureOut">
               <a:rPr lang="en-US" smtClean="0"/>
-              <a:t>7/2/2015</a:t>
+              <a:t>7/3/2015</a:t>
             </a:fld>
             <a:endParaRPr lang="en-US"/>
           </a:p>
@@ -8794,7 +8237,7 @@
           <a:p>
             <a:fld id="{16D2D749-03DE-4EC2-8C00-F102FCD2936A}" type="datetimeFigureOut">
               <a:rPr lang="en-US" smtClean="0"/>
-              <a:t>7/2/2015</a:t>
+              <a:t>7/3/2015</a:t>
             </a:fld>
             <a:endParaRPr lang="en-US"/>
           </a:p>
@@ -9161,7 +8604,7 @@
           <a:p>
             <a:fld id="{16D2D749-03DE-4EC2-8C00-F102FCD2936A}" type="datetimeFigureOut">
               <a:rPr lang="en-US" smtClean="0"/>
-              <a:t>7/2/2015</a:t>
+              <a:t>7/3/2015</a:t>
             </a:fld>
             <a:endParaRPr lang="en-US"/>
           </a:p>
@@ -9279,7 +8722,7 @@
           <a:p>
             <a:fld id="{16D2D749-03DE-4EC2-8C00-F102FCD2936A}" type="datetimeFigureOut">
               <a:rPr lang="en-US" smtClean="0"/>
-              <a:t>7/2/2015</a:t>
+              <a:t>7/3/2015</a:t>
             </a:fld>
             <a:endParaRPr lang="en-US"/>
           </a:p>
@@ -9374,7 +8817,7 @@
           <a:p>
             <a:fld id="{16D2D749-03DE-4EC2-8C00-F102FCD2936A}" type="datetimeFigureOut">
               <a:rPr lang="en-US" smtClean="0"/>
-              <a:t>7/2/2015</a:t>
+              <a:t>7/3/2015</a:t>
             </a:fld>
             <a:endParaRPr lang="en-US"/>
           </a:p>
@@ -9651,7 +9094,7 @@
           <a:p>
             <a:fld id="{16D2D749-03DE-4EC2-8C00-F102FCD2936A}" type="datetimeFigureOut">
               <a:rPr lang="en-US" smtClean="0"/>
-              <a:t>7/2/2015</a:t>
+              <a:t>7/3/2015</a:t>
             </a:fld>
             <a:endParaRPr lang="en-US"/>
           </a:p>
@@ -9904,7 +9347,7 @@
           <a:p>
             <a:fld id="{16D2D749-03DE-4EC2-8C00-F102FCD2936A}" type="datetimeFigureOut">
               <a:rPr lang="en-US" smtClean="0"/>
-              <a:t>7/2/2015</a:t>
+              <a:t>7/3/2015</a:t>
             </a:fld>
             <a:endParaRPr lang="en-US"/>
           </a:p>
@@ -10117,7 +9560,7 @@
           <a:p>
             <a:fld id="{16D2D749-03DE-4EC2-8C00-F102FCD2936A}" type="datetimeFigureOut">
               <a:rPr lang="en-US" smtClean="0"/>
-              <a:t>7/2/2015</a:t>
+              <a:t>7/3/2015</a:t>
             </a:fld>
             <a:endParaRPr lang="en-US"/>
           </a:p>
@@ -10644,6 +10087,1492 @@
       </p:grpSpPr>
       <p:sp>
         <p:nvSpPr>
+          <p:cNvPr id="6" name="Rectangle 5"/>
+          <p:cNvSpPr/>
+          <p:nvPr/>
+        </p:nvSpPr>
+        <p:spPr>
+          <a:xfrm>
+            <a:off x="5486399" y="1315326"/>
+            <a:ext cx="1336431" cy="372795"/>
+          </a:xfrm>
+          <a:prstGeom prst="rect">
+            <a:avLst/>
+          </a:prstGeom>
+          <a:gradFill>
+            <a:gsLst>
+              <a:gs pos="10000">
+                <a:srgbClr val="4777A5">
+                  <a:lumMod val="98000"/>
+                </a:srgbClr>
+              </a:gs>
+              <a:gs pos="14000">
+                <a:schemeClr val="accent1">
+                  <a:lumMod val="75000"/>
+                </a:schemeClr>
+              </a:gs>
+              <a:gs pos="75000">
+                <a:schemeClr val="accent1">
+                  <a:lumMod val="60000"/>
+                  <a:lumOff val="40000"/>
+                </a:schemeClr>
+              </a:gs>
+              <a:gs pos="85000">
+                <a:schemeClr val="accent1">
+                  <a:lumMod val="20000"/>
+                  <a:lumOff val="80000"/>
+                </a:schemeClr>
+              </a:gs>
+            </a:gsLst>
+            <a:lin ang="16200000" scaled="1"/>
+          </a:gradFill>
+          <a:ln w="12700">
+            <a:solidFill>
+              <a:schemeClr val="tx2">
+                <a:lumMod val="75000"/>
+              </a:schemeClr>
+            </a:solidFill>
+          </a:ln>
+        </p:spPr>
+        <p:style>
+          <a:lnRef idx="2">
+            <a:schemeClr val="accent1">
+              <a:shade val="50000"/>
+            </a:schemeClr>
+          </a:lnRef>
+          <a:fillRef idx="1">
+            <a:schemeClr val="accent1"/>
+          </a:fillRef>
+          <a:effectRef idx="0">
+            <a:schemeClr val="accent1"/>
+          </a:effectRef>
+          <a:fontRef idx="minor">
+            <a:schemeClr val="lt1"/>
+          </a:fontRef>
+        </p:style>
+        <p:txBody>
+          <a:bodyPr rtlCol="0" anchor="ctr"/>
+          <a:lstStyle/>
+          <a:p>
+            <a:pPr algn="ctr"/>
+            <a:r>
+              <a:rPr lang="en-US" dirty="0"/>
+              <a:t>D0</a:t>
+            </a:r>
+          </a:p>
+        </p:txBody>
+      </p:sp>
+      <p:sp>
+        <p:nvSpPr>
+          <p:cNvPr id="7" name="Rectangle 6"/>
+          <p:cNvSpPr/>
+          <p:nvPr/>
+        </p:nvSpPr>
+        <p:spPr>
+          <a:xfrm>
+            <a:off x="6822830" y="1315326"/>
+            <a:ext cx="1336431" cy="372795"/>
+          </a:xfrm>
+          <a:prstGeom prst="rect">
+            <a:avLst/>
+          </a:prstGeom>
+          <a:gradFill>
+            <a:gsLst>
+              <a:gs pos="10000">
+                <a:srgbClr val="4777A5">
+                  <a:lumMod val="98000"/>
+                </a:srgbClr>
+              </a:gs>
+              <a:gs pos="14000">
+                <a:schemeClr val="accent1">
+                  <a:lumMod val="75000"/>
+                </a:schemeClr>
+              </a:gs>
+              <a:gs pos="75000">
+                <a:schemeClr val="accent1">
+                  <a:lumMod val="60000"/>
+                  <a:lumOff val="40000"/>
+                </a:schemeClr>
+              </a:gs>
+              <a:gs pos="85000">
+                <a:schemeClr val="accent1">
+                  <a:lumMod val="20000"/>
+                  <a:lumOff val="80000"/>
+                </a:schemeClr>
+              </a:gs>
+            </a:gsLst>
+            <a:lin ang="16200000" scaled="1"/>
+          </a:gradFill>
+          <a:ln w="12700">
+            <a:solidFill>
+              <a:schemeClr val="tx2">
+                <a:lumMod val="75000"/>
+              </a:schemeClr>
+            </a:solidFill>
+          </a:ln>
+        </p:spPr>
+        <p:style>
+          <a:lnRef idx="2">
+            <a:schemeClr val="accent1">
+              <a:shade val="50000"/>
+            </a:schemeClr>
+          </a:lnRef>
+          <a:fillRef idx="1">
+            <a:schemeClr val="accent1"/>
+          </a:fillRef>
+          <a:effectRef idx="0">
+            <a:schemeClr val="accent1"/>
+          </a:effectRef>
+          <a:fontRef idx="minor">
+            <a:schemeClr val="lt1"/>
+          </a:fontRef>
+        </p:style>
+        <p:txBody>
+          <a:bodyPr rtlCol="0" anchor="ctr"/>
+          <a:lstStyle/>
+          <a:p>
+            <a:pPr algn="ctr"/>
+            <a:r>
+              <a:rPr lang="en-US" dirty="0"/>
+              <a:t>…</a:t>
+            </a:r>
+          </a:p>
+        </p:txBody>
+      </p:sp>
+      <p:sp>
+        <p:nvSpPr>
+          <p:cNvPr id="8" name="Rectangle 7"/>
+          <p:cNvSpPr/>
+          <p:nvPr/>
+        </p:nvSpPr>
+        <p:spPr>
+          <a:xfrm>
+            <a:off x="8159261" y="1315326"/>
+            <a:ext cx="1364567" cy="372795"/>
+          </a:xfrm>
+          <a:prstGeom prst="rect">
+            <a:avLst/>
+          </a:prstGeom>
+          <a:gradFill>
+            <a:gsLst>
+              <a:gs pos="10000">
+                <a:srgbClr val="4777A5">
+                  <a:lumMod val="98000"/>
+                </a:srgbClr>
+              </a:gs>
+              <a:gs pos="14000">
+                <a:schemeClr val="accent1">
+                  <a:lumMod val="75000"/>
+                </a:schemeClr>
+              </a:gs>
+              <a:gs pos="75000">
+                <a:schemeClr val="accent1">
+                  <a:lumMod val="60000"/>
+                  <a:lumOff val="40000"/>
+                </a:schemeClr>
+              </a:gs>
+              <a:gs pos="85000">
+                <a:schemeClr val="accent1">
+                  <a:lumMod val="20000"/>
+                  <a:lumOff val="80000"/>
+                </a:schemeClr>
+              </a:gs>
+            </a:gsLst>
+            <a:lin ang="16200000" scaled="1"/>
+          </a:gradFill>
+          <a:ln w="12700">
+            <a:solidFill>
+              <a:schemeClr val="tx2">
+                <a:lumMod val="75000"/>
+              </a:schemeClr>
+            </a:solidFill>
+          </a:ln>
+        </p:spPr>
+        <p:style>
+          <a:lnRef idx="2">
+            <a:schemeClr val="accent1">
+              <a:shade val="50000"/>
+            </a:schemeClr>
+          </a:lnRef>
+          <a:fillRef idx="1">
+            <a:schemeClr val="accent1"/>
+          </a:fillRef>
+          <a:effectRef idx="0">
+            <a:schemeClr val="accent1"/>
+          </a:effectRef>
+          <a:fontRef idx="minor">
+            <a:schemeClr val="lt1"/>
+          </a:fontRef>
+        </p:style>
+        <p:txBody>
+          <a:bodyPr rtlCol="0" anchor="ctr"/>
+          <a:lstStyle/>
+          <a:p>
+            <a:pPr algn="ctr"/>
+            <a:r>
+              <a:rPr lang="en-US" dirty="0"/>
+              <a:t>Dn-1</a:t>
+            </a:r>
+          </a:p>
+        </p:txBody>
+      </p:sp>
+      <p:sp>
+        <p:nvSpPr>
+          <p:cNvPr id="9" name="Rectangle 8"/>
+          <p:cNvSpPr/>
+          <p:nvPr/>
+        </p:nvSpPr>
+        <p:spPr>
+          <a:xfrm>
+            <a:off x="5486398" y="2223407"/>
+            <a:ext cx="1336431" cy="375599"/>
+          </a:xfrm>
+          <a:prstGeom prst="rect">
+            <a:avLst/>
+          </a:prstGeom>
+          <a:gradFill flip="none" rotWithShape="1">
+            <a:gsLst>
+              <a:gs pos="0">
+                <a:schemeClr val="accent2">
+                  <a:lumMod val="5000"/>
+                  <a:lumOff val="95000"/>
+                </a:schemeClr>
+              </a:gs>
+              <a:gs pos="16000">
+                <a:schemeClr val="accent2">
+                  <a:lumMod val="60000"/>
+                  <a:lumOff val="40000"/>
+                </a:schemeClr>
+              </a:gs>
+              <a:gs pos="64000">
+                <a:schemeClr val="accent2"/>
+              </a:gs>
+            </a:gsLst>
+            <a:lin ang="5400000" scaled="1"/>
+            <a:tileRect/>
+          </a:gradFill>
+          <a:ln w="12700"/>
+        </p:spPr>
+        <p:style>
+          <a:lnRef idx="2">
+            <a:schemeClr val="accent1">
+              <a:shade val="50000"/>
+            </a:schemeClr>
+          </a:lnRef>
+          <a:fillRef idx="1">
+            <a:schemeClr val="accent1"/>
+          </a:fillRef>
+          <a:effectRef idx="0">
+            <a:schemeClr val="accent1"/>
+          </a:effectRef>
+          <a:fontRef idx="minor">
+            <a:schemeClr val="lt1"/>
+          </a:fontRef>
+        </p:style>
+        <p:txBody>
+          <a:bodyPr rtlCol="0" anchor="ctr"/>
+          <a:lstStyle/>
+          <a:p>
+            <a:pPr algn="ctr"/>
+            <a:r>
+              <a:rPr lang="en-US" dirty="0"/>
+              <a:t>E0</a:t>
+            </a:r>
+          </a:p>
+        </p:txBody>
+      </p:sp>
+      <p:sp>
+        <p:nvSpPr>
+          <p:cNvPr id="10" name="Rectangle 9"/>
+          <p:cNvSpPr/>
+          <p:nvPr/>
+        </p:nvSpPr>
+        <p:spPr>
+          <a:xfrm>
+            <a:off x="9509757" y="2909198"/>
+            <a:ext cx="492369" cy="379827"/>
+          </a:xfrm>
+          <a:prstGeom prst="rect">
+            <a:avLst/>
+          </a:prstGeom>
+          <a:gradFill flip="none" rotWithShape="1">
+            <a:gsLst>
+              <a:gs pos="0">
+                <a:schemeClr val="accent1">
+                  <a:lumMod val="5000"/>
+                  <a:lumOff val="95000"/>
+                </a:schemeClr>
+              </a:gs>
+              <a:gs pos="25000">
+                <a:schemeClr val="accent1">
+                  <a:lumMod val="45000"/>
+                  <a:lumOff val="55000"/>
+                </a:schemeClr>
+              </a:gs>
+              <a:gs pos="43000">
+                <a:srgbClr val="00B0F0"/>
+              </a:gs>
+              <a:gs pos="100000">
+                <a:srgbClr val="00B0F0"/>
+              </a:gs>
+            </a:gsLst>
+            <a:lin ang="5400000" scaled="1"/>
+            <a:tileRect/>
+          </a:gradFill>
+          <a:ln w="12700"/>
+        </p:spPr>
+        <p:style>
+          <a:lnRef idx="2">
+            <a:schemeClr val="accent1">
+              <a:shade val="50000"/>
+            </a:schemeClr>
+          </a:lnRef>
+          <a:fillRef idx="1">
+            <a:schemeClr val="accent1"/>
+          </a:fillRef>
+          <a:effectRef idx="0">
+            <a:schemeClr val="accent1"/>
+          </a:effectRef>
+          <a:fontRef idx="minor">
+            <a:schemeClr val="lt1"/>
+          </a:fontRef>
+        </p:style>
+        <p:txBody>
+          <a:bodyPr rtlCol="0" anchor="ctr"/>
+          <a:lstStyle/>
+          <a:p>
+            <a:pPr algn="ctr"/>
+            <a:r>
+              <a:rPr lang="en-US" sz="1600" dirty="0"/>
+              <a:t>MD</a:t>
+            </a:r>
+          </a:p>
+        </p:txBody>
+      </p:sp>
+      <p:sp>
+        <p:nvSpPr>
+          <p:cNvPr id="14" name="Rectangle 13"/>
+          <p:cNvSpPr/>
+          <p:nvPr/>
+        </p:nvSpPr>
+        <p:spPr>
+          <a:xfrm>
+            <a:off x="6822829" y="2224158"/>
+            <a:ext cx="1364568" cy="379827"/>
+          </a:xfrm>
+          <a:prstGeom prst="rect">
+            <a:avLst/>
+          </a:prstGeom>
+          <a:gradFill flip="none" rotWithShape="1">
+            <a:gsLst>
+              <a:gs pos="0">
+                <a:schemeClr val="accent2">
+                  <a:lumMod val="5000"/>
+                  <a:lumOff val="95000"/>
+                </a:schemeClr>
+              </a:gs>
+              <a:gs pos="16000">
+                <a:schemeClr val="accent2">
+                  <a:lumMod val="60000"/>
+                  <a:lumOff val="40000"/>
+                </a:schemeClr>
+              </a:gs>
+              <a:gs pos="64000">
+                <a:schemeClr val="accent2"/>
+              </a:gs>
+            </a:gsLst>
+            <a:lin ang="5400000" scaled="1"/>
+            <a:tileRect/>
+          </a:gradFill>
+          <a:ln w="12700"/>
+        </p:spPr>
+        <p:style>
+          <a:lnRef idx="2">
+            <a:schemeClr val="accent1">
+              <a:shade val="50000"/>
+            </a:schemeClr>
+          </a:lnRef>
+          <a:fillRef idx="1">
+            <a:schemeClr val="accent1"/>
+          </a:fillRef>
+          <a:effectRef idx="0">
+            <a:schemeClr val="accent1"/>
+          </a:effectRef>
+          <a:fontRef idx="minor">
+            <a:schemeClr val="lt1"/>
+          </a:fontRef>
+        </p:style>
+        <p:txBody>
+          <a:bodyPr rtlCol="0" anchor="ctr"/>
+          <a:lstStyle/>
+          <a:p>
+            <a:pPr algn="ctr"/>
+            <a:r>
+              <a:rPr lang="en-US" dirty="0"/>
+              <a:t>…</a:t>
+            </a:r>
+          </a:p>
+        </p:txBody>
+      </p:sp>
+      <p:sp>
+        <p:nvSpPr>
+          <p:cNvPr id="15" name="Rectangle 14"/>
+          <p:cNvSpPr/>
+          <p:nvPr/>
+        </p:nvSpPr>
+        <p:spPr>
+          <a:xfrm>
+            <a:off x="8173327" y="2904950"/>
+            <a:ext cx="1336431" cy="379827"/>
+          </a:xfrm>
+          <a:prstGeom prst="rect">
+            <a:avLst/>
+          </a:prstGeom>
+          <a:gradFill flip="none" rotWithShape="1">
+            <a:gsLst>
+              <a:gs pos="0">
+                <a:schemeClr val="accent2">
+                  <a:lumMod val="5000"/>
+                  <a:lumOff val="95000"/>
+                </a:schemeClr>
+              </a:gs>
+              <a:gs pos="16000">
+                <a:schemeClr val="accent2">
+                  <a:lumMod val="60000"/>
+                  <a:lumOff val="40000"/>
+                </a:schemeClr>
+              </a:gs>
+              <a:gs pos="64000">
+                <a:schemeClr val="accent2"/>
+              </a:gs>
+            </a:gsLst>
+            <a:lin ang="5400000" scaled="1"/>
+            <a:tileRect/>
+          </a:gradFill>
+          <a:ln w="12700"/>
+        </p:spPr>
+        <p:style>
+          <a:lnRef idx="2">
+            <a:schemeClr val="accent1">
+              <a:shade val="50000"/>
+            </a:schemeClr>
+          </a:lnRef>
+          <a:fillRef idx="1">
+            <a:schemeClr val="accent1"/>
+          </a:fillRef>
+          <a:effectRef idx="0">
+            <a:schemeClr val="accent1"/>
+          </a:effectRef>
+          <a:fontRef idx="minor">
+            <a:schemeClr val="lt1"/>
+          </a:fontRef>
+        </p:style>
+        <p:txBody>
+          <a:bodyPr rtlCol="0" anchor="ctr"/>
+          <a:lstStyle/>
+          <a:p>
+            <a:pPr algn="ctr"/>
+            <a:r>
+              <a:rPr lang="en-US" dirty="0"/>
+              <a:t>En-1</a:t>
+            </a:r>
+          </a:p>
+        </p:txBody>
+      </p:sp>
+      <p:sp>
+        <p:nvSpPr>
+          <p:cNvPr id="19" name="TextBox 18"/>
+          <p:cNvSpPr txBox="1"/>
+          <p:nvPr/>
+        </p:nvSpPr>
+        <p:spPr>
+          <a:xfrm>
+            <a:off x="3115462" y="2242859"/>
+            <a:ext cx="1962397" cy="369332"/>
+          </a:xfrm>
+          <a:prstGeom prst="rect">
+            <a:avLst/>
+          </a:prstGeom>
+          <a:noFill/>
+        </p:spPr>
+        <p:txBody>
+          <a:bodyPr wrap="none" rtlCol="0">
+            <a:spAutoFit/>
+          </a:bodyPr>
+          <a:lstStyle/>
+          <a:p>
+            <a:r>
+              <a:rPr lang="en-US" dirty="0" err="1" smtClean="0"/>
+              <a:t>Ghi</a:t>
+            </a:r>
+            <a:r>
+              <a:rPr lang="en-US" dirty="0" smtClean="0"/>
+              <a:t> file n-1 </a:t>
+            </a:r>
+            <a:r>
+              <a:rPr lang="en-US" dirty="0" err="1" smtClean="0"/>
+              <a:t>lần</a:t>
+            </a:r>
+            <a:r>
+              <a:rPr lang="en-US" dirty="0" smtClean="0"/>
+              <a:t> </a:t>
+            </a:r>
+            <a:r>
+              <a:rPr lang="en-US" dirty="0" err="1" smtClean="0"/>
+              <a:t>đầu</a:t>
+            </a:r>
+            <a:endParaRPr lang="en-US" dirty="0"/>
+          </a:p>
+        </p:txBody>
+      </p:sp>
+      <p:sp>
+        <p:nvSpPr>
+          <p:cNvPr id="20" name="TextBox 19"/>
+          <p:cNvSpPr txBox="1"/>
+          <p:nvPr/>
+        </p:nvSpPr>
+        <p:spPr>
+          <a:xfrm>
+            <a:off x="3115461" y="2904950"/>
+            <a:ext cx="1635384" cy="369332"/>
+          </a:xfrm>
+          <a:prstGeom prst="rect">
+            <a:avLst/>
+          </a:prstGeom>
+          <a:noFill/>
+        </p:spPr>
+        <p:txBody>
+          <a:bodyPr wrap="none" rtlCol="0">
+            <a:spAutoFit/>
+          </a:bodyPr>
+          <a:lstStyle/>
+          <a:p>
+            <a:r>
+              <a:rPr lang="en-US" dirty="0" err="1" smtClean="0"/>
+              <a:t>Ghi</a:t>
+            </a:r>
+            <a:r>
+              <a:rPr lang="en-US" dirty="0" smtClean="0"/>
+              <a:t> file </a:t>
+            </a:r>
+            <a:r>
+              <a:rPr lang="en-US" dirty="0" err="1" smtClean="0"/>
+              <a:t>lần</a:t>
+            </a:r>
+            <a:r>
+              <a:rPr lang="en-US" dirty="0" smtClean="0"/>
+              <a:t> </a:t>
+            </a:r>
+            <a:r>
+              <a:rPr lang="en-US" dirty="0" err="1" smtClean="0"/>
+              <a:t>cuối</a:t>
+            </a:r>
+            <a:endParaRPr lang="en-US" dirty="0"/>
+          </a:p>
+        </p:txBody>
+      </p:sp>
+      <p:sp>
+        <p:nvSpPr>
+          <p:cNvPr id="21" name="TextBox 18"/>
+          <p:cNvSpPr txBox="1"/>
+          <p:nvPr/>
+        </p:nvSpPr>
+        <p:spPr>
+          <a:xfrm>
+            <a:off x="3115461" y="1325821"/>
+            <a:ext cx="1242648" cy="369332"/>
+          </a:xfrm>
+          <a:prstGeom prst="rect">
+            <a:avLst/>
+          </a:prstGeom>
+          <a:noFill/>
+        </p:spPr>
+        <p:txBody>
+          <a:bodyPr wrap="none" rtlCol="0">
+            <a:spAutoFit/>
+          </a:bodyPr>
+          <a:lstStyle>
+            <a:defPPr>
+              <a:defRPr lang="en-US"/>
+            </a:defPPr>
+            <a:lvl1pPr marL="0" algn="l" defTabSz="914400" rtl="0" eaLnBrk="1" latinLnBrk="0" hangingPunct="1">
+              <a:defRPr sz="1800" kern="1200">
+                <a:solidFill>
+                  <a:schemeClr val="tx1"/>
+                </a:solidFill>
+                <a:latin typeface="+mn-lt"/>
+                <a:ea typeface="+mn-ea"/>
+                <a:cs typeface="+mn-cs"/>
+              </a:defRPr>
+            </a:lvl1pPr>
+            <a:lvl2pPr marL="457200" algn="l" defTabSz="914400" rtl="0" eaLnBrk="1" latinLnBrk="0" hangingPunct="1">
+              <a:defRPr sz="1800" kern="1200">
+                <a:solidFill>
+                  <a:schemeClr val="tx1"/>
+                </a:solidFill>
+                <a:latin typeface="+mn-lt"/>
+                <a:ea typeface="+mn-ea"/>
+                <a:cs typeface="+mn-cs"/>
+              </a:defRPr>
+            </a:lvl2pPr>
+            <a:lvl3pPr marL="914400" algn="l" defTabSz="914400" rtl="0" eaLnBrk="1" latinLnBrk="0" hangingPunct="1">
+              <a:defRPr sz="1800" kern="1200">
+                <a:solidFill>
+                  <a:schemeClr val="tx1"/>
+                </a:solidFill>
+                <a:latin typeface="+mn-lt"/>
+                <a:ea typeface="+mn-ea"/>
+                <a:cs typeface="+mn-cs"/>
+              </a:defRPr>
+            </a:lvl3pPr>
+            <a:lvl4pPr marL="1371600" algn="l" defTabSz="914400" rtl="0" eaLnBrk="1" latinLnBrk="0" hangingPunct="1">
+              <a:defRPr sz="1800" kern="1200">
+                <a:solidFill>
+                  <a:schemeClr val="tx1"/>
+                </a:solidFill>
+                <a:latin typeface="+mn-lt"/>
+                <a:ea typeface="+mn-ea"/>
+                <a:cs typeface="+mn-cs"/>
+              </a:defRPr>
+            </a:lvl4pPr>
+            <a:lvl5pPr marL="1828800" algn="l" defTabSz="914400" rtl="0" eaLnBrk="1" latinLnBrk="0" hangingPunct="1">
+              <a:defRPr sz="1800" kern="1200">
+                <a:solidFill>
+                  <a:schemeClr val="tx1"/>
+                </a:solidFill>
+                <a:latin typeface="+mn-lt"/>
+                <a:ea typeface="+mn-ea"/>
+                <a:cs typeface="+mn-cs"/>
+              </a:defRPr>
+            </a:lvl5pPr>
+            <a:lvl6pPr marL="2286000" algn="l" defTabSz="914400" rtl="0" eaLnBrk="1" latinLnBrk="0" hangingPunct="1">
+              <a:defRPr sz="1800" kern="1200">
+                <a:solidFill>
+                  <a:schemeClr val="tx1"/>
+                </a:solidFill>
+                <a:latin typeface="+mn-lt"/>
+                <a:ea typeface="+mn-ea"/>
+                <a:cs typeface="+mn-cs"/>
+              </a:defRPr>
+            </a:lvl6pPr>
+            <a:lvl7pPr marL="2743200" algn="l" defTabSz="914400" rtl="0" eaLnBrk="1" latinLnBrk="0" hangingPunct="1">
+              <a:defRPr sz="1800" kern="1200">
+                <a:solidFill>
+                  <a:schemeClr val="tx1"/>
+                </a:solidFill>
+                <a:latin typeface="+mn-lt"/>
+                <a:ea typeface="+mn-ea"/>
+                <a:cs typeface="+mn-cs"/>
+              </a:defRPr>
+            </a:lvl7pPr>
+            <a:lvl8pPr marL="3200400" algn="l" defTabSz="914400" rtl="0" eaLnBrk="1" latinLnBrk="0" hangingPunct="1">
+              <a:defRPr sz="1800" kern="1200">
+                <a:solidFill>
+                  <a:schemeClr val="tx1"/>
+                </a:solidFill>
+                <a:latin typeface="+mn-lt"/>
+                <a:ea typeface="+mn-ea"/>
+                <a:cs typeface="+mn-cs"/>
+              </a:defRPr>
+            </a:lvl8pPr>
+            <a:lvl9pPr marL="3657600" algn="l" defTabSz="914400" rtl="0" eaLnBrk="1" latinLnBrk="0" hangingPunct="1">
+              <a:defRPr sz="1800" kern="1200">
+                <a:solidFill>
+                  <a:schemeClr val="tx1"/>
+                </a:solidFill>
+                <a:latin typeface="+mn-lt"/>
+                <a:ea typeface="+mn-ea"/>
+                <a:cs typeface="+mn-cs"/>
+              </a:defRPr>
+            </a:lvl9pPr>
+          </a:lstStyle>
+          <a:p>
+            <a:r>
+              <a:rPr lang="en-US" dirty="0" err="1" smtClean="0"/>
+              <a:t>Dữ</a:t>
+            </a:r>
+            <a:r>
+              <a:rPr lang="en-US" dirty="0" smtClean="0"/>
+              <a:t> </a:t>
+            </a:r>
+            <a:r>
+              <a:rPr lang="en-US" dirty="0" err="1" smtClean="0"/>
+              <a:t>liệu</a:t>
+            </a:r>
+            <a:r>
+              <a:rPr lang="en-US" dirty="0" smtClean="0"/>
+              <a:t> </a:t>
+            </a:r>
+            <a:r>
+              <a:rPr lang="en-US" dirty="0" err="1" smtClean="0"/>
+              <a:t>gốc</a:t>
+            </a:r>
+            <a:endParaRPr lang="en-US" dirty="0"/>
+          </a:p>
+        </p:txBody>
+      </p:sp>
+      <p:sp>
+        <p:nvSpPr>
+          <p:cNvPr id="23" name="Rectangle 22"/>
+          <p:cNvSpPr/>
+          <p:nvPr/>
+        </p:nvSpPr>
+        <p:spPr>
+          <a:xfrm>
+            <a:off x="9513125" y="3793002"/>
+            <a:ext cx="492369" cy="379827"/>
+          </a:xfrm>
+          <a:prstGeom prst="rect">
+            <a:avLst/>
+          </a:prstGeom>
+          <a:gradFill flip="none" rotWithShape="1">
+            <a:gsLst>
+              <a:gs pos="0">
+                <a:schemeClr val="accent1">
+                  <a:lumMod val="5000"/>
+                  <a:lumOff val="95000"/>
+                </a:schemeClr>
+              </a:gs>
+              <a:gs pos="25000">
+                <a:schemeClr val="accent1">
+                  <a:lumMod val="45000"/>
+                  <a:lumOff val="55000"/>
+                </a:schemeClr>
+              </a:gs>
+              <a:gs pos="43000">
+                <a:srgbClr val="00B0F0"/>
+              </a:gs>
+              <a:gs pos="100000">
+                <a:srgbClr val="00B0F0"/>
+              </a:gs>
+            </a:gsLst>
+            <a:lin ang="5400000" scaled="1"/>
+            <a:tileRect/>
+          </a:gradFill>
+          <a:ln w="12700"/>
+        </p:spPr>
+        <p:style>
+          <a:lnRef idx="2">
+            <a:schemeClr val="accent1">
+              <a:shade val="50000"/>
+            </a:schemeClr>
+          </a:lnRef>
+          <a:fillRef idx="1">
+            <a:schemeClr val="accent1"/>
+          </a:fillRef>
+          <a:effectRef idx="0">
+            <a:schemeClr val="accent1"/>
+          </a:effectRef>
+          <a:fontRef idx="minor">
+            <a:schemeClr val="lt1"/>
+          </a:fontRef>
+        </p:style>
+        <p:txBody>
+          <a:bodyPr rtlCol="0" anchor="ctr"/>
+          <a:lstStyle/>
+          <a:p>
+            <a:pPr algn="ctr"/>
+            <a:r>
+              <a:rPr lang="en-US" sz="1600" dirty="0"/>
+              <a:t>MD</a:t>
+            </a:r>
+          </a:p>
+        </p:txBody>
+      </p:sp>
+      <p:sp>
+        <p:nvSpPr>
+          <p:cNvPr id="24" name="Rectangle 23"/>
+          <p:cNvSpPr/>
+          <p:nvPr/>
+        </p:nvSpPr>
+        <p:spPr>
+          <a:xfrm>
+            <a:off x="5486395" y="3793004"/>
+            <a:ext cx="1336433" cy="379827"/>
+          </a:xfrm>
+          <a:prstGeom prst="rect">
+            <a:avLst/>
+          </a:prstGeom>
+          <a:gradFill flip="none" rotWithShape="1">
+            <a:gsLst>
+              <a:gs pos="0">
+                <a:schemeClr val="accent6">
+                  <a:lumMod val="5000"/>
+                  <a:lumOff val="95000"/>
+                </a:schemeClr>
+              </a:gs>
+              <a:gs pos="15000">
+                <a:schemeClr val="accent6">
+                  <a:lumMod val="45000"/>
+                  <a:lumOff val="55000"/>
+                </a:schemeClr>
+              </a:gs>
+              <a:gs pos="35000">
+                <a:srgbClr val="92D050"/>
+              </a:gs>
+              <a:gs pos="100000">
+                <a:srgbClr val="00B050"/>
+              </a:gs>
+            </a:gsLst>
+            <a:lin ang="5400000" scaled="1"/>
+            <a:tileRect/>
+          </a:gradFill>
+          <a:ln w="12700"/>
+        </p:spPr>
+        <p:style>
+          <a:lnRef idx="2">
+            <a:schemeClr val="accent1">
+              <a:shade val="50000"/>
+            </a:schemeClr>
+          </a:lnRef>
+          <a:fillRef idx="1">
+            <a:schemeClr val="accent1"/>
+          </a:fillRef>
+          <a:effectRef idx="0">
+            <a:schemeClr val="accent1"/>
+          </a:effectRef>
+          <a:fontRef idx="minor">
+            <a:schemeClr val="lt1"/>
+          </a:fontRef>
+        </p:style>
+        <p:txBody>
+          <a:bodyPr rtlCol="0" anchor="ctr"/>
+          <a:lstStyle/>
+          <a:p>
+            <a:pPr algn="ctr"/>
+            <a:r>
+              <a:rPr lang="en-US" dirty="0"/>
+              <a:t>E0-MD</a:t>
+            </a:r>
+          </a:p>
+        </p:txBody>
+      </p:sp>
+      <p:sp>
+        <p:nvSpPr>
+          <p:cNvPr id="25" name="Rectangle 24"/>
+          <p:cNvSpPr/>
+          <p:nvPr/>
+        </p:nvSpPr>
+        <p:spPr>
+          <a:xfrm>
+            <a:off x="6836896" y="3793002"/>
+            <a:ext cx="1336431" cy="383078"/>
+          </a:xfrm>
+          <a:prstGeom prst="rect">
+            <a:avLst/>
+          </a:prstGeom>
+          <a:gradFill flip="none" rotWithShape="1">
+            <a:gsLst>
+              <a:gs pos="0">
+                <a:schemeClr val="accent6">
+                  <a:lumMod val="5000"/>
+                  <a:lumOff val="95000"/>
+                </a:schemeClr>
+              </a:gs>
+              <a:gs pos="15000">
+                <a:schemeClr val="accent6">
+                  <a:lumMod val="45000"/>
+                  <a:lumOff val="55000"/>
+                </a:schemeClr>
+              </a:gs>
+              <a:gs pos="35000">
+                <a:srgbClr val="92D050"/>
+              </a:gs>
+              <a:gs pos="100000">
+                <a:srgbClr val="00B050"/>
+              </a:gs>
+            </a:gsLst>
+            <a:lin ang="5400000" scaled="1"/>
+            <a:tileRect/>
+          </a:gradFill>
+          <a:ln w="12700"/>
+        </p:spPr>
+        <p:style>
+          <a:lnRef idx="2">
+            <a:schemeClr val="accent1">
+              <a:shade val="50000"/>
+            </a:schemeClr>
+          </a:lnRef>
+          <a:fillRef idx="1">
+            <a:schemeClr val="accent1"/>
+          </a:fillRef>
+          <a:effectRef idx="0">
+            <a:schemeClr val="accent1"/>
+          </a:effectRef>
+          <a:fontRef idx="minor">
+            <a:schemeClr val="lt1"/>
+          </a:fontRef>
+        </p:style>
+        <p:txBody>
+          <a:bodyPr rtlCol="0" anchor="ctr"/>
+          <a:lstStyle/>
+          <a:p>
+            <a:pPr algn="ctr"/>
+            <a:r>
+              <a:rPr lang="en-US" dirty="0"/>
+              <a:t>…</a:t>
+            </a:r>
+          </a:p>
+        </p:txBody>
+      </p:sp>
+      <p:sp>
+        <p:nvSpPr>
+          <p:cNvPr id="26" name="Rectangle 25"/>
+          <p:cNvSpPr/>
+          <p:nvPr/>
+        </p:nvSpPr>
+        <p:spPr>
+          <a:xfrm>
+            <a:off x="8187397" y="3793003"/>
+            <a:ext cx="1336431" cy="379827"/>
+          </a:xfrm>
+          <a:prstGeom prst="rect">
+            <a:avLst/>
+          </a:prstGeom>
+          <a:gradFill flip="none" rotWithShape="1">
+            <a:gsLst>
+              <a:gs pos="0">
+                <a:schemeClr val="accent6">
+                  <a:lumMod val="5000"/>
+                  <a:lumOff val="95000"/>
+                </a:schemeClr>
+              </a:gs>
+              <a:gs pos="15000">
+                <a:schemeClr val="accent6">
+                  <a:lumMod val="45000"/>
+                  <a:lumOff val="55000"/>
+                </a:schemeClr>
+              </a:gs>
+              <a:gs pos="35000">
+                <a:srgbClr val="92D050"/>
+              </a:gs>
+              <a:gs pos="100000">
+                <a:srgbClr val="00B050"/>
+              </a:gs>
+            </a:gsLst>
+            <a:lin ang="5400000" scaled="1"/>
+            <a:tileRect/>
+          </a:gradFill>
+          <a:ln w="12700"/>
+        </p:spPr>
+        <p:style>
+          <a:lnRef idx="2">
+            <a:schemeClr val="accent1">
+              <a:shade val="50000"/>
+            </a:schemeClr>
+          </a:lnRef>
+          <a:fillRef idx="1">
+            <a:schemeClr val="accent1"/>
+          </a:fillRef>
+          <a:effectRef idx="0">
+            <a:schemeClr val="accent1"/>
+          </a:effectRef>
+          <a:fontRef idx="minor">
+            <a:schemeClr val="lt1"/>
+          </a:fontRef>
+        </p:style>
+        <p:txBody>
+          <a:bodyPr rtlCol="0" anchor="ctr"/>
+          <a:lstStyle/>
+          <a:p>
+            <a:pPr algn="ctr"/>
+            <a:r>
+              <a:rPr lang="en-US" dirty="0"/>
+              <a:t>En-1</a:t>
+            </a:r>
+          </a:p>
+        </p:txBody>
+      </p:sp>
+      <p:sp>
+        <p:nvSpPr>
+          <p:cNvPr id="27" name="TextBox 18"/>
+          <p:cNvSpPr txBox="1"/>
+          <p:nvPr/>
+        </p:nvSpPr>
+        <p:spPr>
+          <a:xfrm>
+            <a:off x="3111677" y="3798250"/>
+            <a:ext cx="1210588" cy="369332"/>
+          </a:xfrm>
+          <a:prstGeom prst="rect">
+            <a:avLst/>
+          </a:prstGeom>
+          <a:noFill/>
+        </p:spPr>
+        <p:txBody>
+          <a:bodyPr wrap="none" rtlCol="0">
+            <a:spAutoFit/>
+          </a:bodyPr>
+          <a:lstStyle>
+            <a:defPPr>
+              <a:defRPr lang="en-US"/>
+            </a:defPPr>
+            <a:lvl1pPr marL="0" algn="l" defTabSz="914400" rtl="0" eaLnBrk="1" latinLnBrk="0" hangingPunct="1">
+              <a:defRPr sz="1800" kern="1200">
+                <a:solidFill>
+                  <a:schemeClr val="tx1"/>
+                </a:solidFill>
+                <a:latin typeface="+mn-lt"/>
+                <a:ea typeface="+mn-ea"/>
+                <a:cs typeface="+mn-cs"/>
+              </a:defRPr>
+            </a:lvl1pPr>
+            <a:lvl2pPr marL="457200" algn="l" defTabSz="914400" rtl="0" eaLnBrk="1" latinLnBrk="0" hangingPunct="1">
+              <a:defRPr sz="1800" kern="1200">
+                <a:solidFill>
+                  <a:schemeClr val="tx1"/>
+                </a:solidFill>
+                <a:latin typeface="+mn-lt"/>
+                <a:ea typeface="+mn-ea"/>
+                <a:cs typeface="+mn-cs"/>
+              </a:defRPr>
+            </a:lvl2pPr>
+            <a:lvl3pPr marL="914400" algn="l" defTabSz="914400" rtl="0" eaLnBrk="1" latinLnBrk="0" hangingPunct="1">
+              <a:defRPr sz="1800" kern="1200">
+                <a:solidFill>
+                  <a:schemeClr val="tx1"/>
+                </a:solidFill>
+                <a:latin typeface="+mn-lt"/>
+                <a:ea typeface="+mn-ea"/>
+                <a:cs typeface="+mn-cs"/>
+              </a:defRPr>
+            </a:lvl3pPr>
+            <a:lvl4pPr marL="1371600" algn="l" defTabSz="914400" rtl="0" eaLnBrk="1" latinLnBrk="0" hangingPunct="1">
+              <a:defRPr sz="1800" kern="1200">
+                <a:solidFill>
+                  <a:schemeClr val="tx1"/>
+                </a:solidFill>
+                <a:latin typeface="+mn-lt"/>
+                <a:ea typeface="+mn-ea"/>
+                <a:cs typeface="+mn-cs"/>
+              </a:defRPr>
+            </a:lvl4pPr>
+            <a:lvl5pPr marL="1828800" algn="l" defTabSz="914400" rtl="0" eaLnBrk="1" latinLnBrk="0" hangingPunct="1">
+              <a:defRPr sz="1800" kern="1200">
+                <a:solidFill>
+                  <a:schemeClr val="tx1"/>
+                </a:solidFill>
+                <a:latin typeface="+mn-lt"/>
+                <a:ea typeface="+mn-ea"/>
+                <a:cs typeface="+mn-cs"/>
+              </a:defRPr>
+            </a:lvl5pPr>
+            <a:lvl6pPr marL="2286000" algn="l" defTabSz="914400" rtl="0" eaLnBrk="1" latinLnBrk="0" hangingPunct="1">
+              <a:defRPr sz="1800" kern="1200">
+                <a:solidFill>
+                  <a:schemeClr val="tx1"/>
+                </a:solidFill>
+                <a:latin typeface="+mn-lt"/>
+                <a:ea typeface="+mn-ea"/>
+                <a:cs typeface="+mn-cs"/>
+              </a:defRPr>
+            </a:lvl6pPr>
+            <a:lvl7pPr marL="2743200" algn="l" defTabSz="914400" rtl="0" eaLnBrk="1" latinLnBrk="0" hangingPunct="1">
+              <a:defRPr sz="1800" kern="1200">
+                <a:solidFill>
+                  <a:schemeClr val="tx1"/>
+                </a:solidFill>
+                <a:latin typeface="+mn-lt"/>
+                <a:ea typeface="+mn-ea"/>
+                <a:cs typeface="+mn-cs"/>
+              </a:defRPr>
+            </a:lvl7pPr>
+            <a:lvl8pPr marL="3200400" algn="l" defTabSz="914400" rtl="0" eaLnBrk="1" latinLnBrk="0" hangingPunct="1">
+              <a:defRPr sz="1800" kern="1200">
+                <a:solidFill>
+                  <a:schemeClr val="tx1"/>
+                </a:solidFill>
+                <a:latin typeface="+mn-lt"/>
+                <a:ea typeface="+mn-ea"/>
+                <a:cs typeface="+mn-cs"/>
+              </a:defRPr>
+            </a:lvl8pPr>
+            <a:lvl9pPr marL="3657600" algn="l" defTabSz="914400" rtl="0" eaLnBrk="1" latinLnBrk="0" hangingPunct="1">
+              <a:defRPr sz="1800" kern="1200">
+                <a:solidFill>
+                  <a:schemeClr val="tx1"/>
+                </a:solidFill>
+                <a:latin typeface="+mn-lt"/>
+                <a:ea typeface="+mn-ea"/>
+                <a:cs typeface="+mn-cs"/>
+              </a:defRPr>
+            </a:lvl9pPr>
+          </a:lstStyle>
+          <a:p>
+            <a:r>
+              <a:rPr lang="en-US" dirty="0" err="1" smtClean="0"/>
+              <a:t>Dữ</a:t>
+            </a:r>
+            <a:r>
+              <a:rPr lang="en-US" dirty="0" smtClean="0"/>
+              <a:t> </a:t>
+            </a:r>
+            <a:r>
+              <a:rPr lang="en-US" dirty="0" err="1" smtClean="0"/>
+              <a:t>liệu</a:t>
+            </a:r>
+            <a:r>
+              <a:rPr lang="en-US" dirty="0" smtClean="0"/>
+              <a:t> </a:t>
+            </a:r>
+            <a:r>
+              <a:rPr lang="en-US" dirty="0" err="1" smtClean="0"/>
+              <a:t>mã</a:t>
+            </a:r>
+            <a:endParaRPr lang="en-US" dirty="0"/>
+          </a:p>
+        </p:txBody>
+      </p:sp>
+      <p:cxnSp>
+        <p:nvCxnSpPr>
+          <p:cNvPr id="29" name="Straight Connector 28"/>
+          <p:cNvCxnSpPr/>
+          <p:nvPr/>
+        </p:nvCxnSpPr>
+        <p:spPr>
+          <a:xfrm>
+            <a:off x="5486399" y="1688121"/>
+            <a:ext cx="11775" cy="554738"/>
+          </a:xfrm>
+          <a:prstGeom prst="line">
+            <a:avLst/>
+          </a:prstGeom>
+        </p:spPr>
+        <p:style>
+          <a:lnRef idx="1">
+            <a:schemeClr val="accent1"/>
+          </a:lnRef>
+          <a:fillRef idx="0">
+            <a:schemeClr val="accent1"/>
+          </a:fillRef>
+          <a:effectRef idx="0">
+            <a:schemeClr val="accent1"/>
+          </a:effectRef>
+          <a:fontRef idx="minor">
+            <a:schemeClr val="tx1"/>
+          </a:fontRef>
+        </p:style>
+      </p:cxnSp>
+      <p:cxnSp>
+        <p:nvCxnSpPr>
+          <p:cNvPr id="31" name="Straight Connector 30"/>
+          <p:cNvCxnSpPr/>
+          <p:nvPr/>
+        </p:nvCxnSpPr>
+        <p:spPr>
+          <a:xfrm>
+            <a:off x="6822830" y="1702185"/>
+            <a:ext cx="5451" cy="509962"/>
+          </a:xfrm>
+          <a:prstGeom prst="line">
+            <a:avLst/>
+          </a:prstGeom>
+        </p:spPr>
+        <p:style>
+          <a:lnRef idx="1">
+            <a:schemeClr val="accent1"/>
+          </a:lnRef>
+          <a:fillRef idx="0">
+            <a:schemeClr val="accent1"/>
+          </a:fillRef>
+          <a:effectRef idx="0">
+            <a:schemeClr val="accent1"/>
+          </a:effectRef>
+          <a:fontRef idx="minor">
+            <a:schemeClr val="tx1"/>
+          </a:fontRef>
+        </p:style>
+      </p:cxnSp>
+      <p:cxnSp>
+        <p:nvCxnSpPr>
+          <p:cNvPr id="34" name="Straight Connector 33"/>
+          <p:cNvCxnSpPr/>
+          <p:nvPr/>
+        </p:nvCxnSpPr>
+        <p:spPr>
+          <a:xfrm>
+            <a:off x="10002126" y="3284777"/>
+            <a:ext cx="0" cy="516723"/>
+          </a:xfrm>
+          <a:prstGeom prst="line">
+            <a:avLst/>
+          </a:prstGeom>
+        </p:spPr>
+        <p:style>
+          <a:lnRef idx="1">
+            <a:schemeClr val="accent1"/>
+          </a:lnRef>
+          <a:fillRef idx="0">
+            <a:schemeClr val="accent1"/>
+          </a:fillRef>
+          <a:effectRef idx="0">
+            <a:schemeClr val="accent1"/>
+          </a:effectRef>
+          <a:fontRef idx="minor">
+            <a:schemeClr val="tx1"/>
+          </a:fontRef>
+        </p:style>
+      </p:cxnSp>
+      <p:cxnSp>
+        <p:nvCxnSpPr>
+          <p:cNvPr id="37" name="Straight Connector 36"/>
+          <p:cNvCxnSpPr/>
+          <p:nvPr/>
+        </p:nvCxnSpPr>
+        <p:spPr>
+          <a:xfrm>
+            <a:off x="6822828" y="2560611"/>
+            <a:ext cx="14068" cy="1237372"/>
+          </a:xfrm>
+          <a:prstGeom prst="line">
+            <a:avLst/>
+          </a:prstGeom>
+        </p:spPr>
+        <p:style>
+          <a:lnRef idx="1">
+            <a:schemeClr val="accent1"/>
+          </a:lnRef>
+          <a:fillRef idx="0">
+            <a:schemeClr val="accent1"/>
+          </a:fillRef>
+          <a:effectRef idx="0">
+            <a:schemeClr val="accent1"/>
+          </a:effectRef>
+          <a:fontRef idx="minor">
+            <a:schemeClr val="tx1"/>
+          </a:fontRef>
+        </p:style>
+      </p:cxnSp>
+      <p:cxnSp>
+        <p:nvCxnSpPr>
+          <p:cNvPr id="39" name="Straight Connector 38"/>
+          <p:cNvCxnSpPr/>
+          <p:nvPr/>
+        </p:nvCxnSpPr>
+        <p:spPr>
+          <a:xfrm>
+            <a:off x="8173328" y="2612191"/>
+            <a:ext cx="14068" cy="1196344"/>
+          </a:xfrm>
+          <a:prstGeom prst="line">
+            <a:avLst/>
+          </a:prstGeom>
+        </p:spPr>
+        <p:style>
+          <a:lnRef idx="1">
+            <a:schemeClr val="accent1"/>
+          </a:lnRef>
+          <a:fillRef idx="0">
+            <a:schemeClr val="accent1"/>
+          </a:fillRef>
+          <a:effectRef idx="0">
+            <a:schemeClr val="accent1"/>
+          </a:effectRef>
+          <a:fontRef idx="minor">
+            <a:schemeClr val="tx1"/>
+          </a:fontRef>
+        </p:style>
+      </p:cxnSp>
+      <p:sp>
+        <p:nvSpPr>
+          <p:cNvPr id="2" name="TextBox 1"/>
+          <p:cNvSpPr txBox="1"/>
+          <p:nvPr/>
+        </p:nvSpPr>
+        <p:spPr>
+          <a:xfrm>
+            <a:off x="850006" y="5885645"/>
+            <a:ext cx="5803576" cy="584775"/>
+          </a:xfrm>
+          <a:prstGeom prst="rect">
+            <a:avLst/>
+          </a:prstGeom>
+          <a:noFill/>
+        </p:spPr>
+        <p:txBody>
+          <a:bodyPr wrap="none" rtlCol="0">
+            <a:spAutoFit/>
+          </a:bodyPr>
+          <a:lstStyle/>
+          <a:p>
+            <a:r>
+              <a:rPr lang="en-US" sz="3200" dirty="0" err="1" smtClean="0"/>
+              <a:t>Ghi</a:t>
+            </a:r>
+            <a:r>
+              <a:rPr lang="en-US" sz="3200" dirty="0" smtClean="0"/>
+              <a:t> </a:t>
+            </a:r>
+            <a:r>
+              <a:rPr lang="en-US" sz="3200" dirty="0" err="1" smtClean="0"/>
+              <a:t>thông</a:t>
+            </a:r>
+            <a:r>
+              <a:rPr lang="en-US" sz="3200" dirty="0" smtClean="0"/>
+              <a:t> tin </a:t>
+            </a:r>
+            <a:r>
+              <a:rPr lang="en-US" sz="3200" dirty="0" err="1" smtClean="0"/>
+              <a:t>mã</a:t>
+            </a:r>
+            <a:r>
+              <a:rPr lang="en-US" sz="3200" dirty="0" smtClean="0"/>
+              <a:t> </a:t>
+            </a:r>
+            <a:r>
+              <a:rPr lang="en-US" sz="3200" dirty="0" err="1" smtClean="0"/>
+              <a:t>hóa</a:t>
+            </a:r>
+            <a:r>
+              <a:rPr lang="en-US" sz="3200" dirty="0" smtClean="0"/>
+              <a:t> </a:t>
+            </a:r>
+            <a:r>
+              <a:rPr lang="en-US" sz="3200" dirty="0" err="1" smtClean="0"/>
+              <a:t>vào</a:t>
+            </a:r>
+            <a:r>
+              <a:rPr lang="en-US" sz="3200" dirty="0" smtClean="0"/>
+              <a:t> </a:t>
+            </a:r>
+            <a:r>
+              <a:rPr lang="en-US" sz="3200" dirty="0" err="1" smtClean="0"/>
+              <a:t>cuối</a:t>
+            </a:r>
+            <a:r>
+              <a:rPr lang="en-US" sz="3200" dirty="0" smtClean="0"/>
+              <a:t> file</a:t>
+            </a:r>
+            <a:endParaRPr lang="en-US" sz="3200" dirty="0"/>
+          </a:p>
+        </p:txBody>
+      </p:sp>
+      <p:cxnSp>
+        <p:nvCxnSpPr>
+          <p:cNvPr id="32" name="Straight Connector 31"/>
+          <p:cNvCxnSpPr/>
+          <p:nvPr/>
+        </p:nvCxnSpPr>
+        <p:spPr>
+          <a:xfrm>
+            <a:off x="5480946" y="2579433"/>
+            <a:ext cx="14068" cy="1237372"/>
+          </a:xfrm>
+          <a:prstGeom prst="line">
+            <a:avLst/>
+          </a:prstGeom>
+        </p:spPr>
+        <p:style>
+          <a:lnRef idx="1">
+            <a:schemeClr val="accent1"/>
+          </a:lnRef>
+          <a:fillRef idx="0">
+            <a:schemeClr val="accent1"/>
+          </a:fillRef>
+          <a:effectRef idx="0">
+            <a:schemeClr val="accent1"/>
+          </a:effectRef>
+          <a:fontRef idx="minor">
+            <a:schemeClr val="tx1"/>
+          </a:fontRef>
+        </p:style>
+      </p:cxnSp>
+      <p:cxnSp>
+        <p:nvCxnSpPr>
+          <p:cNvPr id="28" name="Straight Connector 27"/>
+          <p:cNvCxnSpPr/>
+          <p:nvPr/>
+        </p:nvCxnSpPr>
+        <p:spPr>
+          <a:xfrm>
+            <a:off x="9509757" y="3274282"/>
+            <a:ext cx="14071" cy="510223"/>
+          </a:xfrm>
+          <a:prstGeom prst="line">
+            <a:avLst/>
+          </a:prstGeom>
+          <a:ln>
+            <a:prstDash val="sysDash"/>
+          </a:ln>
+        </p:spPr>
+        <p:style>
+          <a:lnRef idx="1">
+            <a:schemeClr val="accent1"/>
+          </a:lnRef>
+          <a:fillRef idx="0">
+            <a:schemeClr val="accent1"/>
+          </a:fillRef>
+          <a:effectRef idx="0">
+            <a:schemeClr val="accent1"/>
+          </a:effectRef>
+          <a:fontRef idx="minor">
+            <a:schemeClr val="tx1"/>
+          </a:fontRef>
+        </p:style>
+      </p:cxnSp>
+      <p:pic>
+        <p:nvPicPr>
+          <p:cNvPr id="36" name="Picture 35"/>
+          <p:cNvPicPr>
+            <a:picLocks noChangeAspect="1"/>
+          </p:cNvPicPr>
+          <p:nvPr/>
+        </p:nvPicPr>
+        <p:blipFill>
+          <a:blip r:embed="rId2"/>
+          <a:stretch>
+            <a:fillRect/>
+          </a:stretch>
+        </p:blipFill>
+        <p:spPr>
+          <a:xfrm>
+            <a:off x="1772918" y="2042273"/>
+            <a:ext cx="8387082" cy="1408298"/>
+          </a:xfrm>
+          <a:prstGeom prst="rect">
+            <a:avLst/>
+          </a:prstGeom>
+        </p:spPr>
+      </p:pic>
+    </p:spTree>
+    <p:extLst>
+      <p:ext uri="{BB962C8B-B14F-4D97-AF65-F5344CB8AC3E}">
+        <p14:creationId xmlns:p14="http://schemas.microsoft.com/office/powerpoint/2010/main" val="3549116938"/>
+      </p:ext>
+    </p:extLst>
+  </p:cSld>
+  <p:clrMapOvr>
+    <a:masterClrMapping/>
+  </p:clrMapOvr>
+  <p:timing>
+    <p:tnLst>
+      <p:par>
+        <p:cTn id="1" dur="indefinite" restart="never" nodeType="tmRoot"/>
+      </p:par>
+    </p:tnLst>
+  </p:timing>
+</p:sld>
+</file>
+
+<file path=ppt/slides/slide11.xml><?xml version="1.0" encoding="utf-8"?>
+<p:sld xmlns:a="http://schemas.openxmlformats.org/drawingml/2006/main" xmlns:r="http://schemas.openxmlformats.org/officeDocument/2006/relationships" xmlns:p="http://schemas.openxmlformats.org/presentationml/2006/main">
+  <p:cSld>
+    <p:spTree>
+      <p:nvGrpSpPr>
+        <p:cNvPr id="1" name=""/>
+        <p:cNvGrpSpPr/>
+        <p:nvPr/>
+      </p:nvGrpSpPr>
+      <p:grpSpPr>
+        <a:xfrm>
+          <a:off x="0" y="0"/>
+          <a:ext cx="0" cy="0"/>
+          <a:chOff x="0" y="0"/>
+          <a:chExt cx="0" cy="0"/>
+        </a:xfrm>
+      </p:grpSpPr>
+      <p:sp>
+        <p:nvSpPr>
           <p:cNvPr id="4" name="Rounded Rectangle 3"/>
           <p:cNvSpPr/>
           <p:nvPr/>
@@ -11243,7 +12172,7 @@
 </p:sld>
 </file>
 
-<file path=ppt/slides/slide11.xml><?xml version="1.0" encoding="utf-8"?>
+<file path=ppt/slides/slide12.xml><?xml version="1.0" encoding="utf-8"?>
 <p:sld xmlns:a="http://schemas.openxmlformats.org/drawingml/2006/main" xmlns:r="http://schemas.openxmlformats.org/officeDocument/2006/relationships" xmlns:p="http://schemas.openxmlformats.org/presentationml/2006/main">
   <p:cSld>
     <p:spTree>
@@ -11577,7 +12506,7 @@
 </p:sld>
 </file>
 
-<file path=ppt/slides/slide12.xml><?xml version="1.0" encoding="utf-8"?>
+<file path=ppt/slides/slide13.xml><?xml version="1.0" encoding="utf-8"?>
 <p:sld xmlns:a="http://schemas.openxmlformats.org/drawingml/2006/main" xmlns:r="http://schemas.openxmlformats.org/officeDocument/2006/relationships" xmlns:p="http://schemas.openxmlformats.org/presentationml/2006/main">
   <p:cSld>
     <p:spTree>
@@ -11953,7 +12882,7 @@
 </p:sld>
 </file>
 
-<file path=ppt/slides/slide13.xml><?xml version="1.0" encoding="utf-8"?>
+<file path=ppt/slides/slide14.xml><?xml version="1.0" encoding="utf-8"?>
 <p:sld xmlns:a="http://schemas.openxmlformats.org/drawingml/2006/main" xmlns:r="http://schemas.openxmlformats.org/officeDocument/2006/relationships" xmlns:p="http://schemas.openxmlformats.org/presentationml/2006/main">
   <p:cSld>
     <p:spTree>
@@ -12766,11 +13695,6 @@
               </a:rPr>
               <a:t>Thread</a:t>
             </a:r>
-            <a:endParaRPr lang="en-US" sz="2400" b="1" dirty="0">
-              <a:solidFill>
-                <a:schemeClr val="tx1"/>
-              </a:solidFill>
-            </a:endParaRPr>
           </a:p>
         </p:txBody>
       </p:sp>
@@ -13214,11 +14138,6 @@
               </a:rPr>
               <a:t>Manager  Hook</a:t>
             </a:r>
-            <a:endParaRPr lang="en-US" sz="2400" b="1" dirty="0">
-              <a:solidFill>
-                <a:schemeClr val="tx1"/>
-              </a:solidFill>
-            </a:endParaRPr>
           </a:p>
         </p:txBody>
       </p:sp>
@@ -14605,11 +15524,6 @@
               </a:rPr>
               <a:t>Thread</a:t>
             </a:r>
-            <a:endParaRPr lang="en-US" sz="2400" b="1" dirty="0">
-              <a:solidFill>
-                <a:schemeClr val="tx1"/>
-              </a:solidFill>
-            </a:endParaRPr>
           </a:p>
         </p:txBody>
       </p:sp>
@@ -18395,6 +19309,777 @@
       </p:grpSpPr>
       <p:sp>
         <p:nvSpPr>
+          <p:cNvPr id="4" name="Rectangle 3"/>
+          <p:cNvSpPr/>
+          <p:nvPr/>
+        </p:nvSpPr>
+        <p:spPr>
+          <a:xfrm>
+            <a:off x="2133600" y="1689100"/>
+            <a:ext cx="3784600" cy="533400"/>
+          </a:xfrm>
+          <a:prstGeom prst="rect">
+            <a:avLst/>
+          </a:prstGeom>
+          <a:gradFill>
+            <a:gsLst>
+              <a:gs pos="0">
+                <a:schemeClr val="accent1">
+                  <a:lumMod val="5000"/>
+                  <a:lumOff val="95000"/>
+                </a:schemeClr>
+              </a:gs>
+              <a:gs pos="40000">
+                <a:schemeClr val="accent1">
+                  <a:lumMod val="45000"/>
+                  <a:lumOff val="55000"/>
+                </a:schemeClr>
+              </a:gs>
+              <a:gs pos="72000">
+                <a:schemeClr val="accent1">
+                  <a:lumMod val="60000"/>
+                  <a:lumOff val="40000"/>
+                </a:schemeClr>
+              </a:gs>
+              <a:gs pos="100000">
+                <a:schemeClr val="accent1">
+                  <a:lumMod val="75000"/>
+                </a:schemeClr>
+              </a:gs>
+            </a:gsLst>
+            <a:lin ang="5400000" scaled="1"/>
+          </a:gradFill>
+          <a:ln w="25400"/>
+        </p:spPr>
+        <p:style>
+          <a:lnRef idx="2">
+            <a:schemeClr val="accent1">
+              <a:shade val="50000"/>
+            </a:schemeClr>
+          </a:lnRef>
+          <a:fillRef idx="1">
+            <a:schemeClr val="accent1"/>
+          </a:fillRef>
+          <a:effectRef idx="0">
+            <a:schemeClr val="accent1"/>
+          </a:effectRef>
+          <a:fontRef idx="minor">
+            <a:schemeClr val="lt1"/>
+          </a:fontRef>
+        </p:style>
+        <p:txBody>
+          <a:bodyPr rtlCol="0" anchor="ctr"/>
+          <a:lstStyle/>
+          <a:p>
+            <a:pPr algn="ctr"/>
+            <a:r>
+              <a:rPr lang="en-US" sz="2000" b="1" dirty="0" smtClean="0">
+                <a:solidFill>
+                  <a:schemeClr val="tx1"/>
+                </a:solidFill>
+              </a:rPr>
+              <a:t>K</a:t>
+            </a:r>
+            <a:endParaRPr lang="en-US" sz="2000" b="1" dirty="0">
+              <a:solidFill>
+                <a:schemeClr val="tx1"/>
+              </a:solidFill>
+            </a:endParaRPr>
+          </a:p>
+        </p:txBody>
+      </p:sp>
+      <p:sp>
+        <p:nvSpPr>
+          <p:cNvPr id="5" name="Rectangle 4"/>
+          <p:cNvSpPr/>
+          <p:nvPr/>
+        </p:nvSpPr>
+        <p:spPr>
+          <a:xfrm>
+            <a:off x="5918200" y="1689100"/>
+            <a:ext cx="3784600" cy="533400"/>
+          </a:xfrm>
+          <a:prstGeom prst="rect">
+            <a:avLst/>
+          </a:prstGeom>
+          <a:gradFill>
+            <a:gsLst>
+              <a:gs pos="0">
+                <a:schemeClr val="accent1">
+                  <a:lumMod val="5000"/>
+                  <a:lumOff val="95000"/>
+                </a:schemeClr>
+              </a:gs>
+              <a:gs pos="40000">
+                <a:schemeClr val="accent1">
+                  <a:lumMod val="45000"/>
+                  <a:lumOff val="55000"/>
+                </a:schemeClr>
+              </a:gs>
+              <a:gs pos="72000">
+                <a:schemeClr val="accent1">
+                  <a:lumMod val="60000"/>
+                  <a:lumOff val="40000"/>
+                </a:schemeClr>
+              </a:gs>
+              <a:gs pos="100000">
+                <a:schemeClr val="accent1">
+                  <a:lumMod val="75000"/>
+                </a:schemeClr>
+              </a:gs>
+            </a:gsLst>
+            <a:lin ang="5400000" scaled="1"/>
+          </a:gradFill>
+          <a:ln w="25400"/>
+        </p:spPr>
+        <p:style>
+          <a:lnRef idx="2">
+            <a:schemeClr val="accent1">
+              <a:shade val="50000"/>
+            </a:schemeClr>
+          </a:lnRef>
+          <a:fillRef idx="1">
+            <a:schemeClr val="accent1"/>
+          </a:fillRef>
+          <a:effectRef idx="0">
+            <a:schemeClr val="accent1"/>
+          </a:effectRef>
+          <a:fontRef idx="minor">
+            <a:schemeClr val="lt1"/>
+          </a:fontRef>
+        </p:style>
+        <p:txBody>
+          <a:bodyPr rtlCol="0" anchor="ctr"/>
+          <a:lstStyle/>
+          <a:p>
+            <a:pPr algn="ctr"/>
+            <a:r>
+              <a:rPr lang="en-US" b="1" dirty="0" smtClean="0">
+                <a:solidFill>
+                  <a:schemeClr val="tx1"/>
+                </a:solidFill>
+              </a:rPr>
+              <a:t>K</a:t>
+            </a:r>
+            <a:endParaRPr lang="en-US" b="1" dirty="0">
+              <a:solidFill>
+                <a:schemeClr val="tx1"/>
+              </a:solidFill>
+            </a:endParaRPr>
+          </a:p>
+        </p:txBody>
+      </p:sp>
+      <p:sp>
+        <p:nvSpPr>
+          <p:cNvPr id="6" name="Rectangle 5"/>
+          <p:cNvSpPr/>
+          <p:nvPr/>
+        </p:nvSpPr>
+        <p:spPr>
+          <a:xfrm>
+            <a:off x="2133600" y="3479800"/>
+            <a:ext cx="1409700" cy="482600"/>
+          </a:xfrm>
+          <a:prstGeom prst="rect">
+            <a:avLst/>
+          </a:prstGeom>
+          <a:gradFill flip="none" rotWithShape="1">
+            <a:gsLst>
+              <a:gs pos="0">
+                <a:schemeClr val="accent2">
+                  <a:lumMod val="40000"/>
+                  <a:lumOff val="60000"/>
+                </a:schemeClr>
+              </a:gs>
+              <a:gs pos="30000">
+                <a:schemeClr val="accent2">
+                  <a:lumMod val="75000"/>
+                </a:schemeClr>
+              </a:gs>
+              <a:gs pos="100000">
+                <a:schemeClr val="accent2">
+                  <a:lumMod val="75000"/>
+                </a:schemeClr>
+              </a:gs>
+            </a:gsLst>
+            <a:lin ang="5400000" scaled="1"/>
+            <a:tileRect/>
+          </a:gradFill>
+          <a:ln w="25400"/>
+        </p:spPr>
+        <p:style>
+          <a:lnRef idx="2">
+            <a:schemeClr val="accent1">
+              <a:shade val="50000"/>
+            </a:schemeClr>
+          </a:lnRef>
+          <a:fillRef idx="1">
+            <a:schemeClr val="accent1"/>
+          </a:fillRef>
+          <a:effectRef idx="0">
+            <a:schemeClr val="accent1"/>
+          </a:effectRef>
+          <a:fontRef idx="minor">
+            <a:schemeClr val="lt1"/>
+          </a:fontRef>
+        </p:style>
+        <p:txBody>
+          <a:bodyPr rtlCol="0" anchor="ctr"/>
+          <a:lstStyle/>
+          <a:p>
+            <a:pPr algn="ctr"/>
+            <a:r>
+              <a:rPr lang="en-US" sz="2800" b="1" dirty="0" smtClean="0"/>
+              <a:t>D</a:t>
+            </a:r>
+            <a:r>
+              <a:rPr lang="en-US" sz="2800" b="1" baseline="-25000" dirty="0" smtClean="0"/>
+              <a:t>0</a:t>
+            </a:r>
+            <a:endParaRPr lang="en-US" sz="2800" b="1" dirty="0"/>
+          </a:p>
+        </p:txBody>
+      </p:sp>
+      <p:sp>
+        <p:nvSpPr>
+          <p:cNvPr id="7" name="Rectangle 6"/>
+          <p:cNvSpPr/>
+          <p:nvPr/>
+        </p:nvSpPr>
+        <p:spPr>
+          <a:xfrm>
+            <a:off x="3543300" y="3479800"/>
+            <a:ext cx="1409700" cy="482600"/>
+          </a:xfrm>
+          <a:prstGeom prst="rect">
+            <a:avLst/>
+          </a:prstGeom>
+          <a:gradFill flip="none" rotWithShape="1">
+            <a:gsLst>
+              <a:gs pos="0">
+                <a:schemeClr val="accent2">
+                  <a:lumMod val="40000"/>
+                  <a:lumOff val="60000"/>
+                </a:schemeClr>
+              </a:gs>
+              <a:gs pos="30000">
+                <a:schemeClr val="accent2">
+                  <a:lumMod val="75000"/>
+                </a:schemeClr>
+              </a:gs>
+              <a:gs pos="100000">
+                <a:schemeClr val="accent2">
+                  <a:lumMod val="75000"/>
+                </a:schemeClr>
+              </a:gs>
+            </a:gsLst>
+            <a:lin ang="5400000" scaled="1"/>
+            <a:tileRect/>
+          </a:gradFill>
+          <a:ln w="25400"/>
+        </p:spPr>
+        <p:style>
+          <a:lnRef idx="2">
+            <a:schemeClr val="accent1">
+              <a:shade val="50000"/>
+            </a:schemeClr>
+          </a:lnRef>
+          <a:fillRef idx="1">
+            <a:schemeClr val="accent1"/>
+          </a:fillRef>
+          <a:effectRef idx="0">
+            <a:schemeClr val="accent1"/>
+          </a:effectRef>
+          <a:fontRef idx="minor">
+            <a:schemeClr val="lt1"/>
+          </a:fontRef>
+        </p:style>
+        <p:txBody>
+          <a:bodyPr rtlCol="0" anchor="ctr"/>
+          <a:lstStyle/>
+          <a:p>
+            <a:pPr algn="ctr"/>
+            <a:r>
+              <a:rPr lang="en-US" sz="2800" b="1" dirty="0" smtClean="0"/>
+              <a:t>D</a:t>
+            </a:r>
+            <a:r>
+              <a:rPr lang="en-US" sz="2800" b="1" baseline="-25000" dirty="0" smtClean="0"/>
+              <a:t>1</a:t>
+            </a:r>
+            <a:endParaRPr lang="en-US" sz="2800" b="1" dirty="0"/>
+          </a:p>
+        </p:txBody>
+      </p:sp>
+      <p:sp>
+        <p:nvSpPr>
+          <p:cNvPr id="8" name="Rectangle 7"/>
+          <p:cNvSpPr/>
+          <p:nvPr/>
+        </p:nvSpPr>
+        <p:spPr>
+          <a:xfrm>
+            <a:off x="4953000" y="3479800"/>
+            <a:ext cx="1409700" cy="482600"/>
+          </a:xfrm>
+          <a:prstGeom prst="rect">
+            <a:avLst/>
+          </a:prstGeom>
+          <a:gradFill flip="none" rotWithShape="1">
+            <a:gsLst>
+              <a:gs pos="0">
+                <a:schemeClr val="accent2">
+                  <a:lumMod val="40000"/>
+                  <a:lumOff val="60000"/>
+                </a:schemeClr>
+              </a:gs>
+              <a:gs pos="30000">
+                <a:schemeClr val="accent2">
+                  <a:lumMod val="75000"/>
+                </a:schemeClr>
+              </a:gs>
+              <a:gs pos="100000">
+                <a:schemeClr val="accent2">
+                  <a:lumMod val="75000"/>
+                </a:schemeClr>
+              </a:gs>
+            </a:gsLst>
+            <a:lin ang="5400000" scaled="1"/>
+            <a:tileRect/>
+          </a:gradFill>
+          <a:ln w="25400"/>
+        </p:spPr>
+        <p:style>
+          <a:lnRef idx="2">
+            <a:schemeClr val="accent1">
+              <a:shade val="50000"/>
+            </a:schemeClr>
+          </a:lnRef>
+          <a:fillRef idx="1">
+            <a:schemeClr val="accent1"/>
+          </a:fillRef>
+          <a:effectRef idx="0">
+            <a:schemeClr val="accent1"/>
+          </a:effectRef>
+          <a:fontRef idx="minor">
+            <a:schemeClr val="lt1"/>
+          </a:fontRef>
+        </p:style>
+        <p:txBody>
+          <a:bodyPr rtlCol="0" anchor="ctr"/>
+          <a:lstStyle/>
+          <a:p>
+            <a:pPr algn="ctr"/>
+            <a:r>
+              <a:rPr lang="en-US" sz="2800" b="1" dirty="0" smtClean="0"/>
+              <a:t>D</a:t>
+            </a:r>
+            <a:r>
+              <a:rPr lang="en-US" sz="2800" b="1" baseline="-25000" dirty="0"/>
+              <a:t>2</a:t>
+            </a:r>
+            <a:endParaRPr lang="en-US" sz="2800" b="1" dirty="0"/>
+          </a:p>
+        </p:txBody>
+      </p:sp>
+      <p:sp>
+        <p:nvSpPr>
+          <p:cNvPr id="9" name="Rectangle 8"/>
+          <p:cNvSpPr/>
+          <p:nvPr/>
+        </p:nvSpPr>
+        <p:spPr>
+          <a:xfrm>
+            <a:off x="6362700" y="3479800"/>
+            <a:ext cx="1409700" cy="482600"/>
+          </a:xfrm>
+          <a:prstGeom prst="rect">
+            <a:avLst/>
+          </a:prstGeom>
+          <a:gradFill flip="none" rotWithShape="1">
+            <a:gsLst>
+              <a:gs pos="0">
+                <a:schemeClr val="accent2">
+                  <a:lumMod val="40000"/>
+                  <a:lumOff val="60000"/>
+                </a:schemeClr>
+              </a:gs>
+              <a:gs pos="30000">
+                <a:schemeClr val="accent2">
+                  <a:lumMod val="75000"/>
+                </a:schemeClr>
+              </a:gs>
+              <a:gs pos="100000">
+                <a:schemeClr val="accent2">
+                  <a:lumMod val="75000"/>
+                </a:schemeClr>
+              </a:gs>
+            </a:gsLst>
+            <a:lin ang="5400000" scaled="1"/>
+            <a:tileRect/>
+          </a:gradFill>
+          <a:ln w="25400"/>
+        </p:spPr>
+        <p:style>
+          <a:lnRef idx="2">
+            <a:schemeClr val="accent1">
+              <a:shade val="50000"/>
+            </a:schemeClr>
+          </a:lnRef>
+          <a:fillRef idx="1">
+            <a:schemeClr val="accent1"/>
+          </a:fillRef>
+          <a:effectRef idx="0">
+            <a:schemeClr val="accent1"/>
+          </a:effectRef>
+          <a:fontRef idx="minor">
+            <a:schemeClr val="lt1"/>
+          </a:fontRef>
+        </p:style>
+        <p:txBody>
+          <a:bodyPr rtlCol="0" anchor="ctr"/>
+          <a:lstStyle/>
+          <a:p>
+            <a:pPr algn="ctr"/>
+            <a:r>
+              <a:rPr lang="en-US" sz="2400" b="1" dirty="0" smtClean="0"/>
+              <a:t>…</a:t>
+            </a:r>
+            <a:endParaRPr lang="en-US" sz="2400" b="1" dirty="0"/>
+          </a:p>
+        </p:txBody>
+      </p:sp>
+      <p:sp>
+        <p:nvSpPr>
+          <p:cNvPr id="10" name="Rectangle 9"/>
+          <p:cNvSpPr/>
+          <p:nvPr/>
+        </p:nvSpPr>
+        <p:spPr>
+          <a:xfrm>
+            <a:off x="7772400" y="3479800"/>
+            <a:ext cx="1409700" cy="482600"/>
+          </a:xfrm>
+          <a:prstGeom prst="rect">
+            <a:avLst/>
+          </a:prstGeom>
+          <a:gradFill flip="none" rotWithShape="1">
+            <a:gsLst>
+              <a:gs pos="0">
+                <a:schemeClr val="accent2">
+                  <a:lumMod val="40000"/>
+                  <a:lumOff val="60000"/>
+                </a:schemeClr>
+              </a:gs>
+              <a:gs pos="30000">
+                <a:schemeClr val="accent2">
+                  <a:lumMod val="75000"/>
+                </a:schemeClr>
+              </a:gs>
+              <a:gs pos="100000">
+                <a:schemeClr val="accent2">
+                  <a:lumMod val="75000"/>
+                </a:schemeClr>
+              </a:gs>
+            </a:gsLst>
+            <a:lin ang="5400000" scaled="1"/>
+            <a:tileRect/>
+          </a:gradFill>
+          <a:ln w="25400"/>
+        </p:spPr>
+        <p:style>
+          <a:lnRef idx="2">
+            <a:schemeClr val="accent1">
+              <a:shade val="50000"/>
+            </a:schemeClr>
+          </a:lnRef>
+          <a:fillRef idx="1">
+            <a:schemeClr val="accent1"/>
+          </a:fillRef>
+          <a:effectRef idx="0">
+            <a:schemeClr val="accent1"/>
+          </a:effectRef>
+          <a:fontRef idx="minor">
+            <a:schemeClr val="lt1"/>
+          </a:fontRef>
+        </p:style>
+        <p:txBody>
+          <a:bodyPr rtlCol="0" anchor="ctr"/>
+          <a:lstStyle/>
+          <a:p>
+            <a:pPr algn="ctr"/>
+            <a:r>
+              <a:rPr lang="en-US" sz="2800" b="1" dirty="0" err="1" smtClean="0"/>
+              <a:t>D</a:t>
+            </a:r>
+            <a:r>
+              <a:rPr lang="en-US" sz="2800" b="1" baseline="-25000" dirty="0" err="1" smtClean="0"/>
+              <a:t>n</a:t>
+            </a:r>
+            <a:endParaRPr lang="en-US" sz="2800" b="1" baseline="-25000" dirty="0"/>
+          </a:p>
+        </p:txBody>
+      </p:sp>
+      <p:cxnSp>
+        <p:nvCxnSpPr>
+          <p:cNvPr id="12" name="Straight Connector 11"/>
+          <p:cNvCxnSpPr/>
+          <p:nvPr/>
+        </p:nvCxnSpPr>
+        <p:spPr>
+          <a:xfrm>
+            <a:off x="2133600" y="2222500"/>
+            <a:ext cx="0" cy="1257300"/>
+          </a:xfrm>
+          <a:prstGeom prst="line">
+            <a:avLst/>
+          </a:prstGeom>
+          <a:ln w="19050">
+            <a:prstDash val="dash"/>
+          </a:ln>
+        </p:spPr>
+        <p:style>
+          <a:lnRef idx="1">
+            <a:schemeClr val="accent1"/>
+          </a:lnRef>
+          <a:fillRef idx="0">
+            <a:schemeClr val="accent1"/>
+          </a:fillRef>
+          <a:effectRef idx="0">
+            <a:schemeClr val="accent1"/>
+          </a:effectRef>
+          <a:fontRef idx="minor">
+            <a:schemeClr val="tx1"/>
+          </a:fontRef>
+        </p:style>
+      </p:cxnSp>
+      <p:cxnSp>
+        <p:nvCxnSpPr>
+          <p:cNvPr id="13" name="Straight Connector 12"/>
+          <p:cNvCxnSpPr/>
+          <p:nvPr/>
+        </p:nvCxnSpPr>
+        <p:spPr>
+          <a:xfrm>
+            <a:off x="3543300" y="2222500"/>
+            <a:ext cx="0" cy="1257300"/>
+          </a:xfrm>
+          <a:prstGeom prst="line">
+            <a:avLst/>
+          </a:prstGeom>
+          <a:ln w="19050">
+            <a:prstDash val="dash"/>
+          </a:ln>
+        </p:spPr>
+        <p:style>
+          <a:lnRef idx="1">
+            <a:schemeClr val="accent1"/>
+          </a:lnRef>
+          <a:fillRef idx="0">
+            <a:schemeClr val="accent1"/>
+          </a:fillRef>
+          <a:effectRef idx="0">
+            <a:schemeClr val="accent1"/>
+          </a:effectRef>
+          <a:fontRef idx="minor">
+            <a:schemeClr val="tx1"/>
+          </a:fontRef>
+        </p:style>
+      </p:cxnSp>
+      <p:cxnSp>
+        <p:nvCxnSpPr>
+          <p:cNvPr id="14" name="Straight Connector 13"/>
+          <p:cNvCxnSpPr/>
+          <p:nvPr/>
+        </p:nvCxnSpPr>
+        <p:spPr>
+          <a:xfrm>
+            <a:off x="4953000" y="2222500"/>
+            <a:ext cx="0" cy="1257300"/>
+          </a:xfrm>
+          <a:prstGeom prst="line">
+            <a:avLst/>
+          </a:prstGeom>
+          <a:ln w="19050">
+            <a:prstDash val="dash"/>
+          </a:ln>
+        </p:spPr>
+        <p:style>
+          <a:lnRef idx="1">
+            <a:schemeClr val="accent1"/>
+          </a:lnRef>
+          <a:fillRef idx="0">
+            <a:schemeClr val="accent1"/>
+          </a:fillRef>
+          <a:effectRef idx="0">
+            <a:schemeClr val="accent1"/>
+          </a:effectRef>
+          <a:fontRef idx="minor">
+            <a:schemeClr val="tx1"/>
+          </a:fontRef>
+        </p:style>
+      </p:cxnSp>
+      <p:cxnSp>
+        <p:nvCxnSpPr>
+          <p:cNvPr id="15" name="Straight Connector 14"/>
+          <p:cNvCxnSpPr/>
+          <p:nvPr/>
+        </p:nvCxnSpPr>
+        <p:spPr>
+          <a:xfrm>
+            <a:off x="6350000" y="2222500"/>
+            <a:ext cx="0" cy="1257300"/>
+          </a:xfrm>
+          <a:prstGeom prst="line">
+            <a:avLst/>
+          </a:prstGeom>
+          <a:ln w="19050">
+            <a:prstDash val="dash"/>
+          </a:ln>
+        </p:spPr>
+        <p:style>
+          <a:lnRef idx="1">
+            <a:schemeClr val="accent1"/>
+          </a:lnRef>
+          <a:fillRef idx="0">
+            <a:schemeClr val="accent1"/>
+          </a:fillRef>
+          <a:effectRef idx="0">
+            <a:schemeClr val="accent1"/>
+          </a:effectRef>
+          <a:fontRef idx="minor">
+            <a:schemeClr val="tx1"/>
+          </a:fontRef>
+        </p:style>
+      </p:cxnSp>
+      <p:cxnSp>
+        <p:nvCxnSpPr>
+          <p:cNvPr id="16" name="Straight Connector 15"/>
+          <p:cNvCxnSpPr/>
+          <p:nvPr/>
+        </p:nvCxnSpPr>
+        <p:spPr>
+          <a:xfrm>
+            <a:off x="7772400" y="2222500"/>
+            <a:ext cx="0" cy="1257300"/>
+          </a:xfrm>
+          <a:prstGeom prst="line">
+            <a:avLst/>
+          </a:prstGeom>
+          <a:ln w="19050">
+            <a:prstDash val="dash"/>
+          </a:ln>
+        </p:spPr>
+        <p:style>
+          <a:lnRef idx="1">
+            <a:schemeClr val="accent1"/>
+          </a:lnRef>
+          <a:fillRef idx="0">
+            <a:schemeClr val="accent1"/>
+          </a:fillRef>
+          <a:effectRef idx="0">
+            <a:schemeClr val="accent1"/>
+          </a:effectRef>
+          <a:fontRef idx="minor">
+            <a:schemeClr val="tx1"/>
+          </a:fontRef>
+        </p:style>
+      </p:cxnSp>
+      <p:cxnSp>
+        <p:nvCxnSpPr>
+          <p:cNvPr id="17" name="Straight Connector 16"/>
+          <p:cNvCxnSpPr/>
+          <p:nvPr/>
+        </p:nvCxnSpPr>
+        <p:spPr>
+          <a:xfrm>
+            <a:off x="9169400" y="2222500"/>
+            <a:ext cx="0" cy="1257300"/>
+          </a:xfrm>
+          <a:prstGeom prst="line">
+            <a:avLst/>
+          </a:prstGeom>
+          <a:ln w="19050">
+            <a:prstDash val="dash"/>
+          </a:ln>
+        </p:spPr>
+        <p:style>
+          <a:lnRef idx="1">
+            <a:schemeClr val="accent1"/>
+          </a:lnRef>
+          <a:fillRef idx="0">
+            <a:schemeClr val="accent1"/>
+          </a:fillRef>
+          <a:effectRef idx="0">
+            <a:schemeClr val="accent1"/>
+          </a:effectRef>
+          <a:fontRef idx="minor">
+            <a:schemeClr val="tx1"/>
+          </a:fontRef>
+        </p:style>
+      </p:cxnSp>
+      <p:sp>
+        <p:nvSpPr>
+          <p:cNvPr id="18" name="TextBox 17"/>
+          <p:cNvSpPr txBox="1"/>
+          <p:nvPr/>
+        </p:nvSpPr>
+        <p:spPr>
+          <a:xfrm>
+            <a:off x="1092200" y="5651500"/>
+            <a:ext cx="793422" cy="523220"/>
+          </a:xfrm>
+          <a:prstGeom prst="rect">
+            <a:avLst/>
+          </a:prstGeom>
+          <a:noFill/>
+        </p:spPr>
+        <p:txBody>
+          <a:bodyPr wrap="none" rtlCol="0">
+            <a:spAutoFit/>
+          </a:bodyPr>
+          <a:lstStyle/>
+          <a:p>
+            <a:r>
+              <a:rPr lang="en-US" sz="2800" dirty="0" smtClean="0"/>
+              <a:t>XOR</a:t>
+            </a:r>
+            <a:endParaRPr lang="en-US" sz="2800" dirty="0"/>
+          </a:p>
+        </p:txBody>
+      </p:sp>
+    </p:spTree>
+    <p:extLst>
+      <p:ext uri="{BB962C8B-B14F-4D97-AF65-F5344CB8AC3E}">
+        <p14:creationId xmlns:p14="http://schemas.microsoft.com/office/powerpoint/2010/main" val="1941733995"/>
+      </p:ext>
+    </p:extLst>
+  </p:cSld>
+  <p:clrMapOvr>
+    <a:masterClrMapping/>
+  </p:clrMapOvr>
+</p:sld>
+</file>
+
+<file path=ppt/slides/slide7.xml><?xml version="1.0" encoding="utf-8"?>
+<p:sld xmlns:a="http://schemas.openxmlformats.org/drawingml/2006/main" xmlns:r="http://schemas.openxmlformats.org/officeDocument/2006/relationships" xmlns:p="http://schemas.openxmlformats.org/presentationml/2006/main">
+  <p:cSld>
+    <p:spTree>
+      <p:nvGrpSpPr>
+        <p:cNvPr id="1" name=""/>
+        <p:cNvGrpSpPr/>
+        <p:nvPr/>
+      </p:nvGrpSpPr>
+      <p:grpSpPr>
+        <a:xfrm>
+          <a:off x="0" y="0"/>
+          <a:ext cx="0" cy="0"/>
+          <a:chOff x="0" y="0"/>
+          <a:chExt cx="0" cy="0"/>
+        </a:xfrm>
+      </p:grpSpPr>
+      <p:sp>
+        <p:nvSpPr>
           <p:cNvPr id="4" name="Rounded Rectangle 3"/>
           <p:cNvSpPr/>
           <p:nvPr/>
@@ -19204,7 +20889,7 @@
 </p:sld>
 </file>
 
-<file path=ppt/slides/slide7.xml><?xml version="1.0" encoding="utf-8"?>
+<file path=ppt/slides/slide8.xml><?xml version="1.0" encoding="utf-8"?>
 <p:sld xmlns:a="http://schemas.openxmlformats.org/drawingml/2006/main" xmlns:r="http://schemas.openxmlformats.org/officeDocument/2006/relationships" xmlns:p="http://schemas.openxmlformats.org/presentationml/2006/main">
   <p:cSld>
     <p:spTree>
@@ -20105,7 +21790,7 @@
 </p:sld>
 </file>
 
-<file path=ppt/slides/slide8.xml><?xml version="1.0" encoding="utf-8"?>
+<file path=ppt/slides/slide9.xml><?xml version="1.0" encoding="utf-8"?>
 <p:sld xmlns:a="http://schemas.openxmlformats.org/drawingml/2006/main" xmlns:r="http://schemas.openxmlformats.org/officeDocument/2006/relationships" xmlns:p="http://schemas.openxmlformats.org/presentationml/2006/main">
   <p:cSld>
     <p:bg>
@@ -21638,1492 +23323,6 @@
     <p:extLst>
       <p:ext uri="{BB962C8B-B14F-4D97-AF65-F5344CB8AC3E}">
         <p14:creationId xmlns:p14="http://schemas.microsoft.com/office/powerpoint/2010/main" val="3544992882"/>
-      </p:ext>
-    </p:extLst>
-  </p:cSld>
-  <p:clrMapOvr>
-    <a:masterClrMapping/>
-  </p:clrMapOvr>
-  <p:timing>
-    <p:tnLst>
-      <p:par>
-        <p:cTn id="1" dur="indefinite" restart="never" nodeType="tmRoot"/>
-      </p:par>
-    </p:tnLst>
-  </p:timing>
-</p:sld>
-</file>
-
-<file path=ppt/slides/slide9.xml><?xml version="1.0" encoding="utf-8"?>
-<p:sld xmlns:a="http://schemas.openxmlformats.org/drawingml/2006/main" xmlns:r="http://schemas.openxmlformats.org/officeDocument/2006/relationships" xmlns:p="http://schemas.openxmlformats.org/presentationml/2006/main">
-  <p:cSld>
-    <p:spTree>
-      <p:nvGrpSpPr>
-        <p:cNvPr id="1" name=""/>
-        <p:cNvGrpSpPr/>
-        <p:nvPr/>
-      </p:nvGrpSpPr>
-      <p:grpSpPr>
-        <a:xfrm>
-          <a:off x="0" y="0"/>
-          <a:ext cx="0" cy="0"/>
-          <a:chOff x="0" y="0"/>
-          <a:chExt cx="0" cy="0"/>
-        </a:xfrm>
-      </p:grpSpPr>
-      <p:sp>
-        <p:nvSpPr>
-          <p:cNvPr id="6" name="Rectangle 5"/>
-          <p:cNvSpPr/>
-          <p:nvPr/>
-        </p:nvSpPr>
-        <p:spPr>
-          <a:xfrm>
-            <a:off x="5486399" y="1315326"/>
-            <a:ext cx="1336431" cy="372795"/>
-          </a:xfrm>
-          <a:prstGeom prst="rect">
-            <a:avLst/>
-          </a:prstGeom>
-          <a:gradFill>
-            <a:gsLst>
-              <a:gs pos="10000">
-                <a:srgbClr val="4777A5">
-                  <a:lumMod val="98000"/>
-                </a:srgbClr>
-              </a:gs>
-              <a:gs pos="14000">
-                <a:schemeClr val="accent1">
-                  <a:lumMod val="75000"/>
-                </a:schemeClr>
-              </a:gs>
-              <a:gs pos="75000">
-                <a:schemeClr val="accent1">
-                  <a:lumMod val="60000"/>
-                  <a:lumOff val="40000"/>
-                </a:schemeClr>
-              </a:gs>
-              <a:gs pos="85000">
-                <a:schemeClr val="accent1">
-                  <a:lumMod val="20000"/>
-                  <a:lumOff val="80000"/>
-                </a:schemeClr>
-              </a:gs>
-            </a:gsLst>
-            <a:lin ang="16200000" scaled="1"/>
-          </a:gradFill>
-          <a:ln w="12700">
-            <a:solidFill>
-              <a:schemeClr val="tx2">
-                <a:lumMod val="75000"/>
-              </a:schemeClr>
-            </a:solidFill>
-          </a:ln>
-        </p:spPr>
-        <p:style>
-          <a:lnRef idx="2">
-            <a:schemeClr val="accent1">
-              <a:shade val="50000"/>
-            </a:schemeClr>
-          </a:lnRef>
-          <a:fillRef idx="1">
-            <a:schemeClr val="accent1"/>
-          </a:fillRef>
-          <a:effectRef idx="0">
-            <a:schemeClr val="accent1"/>
-          </a:effectRef>
-          <a:fontRef idx="minor">
-            <a:schemeClr val="lt1"/>
-          </a:fontRef>
-        </p:style>
-        <p:txBody>
-          <a:bodyPr rtlCol="0" anchor="ctr"/>
-          <a:lstStyle/>
-          <a:p>
-            <a:pPr algn="ctr"/>
-            <a:r>
-              <a:rPr lang="en-US" dirty="0"/>
-              <a:t>D0</a:t>
-            </a:r>
-          </a:p>
-        </p:txBody>
-      </p:sp>
-      <p:sp>
-        <p:nvSpPr>
-          <p:cNvPr id="7" name="Rectangle 6"/>
-          <p:cNvSpPr/>
-          <p:nvPr/>
-        </p:nvSpPr>
-        <p:spPr>
-          <a:xfrm>
-            <a:off x="6822830" y="1315326"/>
-            <a:ext cx="1336431" cy="372795"/>
-          </a:xfrm>
-          <a:prstGeom prst="rect">
-            <a:avLst/>
-          </a:prstGeom>
-          <a:gradFill>
-            <a:gsLst>
-              <a:gs pos="10000">
-                <a:srgbClr val="4777A5">
-                  <a:lumMod val="98000"/>
-                </a:srgbClr>
-              </a:gs>
-              <a:gs pos="14000">
-                <a:schemeClr val="accent1">
-                  <a:lumMod val="75000"/>
-                </a:schemeClr>
-              </a:gs>
-              <a:gs pos="75000">
-                <a:schemeClr val="accent1">
-                  <a:lumMod val="60000"/>
-                  <a:lumOff val="40000"/>
-                </a:schemeClr>
-              </a:gs>
-              <a:gs pos="85000">
-                <a:schemeClr val="accent1">
-                  <a:lumMod val="20000"/>
-                  <a:lumOff val="80000"/>
-                </a:schemeClr>
-              </a:gs>
-            </a:gsLst>
-            <a:lin ang="16200000" scaled="1"/>
-          </a:gradFill>
-          <a:ln w="12700">
-            <a:solidFill>
-              <a:schemeClr val="tx2">
-                <a:lumMod val="75000"/>
-              </a:schemeClr>
-            </a:solidFill>
-          </a:ln>
-        </p:spPr>
-        <p:style>
-          <a:lnRef idx="2">
-            <a:schemeClr val="accent1">
-              <a:shade val="50000"/>
-            </a:schemeClr>
-          </a:lnRef>
-          <a:fillRef idx="1">
-            <a:schemeClr val="accent1"/>
-          </a:fillRef>
-          <a:effectRef idx="0">
-            <a:schemeClr val="accent1"/>
-          </a:effectRef>
-          <a:fontRef idx="minor">
-            <a:schemeClr val="lt1"/>
-          </a:fontRef>
-        </p:style>
-        <p:txBody>
-          <a:bodyPr rtlCol="0" anchor="ctr"/>
-          <a:lstStyle/>
-          <a:p>
-            <a:pPr algn="ctr"/>
-            <a:r>
-              <a:rPr lang="en-US" dirty="0"/>
-              <a:t>…</a:t>
-            </a:r>
-          </a:p>
-        </p:txBody>
-      </p:sp>
-      <p:sp>
-        <p:nvSpPr>
-          <p:cNvPr id="8" name="Rectangle 7"/>
-          <p:cNvSpPr/>
-          <p:nvPr/>
-        </p:nvSpPr>
-        <p:spPr>
-          <a:xfrm>
-            <a:off x="8159261" y="1315326"/>
-            <a:ext cx="1364567" cy="372795"/>
-          </a:xfrm>
-          <a:prstGeom prst="rect">
-            <a:avLst/>
-          </a:prstGeom>
-          <a:gradFill>
-            <a:gsLst>
-              <a:gs pos="10000">
-                <a:srgbClr val="4777A5">
-                  <a:lumMod val="98000"/>
-                </a:srgbClr>
-              </a:gs>
-              <a:gs pos="14000">
-                <a:schemeClr val="accent1">
-                  <a:lumMod val="75000"/>
-                </a:schemeClr>
-              </a:gs>
-              <a:gs pos="75000">
-                <a:schemeClr val="accent1">
-                  <a:lumMod val="60000"/>
-                  <a:lumOff val="40000"/>
-                </a:schemeClr>
-              </a:gs>
-              <a:gs pos="85000">
-                <a:schemeClr val="accent1">
-                  <a:lumMod val="20000"/>
-                  <a:lumOff val="80000"/>
-                </a:schemeClr>
-              </a:gs>
-            </a:gsLst>
-            <a:lin ang="16200000" scaled="1"/>
-          </a:gradFill>
-          <a:ln w="12700">
-            <a:solidFill>
-              <a:schemeClr val="tx2">
-                <a:lumMod val="75000"/>
-              </a:schemeClr>
-            </a:solidFill>
-          </a:ln>
-        </p:spPr>
-        <p:style>
-          <a:lnRef idx="2">
-            <a:schemeClr val="accent1">
-              <a:shade val="50000"/>
-            </a:schemeClr>
-          </a:lnRef>
-          <a:fillRef idx="1">
-            <a:schemeClr val="accent1"/>
-          </a:fillRef>
-          <a:effectRef idx="0">
-            <a:schemeClr val="accent1"/>
-          </a:effectRef>
-          <a:fontRef idx="minor">
-            <a:schemeClr val="lt1"/>
-          </a:fontRef>
-        </p:style>
-        <p:txBody>
-          <a:bodyPr rtlCol="0" anchor="ctr"/>
-          <a:lstStyle/>
-          <a:p>
-            <a:pPr algn="ctr"/>
-            <a:r>
-              <a:rPr lang="en-US" dirty="0"/>
-              <a:t>Dn-1</a:t>
-            </a:r>
-          </a:p>
-        </p:txBody>
-      </p:sp>
-      <p:sp>
-        <p:nvSpPr>
-          <p:cNvPr id="9" name="Rectangle 8"/>
-          <p:cNvSpPr/>
-          <p:nvPr/>
-        </p:nvSpPr>
-        <p:spPr>
-          <a:xfrm>
-            <a:off x="5486398" y="2223407"/>
-            <a:ext cx="1336431" cy="375599"/>
-          </a:xfrm>
-          <a:prstGeom prst="rect">
-            <a:avLst/>
-          </a:prstGeom>
-          <a:gradFill flip="none" rotWithShape="1">
-            <a:gsLst>
-              <a:gs pos="0">
-                <a:schemeClr val="accent2">
-                  <a:lumMod val="5000"/>
-                  <a:lumOff val="95000"/>
-                </a:schemeClr>
-              </a:gs>
-              <a:gs pos="16000">
-                <a:schemeClr val="accent2">
-                  <a:lumMod val="60000"/>
-                  <a:lumOff val="40000"/>
-                </a:schemeClr>
-              </a:gs>
-              <a:gs pos="64000">
-                <a:schemeClr val="accent2"/>
-              </a:gs>
-            </a:gsLst>
-            <a:lin ang="5400000" scaled="1"/>
-            <a:tileRect/>
-          </a:gradFill>
-          <a:ln w="12700"/>
-        </p:spPr>
-        <p:style>
-          <a:lnRef idx="2">
-            <a:schemeClr val="accent1">
-              <a:shade val="50000"/>
-            </a:schemeClr>
-          </a:lnRef>
-          <a:fillRef idx="1">
-            <a:schemeClr val="accent1"/>
-          </a:fillRef>
-          <a:effectRef idx="0">
-            <a:schemeClr val="accent1"/>
-          </a:effectRef>
-          <a:fontRef idx="minor">
-            <a:schemeClr val="lt1"/>
-          </a:fontRef>
-        </p:style>
-        <p:txBody>
-          <a:bodyPr rtlCol="0" anchor="ctr"/>
-          <a:lstStyle/>
-          <a:p>
-            <a:pPr algn="ctr"/>
-            <a:r>
-              <a:rPr lang="en-US" dirty="0"/>
-              <a:t>E0</a:t>
-            </a:r>
-          </a:p>
-        </p:txBody>
-      </p:sp>
-      <p:sp>
-        <p:nvSpPr>
-          <p:cNvPr id="10" name="Rectangle 9"/>
-          <p:cNvSpPr/>
-          <p:nvPr/>
-        </p:nvSpPr>
-        <p:spPr>
-          <a:xfrm>
-            <a:off x="9509757" y="2909198"/>
-            <a:ext cx="492369" cy="379827"/>
-          </a:xfrm>
-          <a:prstGeom prst="rect">
-            <a:avLst/>
-          </a:prstGeom>
-          <a:gradFill flip="none" rotWithShape="1">
-            <a:gsLst>
-              <a:gs pos="0">
-                <a:schemeClr val="accent1">
-                  <a:lumMod val="5000"/>
-                  <a:lumOff val="95000"/>
-                </a:schemeClr>
-              </a:gs>
-              <a:gs pos="25000">
-                <a:schemeClr val="accent1">
-                  <a:lumMod val="45000"/>
-                  <a:lumOff val="55000"/>
-                </a:schemeClr>
-              </a:gs>
-              <a:gs pos="43000">
-                <a:srgbClr val="00B0F0"/>
-              </a:gs>
-              <a:gs pos="100000">
-                <a:srgbClr val="00B0F0"/>
-              </a:gs>
-            </a:gsLst>
-            <a:lin ang="5400000" scaled="1"/>
-            <a:tileRect/>
-          </a:gradFill>
-          <a:ln w="12700"/>
-        </p:spPr>
-        <p:style>
-          <a:lnRef idx="2">
-            <a:schemeClr val="accent1">
-              <a:shade val="50000"/>
-            </a:schemeClr>
-          </a:lnRef>
-          <a:fillRef idx="1">
-            <a:schemeClr val="accent1"/>
-          </a:fillRef>
-          <a:effectRef idx="0">
-            <a:schemeClr val="accent1"/>
-          </a:effectRef>
-          <a:fontRef idx="minor">
-            <a:schemeClr val="lt1"/>
-          </a:fontRef>
-        </p:style>
-        <p:txBody>
-          <a:bodyPr rtlCol="0" anchor="ctr"/>
-          <a:lstStyle/>
-          <a:p>
-            <a:pPr algn="ctr"/>
-            <a:r>
-              <a:rPr lang="en-US" sz="1600" dirty="0"/>
-              <a:t>MD</a:t>
-            </a:r>
-          </a:p>
-        </p:txBody>
-      </p:sp>
-      <p:sp>
-        <p:nvSpPr>
-          <p:cNvPr id="14" name="Rectangle 13"/>
-          <p:cNvSpPr/>
-          <p:nvPr/>
-        </p:nvSpPr>
-        <p:spPr>
-          <a:xfrm>
-            <a:off x="6822829" y="2224158"/>
-            <a:ext cx="1364568" cy="379827"/>
-          </a:xfrm>
-          <a:prstGeom prst="rect">
-            <a:avLst/>
-          </a:prstGeom>
-          <a:gradFill flip="none" rotWithShape="1">
-            <a:gsLst>
-              <a:gs pos="0">
-                <a:schemeClr val="accent2">
-                  <a:lumMod val="5000"/>
-                  <a:lumOff val="95000"/>
-                </a:schemeClr>
-              </a:gs>
-              <a:gs pos="16000">
-                <a:schemeClr val="accent2">
-                  <a:lumMod val="60000"/>
-                  <a:lumOff val="40000"/>
-                </a:schemeClr>
-              </a:gs>
-              <a:gs pos="64000">
-                <a:schemeClr val="accent2"/>
-              </a:gs>
-            </a:gsLst>
-            <a:lin ang="5400000" scaled="1"/>
-            <a:tileRect/>
-          </a:gradFill>
-          <a:ln w="12700"/>
-        </p:spPr>
-        <p:style>
-          <a:lnRef idx="2">
-            <a:schemeClr val="accent1">
-              <a:shade val="50000"/>
-            </a:schemeClr>
-          </a:lnRef>
-          <a:fillRef idx="1">
-            <a:schemeClr val="accent1"/>
-          </a:fillRef>
-          <a:effectRef idx="0">
-            <a:schemeClr val="accent1"/>
-          </a:effectRef>
-          <a:fontRef idx="minor">
-            <a:schemeClr val="lt1"/>
-          </a:fontRef>
-        </p:style>
-        <p:txBody>
-          <a:bodyPr rtlCol="0" anchor="ctr"/>
-          <a:lstStyle/>
-          <a:p>
-            <a:pPr algn="ctr"/>
-            <a:r>
-              <a:rPr lang="en-US" dirty="0"/>
-              <a:t>…</a:t>
-            </a:r>
-          </a:p>
-        </p:txBody>
-      </p:sp>
-      <p:sp>
-        <p:nvSpPr>
-          <p:cNvPr id="15" name="Rectangle 14"/>
-          <p:cNvSpPr/>
-          <p:nvPr/>
-        </p:nvSpPr>
-        <p:spPr>
-          <a:xfrm>
-            <a:off x="8173327" y="2904950"/>
-            <a:ext cx="1336431" cy="379827"/>
-          </a:xfrm>
-          <a:prstGeom prst="rect">
-            <a:avLst/>
-          </a:prstGeom>
-          <a:gradFill flip="none" rotWithShape="1">
-            <a:gsLst>
-              <a:gs pos="0">
-                <a:schemeClr val="accent2">
-                  <a:lumMod val="5000"/>
-                  <a:lumOff val="95000"/>
-                </a:schemeClr>
-              </a:gs>
-              <a:gs pos="16000">
-                <a:schemeClr val="accent2">
-                  <a:lumMod val="60000"/>
-                  <a:lumOff val="40000"/>
-                </a:schemeClr>
-              </a:gs>
-              <a:gs pos="64000">
-                <a:schemeClr val="accent2"/>
-              </a:gs>
-            </a:gsLst>
-            <a:lin ang="5400000" scaled="1"/>
-            <a:tileRect/>
-          </a:gradFill>
-          <a:ln w="12700"/>
-        </p:spPr>
-        <p:style>
-          <a:lnRef idx="2">
-            <a:schemeClr val="accent1">
-              <a:shade val="50000"/>
-            </a:schemeClr>
-          </a:lnRef>
-          <a:fillRef idx="1">
-            <a:schemeClr val="accent1"/>
-          </a:fillRef>
-          <a:effectRef idx="0">
-            <a:schemeClr val="accent1"/>
-          </a:effectRef>
-          <a:fontRef idx="minor">
-            <a:schemeClr val="lt1"/>
-          </a:fontRef>
-        </p:style>
-        <p:txBody>
-          <a:bodyPr rtlCol="0" anchor="ctr"/>
-          <a:lstStyle/>
-          <a:p>
-            <a:pPr algn="ctr"/>
-            <a:r>
-              <a:rPr lang="en-US" dirty="0"/>
-              <a:t>En-1</a:t>
-            </a:r>
-          </a:p>
-        </p:txBody>
-      </p:sp>
-      <p:sp>
-        <p:nvSpPr>
-          <p:cNvPr id="19" name="TextBox 18"/>
-          <p:cNvSpPr txBox="1"/>
-          <p:nvPr/>
-        </p:nvSpPr>
-        <p:spPr>
-          <a:xfrm>
-            <a:off x="3115462" y="2242859"/>
-            <a:ext cx="1962397" cy="369332"/>
-          </a:xfrm>
-          <a:prstGeom prst="rect">
-            <a:avLst/>
-          </a:prstGeom>
-          <a:noFill/>
-        </p:spPr>
-        <p:txBody>
-          <a:bodyPr wrap="none" rtlCol="0">
-            <a:spAutoFit/>
-          </a:bodyPr>
-          <a:lstStyle/>
-          <a:p>
-            <a:r>
-              <a:rPr lang="en-US" dirty="0" err="1" smtClean="0"/>
-              <a:t>Ghi</a:t>
-            </a:r>
-            <a:r>
-              <a:rPr lang="en-US" dirty="0" smtClean="0"/>
-              <a:t> file n-1 </a:t>
-            </a:r>
-            <a:r>
-              <a:rPr lang="en-US" dirty="0" err="1" smtClean="0"/>
-              <a:t>lần</a:t>
-            </a:r>
-            <a:r>
-              <a:rPr lang="en-US" dirty="0" smtClean="0"/>
-              <a:t> </a:t>
-            </a:r>
-            <a:r>
-              <a:rPr lang="en-US" dirty="0" err="1" smtClean="0"/>
-              <a:t>đầu</a:t>
-            </a:r>
-            <a:endParaRPr lang="en-US" dirty="0"/>
-          </a:p>
-        </p:txBody>
-      </p:sp>
-      <p:sp>
-        <p:nvSpPr>
-          <p:cNvPr id="20" name="TextBox 19"/>
-          <p:cNvSpPr txBox="1"/>
-          <p:nvPr/>
-        </p:nvSpPr>
-        <p:spPr>
-          <a:xfrm>
-            <a:off x="3115461" y="2904950"/>
-            <a:ext cx="1635384" cy="369332"/>
-          </a:xfrm>
-          <a:prstGeom prst="rect">
-            <a:avLst/>
-          </a:prstGeom>
-          <a:noFill/>
-        </p:spPr>
-        <p:txBody>
-          <a:bodyPr wrap="none" rtlCol="0">
-            <a:spAutoFit/>
-          </a:bodyPr>
-          <a:lstStyle/>
-          <a:p>
-            <a:r>
-              <a:rPr lang="en-US" dirty="0" err="1" smtClean="0"/>
-              <a:t>Ghi</a:t>
-            </a:r>
-            <a:r>
-              <a:rPr lang="en-US" dirty="0" smtClean="0"/>
-              <a:t> file </a:t>
-            </a:r>
-            <a:r>
-              <a:rPr lang="en-US" dirty="0" err="1" smtClean="0"/>
-              <a:t>lần</a:t>
-            </a:r>
-            <a:r>
-              <a:rPr lang="en-US" dirty="0" smtClean="0"/>
-              <a:t> </a:t>
-            </a:r>
-            <a:r>
-              <a:rPr lang="en-US" dirty="0" err="1" smtClean="0"/>
-              <a:t>cuối</a:t>
-            </a:r>
-            <a:endParaRPr lang="en-US" dirty="0"/>
-          </a:p>
-        </p:txBody>
-      </p:sp>
-      <p:sp>
-        <p:nvSpPr>
-          <p:cNvPr id="21" name="TextBox 18"/>
-          <p:cNvSpPr txBox="1"/>
-          <p:nvPr/>
-        </p:nvSpPr>
-        <p:spPr>
-          <a:xfrm>
-            <a:off x="3115461" y="1325821"/>
-            <a:ext cx="1242648" cy="369332"/>
-          </a:xfrm>
-          <a:prstGeom prst="rect">
-            <a:avLst/>
-          </a:prstGeom>
-          <a:noFill/>
-        </p:spPr>
-        <p:txBody>
-          <a:bodyPr wrap="none" rtlCol="0">
-            <a:spAutoFit/>
-          </a:bodyPr>
-          <a:lstStyle>
-            <a:defPPr>
-              <a:defRPr lang="en-US"/>
-            </a:defPPr>
-            <a:lvl1pPr marL="0" algn="l" defTabSz="914400" rtl="0" eaLnBrk="1" latinLnBrk="0" hangingPunct="1">
-              <a:defRPr sz="1800" kern="1200">
-                <a:solidFill>
-                  <a:schemeClr val="tx1"/>
-                </a:solidFill>
-                <a:latin typeface="+mn-lt"/>
-                <a:ea typeface="+mn-ea"/>
-                <a:cs typeface="+mn-cs"/>
-              </a:defRPr>
-            </a:lvl1pPr>
-            <a:lvl2pPr marL="457200" algn="l" defTabSz="914400" rtl="0" eaLnBrk="1" latinLnBrk="0" hangingPunct="1">
-              <a:defRPr sz="1800" kern="1200">
-                <a:solidFill>
-                  <a:schemeClr val="tx1"/>
-                </a:solidFill>
-                <a:latin typeface="+mn-lt"/>
-                <a:ea typeface="+mn-ea"/>
-                <a:cs typeface="+mn-cs"/>
-              </a:defRPr>
-            </a:lvl2pPr>
-            <a:lvl3pPr marL="914400" algn="l" defTabSz="914400" rtl="0" eaLnBrk="1" latinLnBrk="0" hangingPunct="1">
-              <a:defRPr sz="1800" kern="1200">
-                <a:solidFill>
-                  <a:schemeClr val="tx1"/>
-                </a:solidFill>
-                <a:latin typeface="+mn-lt"/>
-                <a:ea typeface="+mn-ea"/>
-                <a:cs typeface="+mn-cs"/>
-              </a:defRPr>
-            </a:lvl3pPr>
-            <a:lvl4pPr marL="1371600" algn="l" defTabSz="914400" rtl="0" eaLnBrk="1" latinLnBrk="0" hangingPunct="1">
-              <a:defRPr sz="1800" kern="1200">
-                <a:solidFill>
-                  <a:schemeClr val="tx1"/>
-                </a:solidFill>
-                <a:latin typeface="+mn-lt"/>
-                <a:ea typeface="+mn-ea"/>
-                <a:cs typeface="+mn-cs"/>
-              </a:defRPr>
-            </a:lvl4pPr>
-            <a:lvl5pPr marL="1828800" algn="l" defTabSz="914400" rtl="0" eaLnBrk="1" latinLnBrk="0" hangingPunct="1">
-              <a:defRPr sz="1800" kern="1200">
-                <a:solidFill>
-                  <a:schemeClr val="tx1"/>
-                </a:solidFill>
-                <a:latin typeface="+mn-lt"/>
-                <a:ea typeface="+mn-ea"/>
-                <a:cs typeface="+mn-cs"/>
-              </a:defRPr>
-            </a:lvl5pPr>
-            <a:lvl6pPr marL="2286000" algn="l" defTabSz="914400" rtl="0" eaLnBrk="1" latinLnBrk="0" hangingPunct="1">
-              <a:defRPr sz="1800" kern="1200">
-                <a:solidFill>
-                  <a:schemeClr val="tx1"/>
-                </a:solidFill>
-                <a:latin typeface="+mn-lt"/>
-                <a:ea typeface="+mn-ea"/>
-                <a:cs typeface="+mn-cs"/>
-              </a:defRPr>
-            </a:lvl6pPr>
-            <a:lvl7pPr marL="2743200" algn="l" defTabSz="914400" rtl="0" eaLnBrk="1" latinLnBrk="0" hangingPunct="1">
-              <a:defRPr sz="1800" kern="1200">
-                <a:solidFill>
-                  <a:schemeClr val="tx1"/>
-                </a:solidFill>
-                <a:latin typeface="+mn-lt"/>
-                <a:ea typeface="+mn-ea"/>
-                <a:cs typeface="+mn-cs"/>
-              </a:defRPr>
-            </a:lvl7pPr>
-            <a:lvl8pPr marL="3200400" algn="l" defTabSz="914400" rtl="0" eaLnBrk="1" latinLnBrk="0" hangingPunct="1">
-              <a:defRPr sz="1800" kern="1200">
-                <a:solidFill>
-                  <a:schemeClr val="tx1"/>
-                </a:solidFill>
-                <a:latin typeface="+mn-lt"/>
-                <a:ea typeface="+mn-ea"/>
-                <a:cs typeface="+mn-cs"/>
-              </a:defRPr>
-            </a:lvl8pPr>
-            <a:lvl9pPr marL="3657600" algn="l" defTabSz="914400" rtl="0" eaLnBrk="1" latinLnBrk="0" hangingPunct="1">
-              <a:defRPr sz="1800" kern="1200">
-                <a:solidFill>
-                  <a:schemeClr val="tx1"/>
-                </a:solidFill>
-                <a:latin typeface="+mn-lt"/>
-                <a:ea typeface="+mn-ea"/>
-                <a:cs typeface="+mn-cs"/>
-              </a:defRPr>
-            </a:lvl9pPr>
-          </a:lstStyle>
-          <a:p>
-            <a:r>
-              <a:rPr lang="en-US" dirty="0" err="1" smtClean="0"/>
-              <a:t>Dữ</a:t>
-            </a:r>
-            <a:r>
-              <a:rPr lang="en-US" dirty="0" smtClean="0"/>
-              <a:t> </a:t>
-            </a:r>
-            <a:r>
-              <a:rPr lang="en-US" dirty="0" err="1" smtClean="0"/>
-              <a:t>liệu</a:t>
-            </a:r>
-            <a:r>
-              <a:rPr lang="en-US" dirty="0" smtClean="0"/>
-              <a:t> </a:t>
-            </a:r>
-            <a:r>
-              <a:rPr lang="en-US" dirty="0" err="1" smtClean="0"/>
-              <a:t>gốc</a:t>
-            </a:r>
-            <a:endParaRPr lang="en-US" dirty="0"/>
-          </a:p>
-        </p:txBody>
-      </p:sp>
-      <p:sp>
-        <p:nvSpPr>
-          <p:cNvPr id="23" name="Rectangle 22"/>
-          <p:cNvSpPr/>
-          <p:nvPr/>
-        </p:nvSpPr>
-        <p:spPr>
-          <a:xfrm>
-            <a:off x="9513125" y="3793002"/>
-            <a:ext cx="492369" cy="379827"/>
-          </a:xfrm>
-          <a:prstGeom prst="rect">
-            <a:avLst/>
-          </a:prstGeom>
-          <a:gradFill flip="none" rotWithShape="1">
-            <a:gsLst>
-              <a:gs pos="0">
-                <a:schemeClr val="accent1">
-                  <a:lumMod val="5000"/>
-                  <a:lumOff val="95000"/>
-                </a:schemeClr>
-              </a:gs>
-              <a:gs pos="25000">
-                <a:schemeClr val="accent1">
-                  <a:lumMod val="45000"/>
-                  <a:lumOff val="55000"/>
-                </a:schemeClr>
-              </a:gs>
-              <a:gs pos="43000">
-                <a:srgbClr val="00B0F0"/>
-              </a:gs>
-              <a:gs pos="100000">
-                <a:srgbClr val="00B0F0"/>
-              </a:gs>
-            </a:gsLst>
-            <a:lin ang="5400000" scaled="1"/>
-            <a:tileRect/>
-          </a:gradFill>
-          <a:ln w="12700"/>
-        </p:spPr>
-        <p:style>
-          <a:lnRef idx="2">
-            <a:schemeClr val="accent1">
-              <a:shade val="50000"/>
-            </a:schemeClr>
-          </a:lnRef>
-          <a:fillRef idx="1">
-            <a:schemeClr val="accent1"/>
-          </a:fillRef>
-          <a:effectRef idx="0">
-            <a:schemeClr val="accent1"/>
-          </a:effectRef>
-          <a:fontRef idx="minor">
-            <a:schemeClr val="lt1"/>
-          </a:fontRef>
-        </p:style>
-        <p:txBody>
-          <a:bodyPr rtlCol="0" anchor="ctr"/>
-          <a:lstStyle/>
-          <a:p>
-            <a:pPr algn="ctr"/>
-            <a:r>
-              <a:rPr lang="en-US" sz="1600" dirty="0"/>
-              <a:t>MD</a:t>
-            </a:r>
-          </a:p>
-        </p:txBody>
-      </p:sp>
-      <p:sp>
-        <p:nvSpPr>
-          <p:cNvPr id="24" name="Rectangle 23"/>
-          <p:cNvSpPr/>
-          <p:nvPr/>
-        </p:nvSpPr>
-        <p:spPr>
-          <a:xfrm>
-            <a:off x="5486395" y="3793004"/>
-            <a:ext cx="1336433" cy="379827"/>
-          </a:xfrm>
-          <a:prstGeom prst="rect">
-            <a:avLst/>
-          </a:prstGeom>
-          <a:gradFill flip="none" rotWithShape="1">
-            <a:gsLst>
-              <a:gs pos="0">
-                <a:schemeClr val="accent6">
-                  <a:lumMod val="5000"/>
-                  <a:lumOff val="95000"/>
-                </a:schemeClr>
-              </a:gs>
-              <a:gs pos="15000">
-                <a:schemeClr val="accent6">
-                  <a:lumMod val="45000"/>
-                  <a:lumOff val="55000"/>
-                </a:schemeClr>
-              </a:gs>
-              <a:gs pos="35000">
-                <a:srgbClr val="92D050"/>
-              </a:gs>
-              <a:gs pos="100000">
-                <a:srgbClr val="00B050"/>
-              </a:gs>
-            </a:gsLst>
-            <a:lin ang="5400000" scaled="1"/>
-            <a:tileRect/>
-          </a:gradFill>
-          <a:ln w="12700"/>
-        </p:spPr>
-        <p:style>
-          <a:lnRef idx="2">
-            <a:schemeClr val="accent1">
-              <a:shade val="50000"/>
-            </a:schemeClr>
-          </a:lnRef>
-          <a:fillRef idx="1">
-            <a:schemeClr val="accent1"/>
-          </a:fillRef>
-          <a:effectRef idx="0">
-            <a:schemeClr val="accent1"/>
-          </a:effectRef>
-          <a:fontRef idx="minor">
-            <a:schemeClr val="lt1"/>
-          </a:fontRef>
-        </p:style>
-        <p:txBody>
-          <a:bodyPr rtlCol="0" anchor="ctr"/>
-          <a:lstStyle/>
-          <a:p>
-            <a:pPr algn="ctr"/>
-            <a:r>
-              <a:rPr lang="en-US" dirty="0"/>
-              <a:t>E0-MD</a:t>
-            </a:r>
-          </a:p>
-        </p:txBody>
-      </p:sp>
-      <p:sp>
-        <p:nvSpPr>
-          <p:cNvPr id="25" name="Rectangle 24"/>
-          <p:cNvSpPr/>
-          <p:nvPr/>
-        </p:nvSpPr>
-        <p:spPr>
-          <a:xfrm>
-            <a:off x="6836896" y="3793002"/>
-            <a:ext cx="1336431" cy="383078"/>
-          </a:xfrm>
-          <a:prstGeom prst="rect">
-            <a:avLst/>
-          </a:prstGeom>
-          <a:gradFill flip="none" rotWithShape="1">
-            <a:gsLst>
-              <a:gs pos="0">
-                <a:schemeClr val="accent6">
-                  <a:lumMod val="5000"/>
-                  <a:lumOff val="95000"/>
-                </a:schemeClr>
-              </a:gs>
-              <a:gs pos="15000">
-                <a:schemeClr val="accent6">
-                  <a:lumMod val="45000"/>
-                  <a:lumOff val="55000"/>
-                </a:schemeClr>
-              </a:gs>
-              <a:gs pos="35000">
-                <a:srgbClr val="92D050"/>
-              </a:gs>
-              <a:gs pos="100000">
-                <a:srgbClr val="00B050"/>
-              </a:gs>
-            </a:gsLst>
-            <a:lin ang="5400000" scaled="1"/>
-            <a:tileRect/>
-          </a:gradFill>
-          <a:ln w="12700"/>
-        </p:spPr>
-        <p:style>
-          <a:lnRef idx="2">
-            <a:schemeClr val="accent1">
-              <a:shade val="50000"/>
-            </a:schemeClr>
-          </a:lnRef>
-          <a:fillRef idx="1">
-            <a:schemeClr val="accent1"/>
-          </a:fillRef>
-          <a:effectRef idx="0">
-            <a:schemeClr val="accent1"/>
-          </a:effectRef>
-          <a:fontRef idx="minor">
-            <a:schemeClr val="lt1"/>
-          </a:fontRef>
-        </p:style>
-        <p:txBody>
-          <a:bodyPr rtlCol="0" anchor="ctr"/>
-          <a:lstStyle/>
-          <a:p>
-            <a:pPr algn="ctr"/>
-            <a:r>
-              <a:rPr lang="en-US" dirty="0"/>
-              <a:t>…</a:t>
-            </a:r>
-          </a:p>
-        </p:txBody>
-      </p:sp>
-      <p:sp>
-        <p:nvSpPr>
-          <p:cNvPr id="26" name="Rectangle 25"/>
-          <p:cNvSpPr/>
-          <p:nvPr/>
-        </p:nvSpPr>
-        <p:spPr>
-          <a:xfrm>
-            <a:off x="8187397" y="3793003"/>
-            <a:ext cx="1336431" cy="379827"/>
-          </a:xfrm>
-          <a:prstGeom prst="rect">
-            <a:avLst/>
-          </a:prstGeom>
-          <a:gradFill flip="none" rotWithShape="1">
-            <a:gsLst>
-              <a:gs pos="0">
-                <a:schemeClr val="accent6">
-                  <a:lumMod val="5000"/>
-                  <a:lumOff val="95000"/>
-                </a:schemeClr>
-              </a:gs>
-              <a:gs pos="15000">
-                <a:schemeClr val="accent6">
-                  <a:lumMod val="45000"/>
-                  <a:lumOff val="55000"/>
-                </a:schemeClr>
-              </a:gs>
-              <a:gs pos="35000">
-                <a:srgbClr val="92D050"/>
-              </a:gs>
-              <a:gs pos="100000">
-                <a:srgbClr val="00B050"/>
-              </a:gs>
-            </a:gsLst>
-            <a:lin ang="5400000" scaled="1"/>
-            <a:tileRect/>
-          </a:gradFill>
-          <a:ln w="12700"/>
-        </p:spPr>
-        <p:style>
-          <a:lnRef idx="2">
-            <a:schemeClr val="accent1">
-              <a:shade val="50000"/>
-            </a:schemeClr>
-          </a:lnRef>
-          <a:fillRef idx="1">
-            <a:schemeClr val="accent1"/>
-          </a:fillRef>
-          <a:effectRef idx="0">
-            <a:schemeClr val="accent1"/>
-          </a:effectRef>
-          <a:fontRef idx="minor">
-            <a:schemeClr val="lt1"/>
-          </a:fontRef>
-        </p:style>
-        <p:txBody>
-          <a:bodyPr rtlCol="0" anchor="ctr"/>
-          <a:lstStyle/>
-          <a:p>
-            <a:pPr algn="ctr"/>
-            <a:r>
-              <a:rPr lang="en-US" dirty="0"/>
-              <a:t>En-1</a:t>
-            </a:r>
-          </a:p>
-        </p:txBody>
-      </p:sp>
-      <p:sp>
-        <p:nvSpPr>
-          <p:cNvPr id="27" name="TextBox 18"/>
-          <p:cNvSpPr txBox="1"/>
-          <p:nvPr/>
-        </p:nvSpPr>
-        <p:spPr>
-          <a:xfrm>
-            <a:off x="3111677" y="3798250"/>
-            <a:ext cx="1210588" cy="369332"/>
-          </a:xfrm>
-          <a:prstGeom prst="rect">
-            <a:avLst/>
-          </a:prstGeom>
-          <a:noFill/>
-        </p:spPr>
-        <p:txBody>
-          <a:bodyPr wrap="none" rtlCol="0">
-            <a:spAutoFit/>
-          </a:bodyPr>
-          <a:lstStyle>
-            <a:defPPr>
-              <a:defRPr lang="en-US"/>
-            </a:defPPr>
-            <a:lvl1pPr marL="0" algn="l" defTabSz="914400" rtl="0" eaLnBrk="1" latinLnBrk="0" hangingPunct="1">
-              <a:defRPr sz="1800" kern="1200">
-                <a:solidFill>
-                  <a:schemeClr val="tx1"/>
-                </a:solidFill>
-                <a:latin typeface="+mn-lt"/>
-                <a:ea typeface="+mn-ea"/>
-                <a:cs typeface="+mn-cs"/>
-              </a:defRPr>
-            </a:lvl1pPr>
-            <a:lvl2pPr marL="457200" algn="l" defTabSz="914400" rtl="0" eaLnBrk="1" latinLnBrk="0" hangingPunct="1">
-              <a:defRPr sz="1800" kern="1200">
-                <a:solidFill>
-                  <a:schemeClr val="tx1"/>
-                </a:solidFill>
-                <a:latin typeface="+mn-lt"/>
-                <a:ea typeface="+mn-ea"/>
-                <a:cs typeface="+mn-cs"/>
-              </a:defRPr>
-            </a:lvl2pPr>
-            <a:lvl3pPr marL="914400" algn="l" defTabSz="914400" rtl="0" eaLnBrk="1" latinLnBrk="0" hangingPunct="1">
-              <a:defRPr sz="1800" kern="1200">
-                <a:solidFill>
-                  <a:schemeClr val="tx1"/>
-                </a:solidFill>
-                <a:latin typeface="+mn-lt"/>
-                <a:ea typeface="+mn-ea"/>
-                <a:cs typeface="+mn-cs"/>
-              </a:defRPr>
-            </a:lvl3pPr>
-            <a:lvl4pPr marL="1371600" algn="l" defTabSz="914400" rtl="0" eaLnBrk="1" latinLnBrk="0" hangingPunct="1">
-              <a:defRPr sz="1800" kern="1200">
-                <a:solidFill>
-                  <a:schemeClr val="tx1"/>
-                </a:solidFill>
-                <a:latin typeface="+mn-lt"/>
-                <a:ea typeface="+mn-ea"/>
-                <a:cs typeface="+mn-cs"/>
-              </a:defRPr>
-            </a:lvl4pPr>
-            <a:lvl5pPr marL="1828800" algn="l" defTabSz="914400" rtl="0" eaLnBrk="1" latinLnBrk="0" hangingPunct="1">
-              <a:defRPr sz="1800" kern="1200">
-                <a:solidFill>
-                  <a:schemeClr val="tx1"/>
-                </a:solidFill>
-                <a:latin typeface="+mn-lt"/>
-                <a:ea typeface="+mn-ea"/>
-                <a:cs typeface="+mn-cs"/>
-              </a:defRPr>
-            </a:lvl5pPr>
-            <a:lvl6pPr marL="2286000" algn="l" defTabSz="914400" rtl="0" eaLnBrk="1" latinLnBrk="0" hangingPunct="1">
-              <a:defRPr sz="1800" kern="1200">
-                <a:solidFill>
-                  <a:schemeClr val="tx1"/>
-                </a:solidFill>
-                <a:latin typeface="+mn-lt"/>
-                <a:ea typeface="+mn-ea"/>
-                <a:cs typeface="+mn-cs"/>
-              </a:defRPr>
-            </a:lvl6pPr>
-            <a:lvl7pPr marL="2743200" algn="l" defTabSz="914400" rtl="0" eaLnBrk="1" latinLnBrk="0" hangingPunct="1">
-              <a:defRPr sz="1800" kern="1200">
-                <a:solidFill>
-                  <a:schemeClr val="tx1"/>
-                </a:solidFill>
-                <a:latin typeface="+mn-lt"/>
-                <a:ea typeface="+mn-ea"/>
-                <a:cs typeface="+mn-cs"/>
-              </a:defRPr>
-            </a:lvl7pPr>
-            <a:lvl8pPr marL="3200400" algn="l" defTabSz="914400" rtl="0" eaLnBrk="1" latinLnBrk="0" hangingPunct="1">
-              <a:defRPr sz="1800" kern="1200">
-                <a:solidFill>
-                  <a:schemeClr val="tx1"/>
-                </a:solidFill>
-                <a:latin typeface="+mn-lt"/>
-                <a:ea typeface="+mn-ea"/>
-                <a:cs typeface="+mn-cs"/>
-              </a:defRPr>
-            </a:lvl8pPr>
-            <a:lvl9pPr marL="3657600" algn="l" defTabSz="914400" rtl="0" eaLnBrk="1" latinLnBrk="0" hangingPunct="1">
-              <a:defRPr sz="1800" kern="1200">
-                <a:solidFill>
-                  <a:schemeClr val="tx1"/>
-                </a:solidFill>
-                <a:latin typeface="+mn-lt"/>
-                <a:ea typeface="+mn-ea"/>
-                <a:cs typeface="+mn-cs"/>
-              </a:defRPr>
-            </a:lvl9pPr>
-          </a:lstStyle>
-          <a:p>
-            <a:r>
-              <a:rPr lang="en-US" dirty="0" err="1" smtClean="0"/>
-              <a:t>Dữ</a:t>
-            </a:r>
-            <a:r>
-              <a:rPr lang="en-US" dirty="0" smtClean="0"/>
-              <a:t> </a:t>
-            </a:r>
-            <a:r>
-              <a:rPr lang="en-US" dirty="0" err="1" smtClean="0"/>
-              <a:t>liệu</a:t>
-            </a:r>
-            <a:r>
-              <a:rPr lang="en-US" dirty="0" smtClean="0"/>
-              <a:t> </a:t>
-            </a:r>
-            <a:r>
-              <a:rPr lang="en-US" dirty="0" err="1" smtClean="0"/>
-              <a:t>mã</a:t>
-            </a:r>
-            <a:endParaRPr lang="en-US" dirty="0"/>
-          </a:p>
-        </p:txBody>
-      </p:sp>
-      <p:cxnSp>
-        <p:nvCxnSpPr>
-          <p:cNvPr id="29" name="Straight Connector 28"/>
-          <p:cNvCxnSpPr/>
-          <p:nvPr/>
-        </p:nvCxnSpPr>
-        <p:spPr>
-          <a:xfrm>
-            <a:off x="5486399" y="1688121"/>
-            <a:ext cx="11775" cy="554738"/>
-          </a:xfrm>
-          <a:prstGeom prst="line">
-            <a:avLst/>
-          </a:prstGeom>
-        </p:spPr>
-        <p:style>
-          <a:lnRef idx="1">
-            <a:schemeClr val="accent1"/>
-          </a:lnRef>
-          <a:fillRef idx="0">
-            <a:schemeClr val="accent1"/>
-          </a:fillRef>
-          <a:effectRef idx="0">
-            <a:schemeClr val="accent1"/>
-          </a:effectRef>
-          <a:fontRef idx="minor">
-            <a:schemeClr val="tx1"/>
-          </a:fontRef>
-        </p:style>
-      </p:cxnSp>
-      <p:cxnSp>
-        <p:nvCxnSpPr>
-          <p:cNvPr id="31" name="Straight Connector 30"/>
-          <p:cNvCxnSpPr/>
-          <p:nvPr/>
-        </p:nvCxnSpPr>
-        <p:spPr>
-          <a:xfrm>
-            <a:off x="6822830" y="1702185"/>
-            <a:ext cx="5451" cy="509962"/>
-          </a:xfrm>
-          <a:prstGeom prst="line">
-            <a:avLst/>
-          </a:prstGeom>
-        </p:spPr>
-        <p:style>
-          <a:lnRef idx="1">
-            <a:schemeClr val="accent1"/>
-          </a:lnRef>
-          <a:fillRef idx="0">
-            <a:schemeClr val="accent1"/>
-          </a:fillRef>
-          <a:effectRef idx="0">
-            <a:schemeClr val="accent1"/>
-          </a:effectRef>
-          <a:fontRef idx="minor">
-            <a:schemeClr val="tx1"/>
-          </a:fontRef>
-        </p:style>
-      </p:cxnSp>
-      <p:cxnSp>
-        <p:nvCxnSpPr>
-          <p:cNvPr id="34" name="Straight Connector 33"/>
-          <p:cNvCxnSpPr/>
-          <p:nvPr/>
-        </p:nvCxnSpPr>
-        <p:spPr>
-          <a:xfrm>
-            <a:off x="10002126" y="3284777"/>
-            <a:ext cx="0" cy="516723"/>
-          </a:xfrm>
-          <a:prstGeom prst="line">
-            <a:avLst/>
-          </a:prstGeom>
-        </p:spPr>
-        <p:style>
-          <a:lnRef idx="1">
-            <a:schemeClr val="accent1"/>
-          </a:lnRef>
-          <a:fillRef idx="0">
-            <a:schemeClr val="accent1"/>
-          </a:fillRef>
-          <a:effectRef idx="0">
-            <a:schemeClr val="accent1"/>
-          </a:effectRef>
-          <a:fontRef idx="minor">
-            <a:schemeClr val="tx1"/>
-          </a:fontRef>
-        </p:style>
-      </p:cxnSp>
-      <p:cxnSp>
-        <p:nvCxnSpPr>
-          <p:cNvPr id="37" name="Straight Connector 36"/>
-          <p:cNvCxnSpPr/>
-          <p:nvPr/>
-        </p:nvCxnSpPr>
-        <p:spPr>
-          <a:xfrm>
-            <a:off x="6822828" y="2560611"/>
-            <a:ext cx="14068" cy="1237372"/>
-          </a:xfrm>
-          <a:prstGeom prst="line">
-            <a:avLst/>
-          </a:prstGeom>
-        </p:spPr>
-        <p:style>
-          <a:lnRef idx="1">
-            <a:schemeClr val="accent1"/>
-          </a:lnRef>
-          <a:fillRef idx="0">
-            <a:schemeClr val="accent1"/>
-          </a:fillRef>
-          <a:effectRef idx="0">
-            <a:schemeClr val="accent1"/>
-          </a:effectRef>
-          <a:fontRef idx="minor">
-            <a:schemeClr val="tx1"/>
-          </a:fontRef>
-        </p:style>
-      </p:cxnSp>
-      <p:cxnSp>
-        <p:nvCxnSpPr>
-          <p:cNvPr id="39" name="Straight Connector 38"/>
-          <p:cNvCxnSpPr/>
-          <p:nvPr/>
-        </p:nvCxnSpPr>
-        <p:spPr>
-          <a:xfrm>
-            <a:off x="8173328" y="2612191"/>
-            <a:ext cx="14068" cy="1196344"/>
-          </a:xfrm>
-          <a:prstGeom prst="line">
-            <a:avLst/>
-          </a:prstGeom>
-        </p:spPr>
-        <p:style>
-          <a:lnRef idx="1">
-            <a:schemeClr val="accent1"/>
-          </a:lnRef>
-          <a:fillRef idx="0">
-            <a:schemeClr val="accent1"/>
-          </a:fillRef>
-          <a:effectRef idx="0">
-            <a:schemeClr val="accent1"/>
-          </a:effectRef>
-          <a:fontRef idx="minor">
-            <a:schemeClr val="tx1"/>
-          </a:fontRef>
-        </p:style>
-      </p:cxnSp>
-      <p:sp>
-        <p:nvSpPr>
-          <p:cNvPr id="2" name="TextBox 1"/>
-          <p:cNvSpPr txBox="1"/>
-          <p:nvPr/>
-        </p:nvSpPr>
-        <p:spPr>
-          <a:xfrm>
-            <a:off x="850006" y="5885645"/>
-            <a:ext cx="5803576" cy="584775"/>
-          </a:xfrm>
-          <a:prstGeom prst="rect">
-            <a:avLst/>
-          </a:prstGeom>
-          <a:noFill/>
-        </p:spPr>
-        <p:txBody>
-          <a:bodyPr wrap="none" rtlCol="0">
-            <a:spAutoFit/>
-          </a:bodyPr>
-          <a:lstStyle/>
-          <a:p>
-            <a:r>
-              <a:rPr lang="en-US" sz="3200" dirty="0" err="1" smtClean="0"/>
-              <a:t>Ghi</a:t>
-            </a:r>
-            <a:r>
-              <a:rPr lang="en-US" sz="3200" dirty="0" smtClean="0"/>
-              <a:t> </a:t>
-            </a:r>
-            <a:r>
-              <a:rPr lang="en-US" sz="3200" dirty="0" err="1" smtClean="0"/>
-              <a:t>thông</a:t>
-            </a:r>
-            <a:r>
-              <a:rPr lang="en-US" sz="3200" dirty="0" smtClean="0"/>
-              <a:t> tin </a:t>
-            </a:r>
-            <a:r>
-              <a:rPr lang="en-US" sz="3200" dirty="0" err="1" smtClean="0"/>
-              <a:t>mã</a:t>
-            </a:r>
-            <a:r>
-              <a:rPr lang="en-US" sz="3200" dirty="0" smtClean="0"/>
-              <a:t> </a:t>
-            </a:r>
-            <a:r>
-              <a:rPr lang="en-US" sz="3200" dirty="0" err="1" smtClean="0"/>
-              <a:t>hóa</a:t>
-            </a:r>
-            <a:r>
-              <a:rPr lang="en-US" sz="3200" dirty="0" smtClean="0"/>
-              <a:t> </a:t>
-            </a:r>
-            <a:r>
-              <a:rPr lang="en-US" sz="3200" dirty="0" err="1" smtClean="0"/>
-              <a:t>vào</a:t>
-            </a:r>
-            <a:r>
-              <a:rPr lang="en-US" sz="3200" dirty="0" smtClean="0"/>
-              <a:t> </a:t>
-            </a:r>
-            <a:r>
-              <a:rPr lang="en-US" sz="3200" dirty="0" err="1" smtClean="0"/>
-              <a:t>cuối</a:t>
-            </a:r>
-            <a:r>
-              <a:rPr lang="en-US" sz="3200" dirty="0" smtClean="0"/>
-              <a:t> file</a:t>
-            </a:r>
-            <a:endParaRPr lang="en-US" sz="3200" dirty="0"/>
-          </a:p>
-        </p:txBody>
-      </p:sp>
-      <p:cxnSp>
-        <p:nvCxnSpPr>
-          <p:cNvPr id="32" name="Straight Connector 31"/>
-          <p:cNvCxnSpPr/>
-          <p:nvPr/>
-        </p:nvCxnSpPr>
-        <p:spPr>
-          <a:xfrm>
-            <a:off x="5480946" y="2579433"/>
-            <a:ext cx="14068" cy="1237372"/>
-          </a:xfrm>
-          <a:prstGeom prst="line">
-            <a:avLst/>
-          </a:prstGeom>
-        </p:spPr>
-        <p:style>
-          <a:lnRef idx="1">
-            <a:schemeClr val="accent1"/>
-          </a:lnRef>
-          <a:fillRef idx="0">
-            <a:schemeClr val="accent1"/>
-          </a:fillRef>
-          <a:effectRef idx="0">
-            <a:schemeClr val="accent1"/>
-          </a:effectRef>
-          <a:fontRef idx="minor">
-            <a:schemeClr val="tx1"/>
-          </a:fontRef>
-        </p:style>
-      </p:cxnSp>
-      <p:cxnSp>
-        <p:nvCxnSpPr>
-          <p:cNvPr id="28" name="Straight Connector 27"/>
-          <p:cNvCxnSpPr/>
-          <p:nvPr/>
-        </p:nvCxnSpPr>
-        <p:spPr>
-          <a:xfrm>
-            <a:off x="9509757" y="3274282"/>
-            <a:ext cx="14071" cy="510223"/>
-          </a:xfrm>
-          <a:prstGeom prst="line">
-            <a:avLst/>
-          </a:prstGeom>
-          <a:ln>
-            <a:prstDash val="sysDash"/>
-          </a:ln>
-        </p:spPr>
-        <p:style>
-          <a:lnRef idx="1">
-            <a:schemeClr val="accent1"/>
-          </a:lnRef>
-          <a:fillRef idx="0">
-            <a:schemeClr val="accent1"/>
-          </a:fillRef>
-          <a:effectRef idx="0">
-            <a:schemeClr val="accent1"/>
-          </a:effectRef>
-          <a:fontRef idx="minor">
-            <a:schemeClr val="tx1"/>
-          </a:fontRef>
-        </p:style>
-      </p:cxnSp>
-      <p:pic>
-        <p:nvPicPr>
-          <p:cNvPr id="36" name="Picture 35"/>
-          <p:cNvPicPr>
-            <a:picLocks noChangeAspect="1"/>
-          </p:cNvPicPr>
-          <p:nvPr/>
-        </p:nvPicPr>
-        <p:blipFill>
-          <a:blip r:embed="rId2"/>
-          <a:stretch>
-            <a:fillRect/>
-          </a:stretch>
-        </p:blipFill>
-        <p:spPr>
-          <a:xfrm>
-            <a:off x="1772918" y="2042273"/>
-            <a:ext cx="8387082" cy="1408298"/>
-          </a:xfrm>
-          <a:prstGeom prst="rect">
-            <a:avLst/>
-          </a:prstGeom>
-        </p:spPr>
-      </p:pic>
-    </p:spTree>
-    <p:extLst>
-      <p:ext uri="{BB962C8B-B14F-4D97-AF65-F5344CB8AC3E}">
-        <p14:creationId xmlns:p14="http://schemas.microsoft.com/office/powerpoint/2010/main" val="3549116938"/>
       </p:ext>
     </p:extLst>
   </p:cSld>

</xml_diff>

<commit_message>
# Update LUANVAN.docx : Kien Truc He Thong # Update SODO.pptx: Replace File
</commit_message>
<xml_diff>
--- a/Document/SODO.pptx
+++ b/Document/SODO.pptx
@@ -19,6 +19,7 @@
     <p:sldId id="265" r:id="rId13"/>
     <p:sldId id="267" r:id="rId14"/>
     <p:sldId id="266" r:id="rId15"/>
+    <p:sldId id="270" r:id="rId16"/>
   </p:sldIdLst>
   <p:sldSz cx="12192000" cy="6858000"/>
   <p:notesSz cx="7315200" cy="9601200"/>
@@ -2013,55 +2014,7 @@
                 <a:schemeClr val="tx1"/>
               </a:solidFill>
             </a:rPr>
-            <a:t>Ghi</a:t>
-          </a:r>
-          <a:r>
-            <a:rPr lang="en-US" sz="2400" b="1" dirty="0" smtClean="0">
-              <a:solidFill>
-                <a:schemeClr val="tx1"/>
-              </a:solidFill>
-            </a:rPr>
-            <a:t> </a:t>
-          </a:r>
-          <a:r>
-            <a:rPr lang="en-US" sz="2400" b="1" dirty="0" err="1" smtClean="0">
-              <a:solidFill>
-                <a:schemeClr val="tx1"/>
-              </a:solidFill>
-            </a:rPr>
-            <a:t>đè</a:t>
-          </a:r>
-          <a:r>
-            <a:rPr lang="en-US" sz="2400" b="1" dirty="0" smtClean="0">
-              <a:solidFill>
-                <a:schemeClr val="tx1"/>
-              </a:solidFill>
-            </a:rPr>
-            <a:t> </a:t>
-          </a:r>
-          <a:r>
-            <a:rPr lang="en-US" sz="2400" b="1" dirty="0" err="1" smtClean="0">
-              <a:solidFill>
-                <a:schemeClr val="tx1"/>
-              </a:solidFill>
-            </a:rPr>
-            <a:t>lệnh</a:t>
-          </a:r>
-          <a:r>
-            <a:rPr lang="en-US" sz="2400" b="1" dirty="0" smtClean="0">
-              <a:solidFill>
-                <a:schemeClr val="tx1"/>
-              </a:solidFill>
-            </a:rPr>
-            <a:t> </a:t>
-          </a:r>
-          <a:r>
-            <a:rPr lang="en-US" sz="2400" b="1" dirty="0" err="1" smtClean="0">
-              <a:solidFill>
-                <a:schemeClr val="tx1"/>
-              </a:solidFill>
-            </a:rPr>
-            <a:t>jmp</a:t>
+            <a:t>Nhảy</a:t>
           </a:r>
           <a:r>
             <a:rPr lang="en-US" sz="2400" b="1" dirty="0" smtClean="0">
@@ -2078,38 +2031,6 @@
               </a:solidFill>
             </a:rPr>
             <a:t>tới</a:t>
-          </a:r>
-          <a:r>
-            <a:rPr lang="en-US" sz="2400" b="1" dirty="0" smtClean="0">
-              <a:solidFill>
-                <a:schemeClr val="tx1"/>
-              </a:solidFill>
-            </a:rPr>
-            <a:t> </a:t>
-          </a:r>
-          <a:r>
-            <a:rPr lang="en-US" sz="2400" b="1" dirty="0" err="1" smtClean="0">
-              <a:solidFill>
-                <a:schemeClr val="tx1"/>
-              </a:solidFill>
-            </a:rPr>
-            <a:t>địa</a:t>
-          </a:r>
-          <a:r>
-            <a:rPr lang="en-US" sz="2400" b="1" dirty="0" smtClean="0">
-              <a:solidFill>
-                <a:schemeClr val="tx1"/>
-              </a:solidFill>
-            </a:rPr>
-            <a:t> </a:t>
-          </a:r>
-          <a:r>
-            <a:rPr lang="en-US" sz="2400" b="1" dirty="0" err="1" smtClean="0">
-              <a:solidFill>
-                <a:schemeClr val="tx1"/>
-              </a:solidFill>
-            </a:rPr>
-            <a:t>chỉ</a:t>
           </a:r>
           <a:r>
             <a:rPr lang="en-US" sz="2400" b="1" dirty="0" smtClean="0">
@@ -3897,55 +3818,7 @@
                 <a:schemeClr val="tx1"/>
               </a:solidFill>
             </a:rPr>
-            <a:t>Ghi</a:t>
-          </a:r>
-          <a:r>
-            <a:rPr lang="en-US" sz="2400" b="1" kern="1200" dirty="0" smtClean="0">
-              <a:solidFill>
-                <a:schemeClr val="tx1"/>
-              </a:solidFill>
-            </a:rPr>
-            <a:t> </a:t>
-          </a:r>
-          <a:r>
-            <a:rPr lang="en-US" sz="2400" b="1" kern="1200" dirty="0" err="1" smtClean="0">
-              <a:solidFill>
-                <a:schemeClr val="tx1"/>
-              </a:solidFill>
-            </a:rPr>
-            <a:t>đè</a:t>
-          </a:r>
-          <a:r>
-            <a:rPr lang="en-US" sz="2400" b="1" kern="1200" dirty="0" smtClean="0">
-              <a:solidFill>
-                <a:schemeClr val="tx1"/>
-              </a:solidFill>
-            </a:rPr>
-            <a:t> </a:t>
-          </a:r>
-          <a:r>
-            <a:rPr lang="en-US" sz="2400" b="1" kern="1200" dirty="0" err="1" smtClean="0">
-              <a:solidFill>
-                <a:schemeClr val="tx1"/>
-              </a:solidFill>
-            </a:rPr>
-            <a:t>lệnh</a:t>
-          </a:r>
-          <a:r>
-            <a:rPr lang="en-US" sz="2400" b="1" kern="1200" dirty="0" smtClean="0">
-              <a:solidFill>
-                <a:schemeClr val="tx1"/>
-              </a:solidFill>
-            </a:rPr>
-            <a:t> </a:t>
-          </a:r>
-          <a:r>
-            <a:rPr lang="en-US" sz="2400" b="1" kern="1200" dirty="0" err="1" smtClean="0">
-              <a:solidFill>
-                <a:schemeClr val="tx1"/>
-              </a:solidFill>
-            </a:rPr>
-            <a:t>jmp</a:t>
+            <a:t>Nhảy</a:t>
           </a:r>
           <a:r>
             <a:rPr lang="en-US" sz="2400" b="1" kern="1200" dirty="0" smtClean="0">
@@ -3962,38 +3835,6 @@
               </a:solidFill>
             </a:rPr>
             <a:t>tới</a:t>
-          </a:r>
-          <a:r>
-            <a:rPr lang="en-US" sz="2400" b="1" kern="1200" dirty="0" smtClean="0">
-              <a:solidFill>
-                <a:schemeClr val="tx1"/>
-              </a:solidFill>
-            </a:rPr>
-            <a:t> </a:t>
-          </a:r>
-          <a:r>
-            <a:rPr lang="en-US" sz="2400" b="1" kern="1200" dirty="0" err="1" smtClean="0">
-              <a:solidFill>
-                <a:schemeClr val="tx1"/>
-              </a:solidFill>
-            </a:rPr>
-            <a:t>địa</a:t>
-          </a:r>
-          <a:r>
-            <a:rPr lang="en-US" sz="2400" b="1" kern="1200" dirty="0" smtClean="0">
-              <a:solidFill>
-                <a:schemeClr val="tx1"/>
-              </a:solidFill>
-            </a:rPr>
-            <a:t> </a:t>
-          </a:r>
-          <a:r>
-            <a:rPr lang="en-US" sz="2400" b="1" kern="1200" dirty="0" err="1" smtClean="0">
-              <a:solidFill>
-                <a:schemeClr val="tx1"/>
-              </a:solidFill>
-            </a:rPr>
-            <a:t>chỉ</a:t>
           </a:r>
           <a:r>
             <a:rPr lang="en-US" sz="2400" b="1" kern="1200" dirty="0" smtClean="0">
@@ -7239,7 +7080,7 @@
           <a:p>
             <a:fld id="{16D2D749-03DE-4EC2-8C00-F102FCD2936A}" type="datetimeFigureOut">
               <a:rPr lang="en-US" smtClean="0"/>
-              <a:t>7/3/2015</a:t>
+              <a:t>7/4/2015</a:t>
             </a:fld>
             <a:endParaRPr lang="en-US"/>
           </a:p>
@@ -7409,7 +7250,7 @@
           <a:p>
             <a:fld id="{16D2D749-03DE-4EC2-8C00-F102FCD2936A}" type="datetimeFigureOut">
               <a:rPr lang="en-US" smtClean="0"/>
-              <a:t>7/3/2015</a:t>
+              <a:t>7/4/2015</a:t>
             </a:fld>
             <a:endParaRPr lang="en-US"/>
           </a:p>
@@ -7589,7 +7430,7 @@
           <a:p>
             <a:fld id="{16D2D749-03DE-4EC2-8C00-F102FCD2936A}" type="datetimeFigureOut">
               <a:rPr lang="en-US" smtClean="0"/>
-              <a:t>7/3/2015</a:t>
+              <a:t>7/4/2015</a:t>
             </a:fld>
             <a:endParaRPr lang="en-US"/>
           </a:p>
@@ -7759,7 +7600,7 @@
           <a:p>
             <a:fld id="{16D2D749-03DE-4EC2-8C00-F102FCD2936A}" type="datetimeFigureOut">
               <a:rPr lang="en-US" smtClean="0"/>
-              <a:t>7/3/2015</a:t>
+              <a:t>7/4/2015</a:t>
             </a:fld>
             <a:endParaRPr lang="en-US"/>
           </a:p>
@@ -8005,7 +7846,7 @@
           <a:p>
             <a:fld id="{16D2D749-03DE-4EC2-8C00-F102FCD2936A}" type="datetimeFigureOut">
               <a:rPr lang="en-US" smtClean="0"/>
-              <a:t>7/3/2015</a:t>
+              <a:t>7/4/2015</a:t>
             </a:fld>
             <a:endParaRPr lang="en-US"/>
           </a:p>
@@ -8237,7 +8078,7 @@
           <a:p>
             <a:fld id="{16D2D749-03DE-4EC2-8C00-F102FCD2936A}" type="datetimeFigureOut">
               <a:rPr lang="en-US" smtClean="0"/>
-              <a:t>7/3/2015</a:t>
+              <a:t>7/4/2015</a:t>
             </a:fld>
             <a:endParaRPr lang="en-US"/>
           </a:p>
@@ -8604,7 +8445,7 @@
           <a:p>
             <a:fld id="{16D2D749-03DE-4EC2-8C00-F102FCD2936A}" type="datetimeFigureOut">
               <a:rPr lang="en-US" smtClean="0"/>
-              <a:t>7/3/2015</a:t>
+              <a:t>7/4/2015</a:t>
             </a:fld>
             <a:endParaRPr lang="en-US"/>
           </a:p>
@@ -8722,7 +8563,7 @@
           <a:p>
             <a:fld id="{16D2D749-03DE-4EC2-8C00-F102FCD2936A}" type="datetimeFigureOut">
               <a:rPr lang="en-US" smtClean="0"/>
-              <a:t>7/3/2015</a:t>
+              <a:t>7/4/2015</a:t>
             </a:fld>
             <a:endParaRPr lang="en-US"/>
           </a:p>
@@ -8817,7 +8658,7 @@
           <a:p>
             <a:fld id="{16D2D749-03DE-4EC2-8C00-F102FCD2936A}" type="datetimeFigureOut">
               <a:rPr lang="en-US" smtClean="0"/>
-              <a:t>7/3/2015</a:t>
+              <a:t>7/4/2015</a:t>
             </a:fld>
             <a:endParaRPr lang="en-US"/>
           </a:p>
@@ -9094,7 +8935,7 @@
           <a:p>
             <a:fld id="{16D2D749-03DE-4EC2-8C00-F102FCD2936A}" type="datetimeFigureOut">
               <a:rPr lang="en-US" smtClean="0"/>
-              <a:t>7/3/2015</a:t>
+              <a:t>7/4/2015</a:t>
             </a:fld>
             <a:endParaRPr lang="en-US"/>
           </a:p>
@@ -9347,7 +9188,7 @@
           <a:p>
             <a:fld id="{16D2D749-03DE-4EC2-8C00-F102FCD2936A}" type="datetimeFigureOut">
               <a:rPr lang="en-US" smtClean="0"/>
-              <a:t>7/3/2015</a:t>
+              <a:t>7/4/2015</a:t>
             </a:fld>
             <a:endParaRPr lang="en-US"/>
           </a:p>
@@ -9560,7 +9401,7 @@
           <a:p>
             <a:fld id="{16D2D749-03DE-4EC2-8C00-F102FCD2936A}" type="datetimeFigureOut">
               <a:rPr lang="en-US" smtClean="0"/>
-              <a:t>7/3/2015</a:t>
+              <a:t>7/4/2015</a:t>
             </a:fld>
             <a:endParaRPr lang="en-US"/>
           </a:p>
@@ -9972,7 +9813,7 @@
           <p:nvPr>
             <p:extLst>
               <p:ext uri="{D42A27DB-BD31-4B8C-83A1-F6EECF244321}">
-                <p14:modId xmlns:p14="http://schemas.microsoft.com/office/powerpoint/2010/main" val="921665046"/>
+                <p14:modId xmlns:p14="http://schemas.microsoft.com/office/powerpoint/2010/main" val="1331381503"/>
               </p:ext>
             </p:extLst>
           </p:nvPr>
@@ -11939,7 +11780,7 @@
         </p:nvSpPr>
         <p:spPr>
           <a:xfrm>
-            <a:off x="8360393" y="4260311"/>
+            <a:off x="9565445" y="4260311"/>
             <a:ext cx="1604211" cy="1376797"/>
           </a:xfrm>
           <a:prstGeom prst="ellipse">
@@ -12013,13 +11854,15 @@
       <p:cxnSp>
         <p:nvCxnSpPr>
           <p:cNvPr id="14" name="Straight Arrow Connector 13"/>
-          <p:cNvCxnSpPr/>
+          <p:cNvCxnSpPr>
+            <a:endCxn id="13" idx="2"/>
+          </p:cNvCxnSpPr>
           <p:nvPr/>
         </p:nvCxnSpPr>
         <p:spPr>
           <a:xfrm flipV="1">
-            <a:off x="6674335" y="4948710"/>
-            <a:ext cx="1590879" cy="1"/>
+            <a:off x="6619324" y="4948710"/>
+            <a:ext cx="2946121" cy="28036"/>
           </a:xfrm>
           <a:prstGeom prst="straightConnector1">
             <a:avLst/>
@@ -12269,8 +12112,8 @@
         </p:nvSpPr>
         <p:spPr>
           <a:xfrm>
-            <a:off x="3031958" y="2967790"/>
-            <a:ext cx="2406316" cy="930442"/>
+            <a:off x="3031958" y="2043113"/>
+            <a:ext cx="2406316" cy="1236931"/>
           </a:xfrm>
           <a:prstGeom prst="roundRect">
             <a:avLst/>
@@ -12328,7 +12171,18 @@
                   <a:schemeClr val="tx1"/>
                 </a:solidFill>
               </a:rPr>
-              <a:t>Inject DLL</a:t>
+              <a:t>DLL injection</a:t>
+            </a:r>
+          </a:p>
+          <a:p>
+            <a:pPr algn="ctr"/>
+            <a:r>
+              <a:rPr lang="en-US" sz="2800" b="1" dirty="0" smtClean="0">
+                <a:solidFill>
+                  <a:schemeClr val="tx1"/>
+                </a:solidFill>
+              </a:rPr>
+              <a:t>module</a:t>
             </a:r>
             <a:endParaRPr lang="en-US" sz="2800" b="1" dirty="0">
               <a:solidFill>
@@ -12346,8 +12200,8 @@
         </p:nvSpPr>
         <p:spPr>
           <a:xfrm>
-            <a:off x="6849980" y="2967790"/>
-            <a:ext cx="2406316" cy="930442"/>
+            <a:off x="6849980" y="2043113"/>
+            <a:ext cx="2406316" cy="1236933"/>
           </a:xfrm>
           <a:prstGeom prst="roundRect">
             <a:avLst/>
@@ -12400,14 +12254,14 @@
           <a:p>
             <a:pPr algn="ctr"/>
             <a:r>
-              <a:rPr lang="en-US" sz="2800" dirty="0" smtClean="0">
+              <a:rPr lang="en-US" sz="2800" b="1" dirty="0" smtClean="0">
                 <a:solidFill>
                   <a:schemeClr val="tx1"/>
                 </a:solidFill>
               </a:rPr>
-              <a:t>Intercept API</a:t>
-            </a:r>
-            <a:endParaRPr lang="en-US" sz="2800" dirty="0">
+              <a:t>API intercepting module</a:t>
+            </a:r>
+            <a:endParaRPr lang="en-US" sz="2800" b="1" dirty="0">
               <a:solidFill>
                 <a:schemeClr val="tx1"/>
               </a:solidFill>
@@ -12457,42 +12311,81 @@
           </a:p>
         </p:txBody>
       </p:sp>
-      <p:cxnSp>
-        <p:nvCxnSpPr>
-          <p:cNvPr id="10" name="Straight Arrow Connector 9"/>
-          <p:cNvCxnSpPr>
-            <a:stCxn id="6" idx="3"/>
-            <a:endCxn id="7" idx="1"/>
-          </p:cNvCxnSpPr>
+      <p:sp>
+        <p:nvSpPr>
+          <p:cNvPr id="9" name="Rounded Rectangle 8"/>
+          <p:cNvSpPr/>
           <p:nvPr/>
-        </p:nvCxnSpPr>
+        </p:nvSpPr>
         <p:spPr>
           <a:xfrm>
-            <a:off x="5438274" y="3433011"/>
-            <a:ext cx="1411706" cy="0"/>
-          </a:xfrm>
-          <a:prstGeom prst="straightConnector1">
+            <a:off x="4918470" y="3693751"/>
+            <a:ext cx="2406316" cy="560796"/>
+          </a:xfrm>
+          <a:prstGeom prst="roundRect">
             <a:avLst/>
           </a:prstGeom>
-          <a:ln w="76200">
-            <a:tailEnd type="triangle"/>
-          </a:ln>
+          <a:gradFill flip="none" rotWithShape="1">
+            <a:gsLst>
+              <a:gs pos="7000">
+                <a:schemeClr val="accent2">
+                  <a:lumMod val="20000"/>
+                  <a:lumOff val="80000"/>
+                </a:schemeClr>
+              </a:gs>
+              <a:gs pos="77000">
+                <a:schemeClr val="accent2">
+                  <a:lumMod val="60000"/>
+                  <a:lumOff val="40000"/>
+                </a:schemeClr>
+              </a:gs>
+              <a:gs pos="100000">
+                <a:schemeClr val="accent2">
+                  <a:lumMod val="75000"/>
+                </a:schemeClr>
+              </a:gs>
+            </a:gsLst>
+            <a:lin ang="5400000" scaled="1"/>
+            <a:tileRect/>
+          </a:gradFill>
         </p:spPr>
         <p:style>
-          <a:lnRef idx="1">
-            <a:schemeClr val="accent1"/>
+          <a:lnRef idx="2">
+            <a:schemeClr val="accent1">
+              <a:shade val="50000"/>
+            </a:schemeClr>
           </a:lnRef>
-          <a:fillRef idx="0">
+          <a:fillRef idx="1">
             <a:schemeClr val="accent1"/>
           </a:fillRef>
           <a:effectRef idx="0">
             <a:schemeClr val="accent1"/>
           </a:effectRef>
           <a:fontRef idx="minor">
-            <a:schemeClr val="tx1"/>
+            <a:schemeClr val="lt1"/>
           </a:fontRef>
         </p:style>
-      </p:cxnSp>
+        <p:txBody>
+          <a:bodyPr rtlCol="0" anchor="ctr"/>
+          <a:lstStyle/>
+          <a:p>
+            <a:pPr algn="ctr"/>
+            <a:r>
+              <a:rPr lang="en-US" sz="2800" b="1" dirty="0" err="1" smtClean="0">
+                <a:solidFill>
+                  <a:schemeClr val="tx1"/>
+                </a:solidFill>
+              </a:rPr>
+              <a:t>EasyHook</a:t>
+            </a:r>
+            <a:endParaRPr lang="en-US" sz="2800" b="1" dirty="0">
+              <a:solidFill>
+                <a:schemeClr val="tx1"/>
+              </a:solidFill>
+            </a:endParaRPr>
+          </a:p>
+        </p:txBody>
+      </p:sp>
     </p:spTree>
     <p:extLst>
       <p:ext uri="{BB962C8B-B14F-4D97-AF65-F5344CB8AC3E}">
@@ -13418,6 +13311,924 @@
 </p:sld>
 </file>
 
+<file path=ppt/slides/slide15.xml><?xml version="1.0" encoding="utf-8"?>
+<p:sld xmlns:a="http://schemas.openxmlformats.org/drawingml/2006/main" xmlns:r="http://schemas.openxmlformats.org/officeDocument/2006/relationships" xmlns:p="http://schemas.openxmlformats.org/presentationml/2006/main">
+  <p:cSld>
+    <p:spTree>
+      <p:nvGrpSpPr>
+        <p:cNvPr id="1" name=""/>
+        <p:cNvGrpSpPr/>
+        <p:nvPr/>
+      </p:nvGrpSpPr>
+      <p:grpSpPr>
+        <a:xfrm>
+          <a:off x="0" y="0"/>
+          <a:ext cx="0" cy="0"/>
+          <a:chOff x="0" y="0"/>
+          <a:chExt cx="0" cy="0"/>
+        </a:xfrm>
+      </p:grpSpPr>
+      <p:pic>
+        <p:nvPicPr>
+          <p:cNvPr id="5" name="Picture 4"/>
+          <p:cNvPicPr>
+            <a:picLocks noChangeAspect="1"/>
+          </p:cNvPicPr>
+          <p:nvPr/>
+        </p:nvPicPr>
+        <p:blipFill>
+          <a:blip r:embed="rId2" cstate="print">
+            <a:extLst>
+              <a:ext uri="{28A0092B-C50C-407E-A947-70E740481C1C}">
+                <a14:useLocalDpi xmlns:a14="http://schemas.microsoft.com/office/drawing/2010/main" val="0"/>
+              </a:ext>
+            </a:extLst>
+          </a:blip>
+          <a:stretch>
+            <a:fillRect/>
+          </a:stretch>
+        </p:blipFill>
+        <p:spPr>
+          <a:xfrm>
+            <a:off x="4141786" y="1517650"/>
+            <a:ext cx="812800" cy="812800"/>
+          </a:xfrm>
+          <a:prstGeom prst="rect">
+            <a:avLst/>
+          </a:prstGeom>
+        </p:spPr>
+      </p:pic>
+      <p:pic>
+        <p:nvPicPr>
+          <p:cNvPr id="6" name="Picture 5"/>
+          <p:cNvPicPr>
+            <a:picLocks noChangeAspect="1"/>
+          </p:cNvPicPr>
+          <p:nvPr/>
+        </p:nvPicPr>
+        <p:blipFill>
+          <a:blip r:embed="rId2" cstate="print">
+            <a:extLst>
+              <a:ext uri="{28A0092B-C50C-407E-A947-70E740481C1C}">
+                <a14:useLocalDpi xmlns:a14="http://schemas.microsoft.com/office/drawing/2010/main" val="0"/>
+              </a:ext>
+            </a:extLst>
+          </a:blip>
+          <a:stretch>
+            <a:fillRect/>
+          </a:stretch>
+        </p:blipFill>
+        <p:spPr>
+          <a:xfrm>
+            <a:off x="9209101" y="1517650"/>
+            <a:ext cx="812800" cy="812800"/>
+          </a:xfrm>
+          <a:prstGeom prst="rect">
+            <a:avLst/>
+          </a:prstGeom>
+        </p:spPr>
+      </p:pic>
+      <p:pic>
+        <p:nvPicPr>
+          <p:cNvPr id="7" name="Picture 6"/>
+          <p:cNvPicPr>
+            <a:picLocks noChangeAspect="1"/>
+          </p:cNvPicPr>
+          <p:nvPr/>
+        </p:nvPicPr>
+        <p:blipFill>
+          <a:blip r:embed="rId2" cstate="print">
+            <a:extLst>
+              <a:ext uri="{28A0092B-C50C-407E-A947-70E740481C1C}">
+                <a14:useLocalDpi xmlns:a14="http://schemas.microsoft.com/office/drawing/2010/main" val="0"/>
+              </a:ext>
+            </a:extLst>
+          </a:blip>
+          <a:stretch>
+            <a:fillRect/>
+          </a:stretch>
+        </p:blipFill>
+        <p:spPr>
+          <a:xfrm>
+            <a:off x="4141786" y="2884491"/>
+            <a:ext cx="812800" cy="812800"/>
+          </a:xfrm>
+          <a:prstGeom prst="rect">
+            <a:avLst/>
+          </a:prstGeom>
+        </p:spPr>
+      </p:pic>
+      <p:pic>
+        <p:nvPicPr>
+          <p:cNvPr id="8" name="Picture 7"/>
+          <p:cNvPicPr>
+            <a:picLocks noChangeAspect="1"/>
+          </p:cNvPicPr>
+          <p:nvPr/>
+        </p:nvPicPr>
+        <p:blipFill>
+          <a:blip r:embed="rId2" cstate="print">
+            <a:extLst>
+              <a:ext uri="{28A0092B-C50C-407E-A947-70E740481C1C}">
+                <a14:useLocalDpi xmlns:a14="http://schemas.microsoft.com/office/drawing/2010/main" val="0"/>
+              </a:ext>
+            </a:extLst>
+          </a:blip>
+          <a:stretch>
+            <a:fillRect/>
+          </a:stretch>
+        </p:blipFill>
+        <p:spPr>
+          <a:xfrm>
+            <a:off x="9209101" y="2884491"/>
+            <a:ext cx="812800" cy="812800"/>
+          </a:xfrm>
+          <a:prstGeom prst="rect">
+            <a:avLst/>
+          </a:prstGeom>
+        </p:spPr>
+      </p:pic>
+      <p:pic>
+        <p:nvPicPr>
+          <p:cNvPr id="9" name="Picture 8"/>
+          <p:cNvPicPr>
+            <a:picLocks noChangeAspect="1"/>
+          </p:cNvPicPr>
+          <p:nvPr/>
+        </p:nvPicPr>
+        <p:blipFill>
+          <a:blip r:embed="rId2" cstate="print">
+            <a:extLst>
+              <a:ext uri="{28A0092B-C50C-407E-A947-70E740481C1C}">
+                <a14:useLocalDpi xmlns:a14="http://schemas.microsoft.com/office/drawing/2010/main" val="0"/>
+              </a:ext>
+            </a:extLst>
+          </a:blip>
+          <a:stretch>
+            <a:fillRect/>
+          </a:stretch>
+        </p:blipFill>
+        <p:spPr>
+          <a:xfrm>
+            <a:off x="4141786" y="4422788"/>
+            <a:ext cx="812800" cy="812800"/>
+          </a:xfrm>
+          <a:prstGeom prst="rect">
+            <a:avLst/>
+          </a:prstGeom>
+        </p:spPr>
+      </p:pic>
+      <p:pic>
+        <p:nvPicPr>
+          <p:cNvPr id="10" name="Picture 9"/>
+          <p:cNvPicPr>
+            <a:picLocks noChangeAspect="1"/>
+          </p:cNvPicPr>
+          <p:nvPr/>
+        </p:nvPicPr>
+        <p:blipFill>
+          <a:blip r:embed="rId2" cstate="print">
+            <a:extLst>
+              <a:ext uri="{28A0092B-C50C-407E-A947-70E740481C1C}">
+                <a14:useLocalDpi xmlns:a14="http://schemas.microsoft.com/office/drawing/2010/main" val="0"/>
+              </a:ext>
+            </a:extLst>
+          </a:blip>
+          <a:stretch>
+            <a:fillRect/>
+          </a:stretch>
+        </p:blipFill>
+        <p:spPr>
+          <a:xfrm>
+            <a:off x="9209101" y="4422788"/>
+            <a:ext cx="812800" cy="812800"/>
+          </a:xfrm>
+          <a:prstGeom prst="rect">
+            <a:avLst/>
+          </a:prstGeom>
+        </p:spPr>
+      </p:pic>
+      <p:sp>
+        <p:nvSpPr>
+          <p:cNvPr id="11" name="TextBox 10"/>
+          <p:cNvSpPr txBox="1"/>
+          <p:nvPr/>
+        </p:nvSpPr>
+        <p:spPr>
+          <a:xfrm>
+            <a:off x="3712059" y="1148318"/>
+            <a:ext cx="1672253" cy="369332"/>
+          </a:xfrm>
+          <a:prstGeom prst="rect">
+            <a:avLst/>
+          </a:prstGeom>
+          <a:noFill/>
+        </p:spPr>
+        <p:txBody>
+          <a:bodyPr wrap="none" rtlCol="0">
+            <a:spAutoFit/>
+          </a:bodyPr>
+          <a:lstStyle/>
+          <a:p>
+            <a:r>
+              <a:rPr lang="en-US" dirty="0" smtClean="0"/>
+              <a:t>EXAMPLE.DOCX</a:t>
+            </a:r>
+            <a:endParaRPr lang="en-US" dirty="0"/>
+          </a:p>
+        </p:txBody>
+      </p:sp>
+      <p:sp>
+        <p:nvSpPr>
+          <p:cNvPr id="12" name="TextBox 11"/>
+          <p:cNvSpPr txBox="1"/>
+          <p:nvPr/>
+        </p:nvSpPr>
+        <p:spPr>
+          <a:xfrm>
+            <a:off x="3712059" y="2547702"/>
+            <a:ext cx="1672253" cy="369332"/>
+          </a:xfrm>
+          <a:prstGeom prst="rect">
+            <a:avLst/>
+          </a:prstGeom>
+          <a:noFill/>
+        </p:spPr>
+        <p:txBody>
+          <a:bodyPr wrap="none" rtlCol="0">
+            <a:spAutoFit/>
+          </a:bodyPr>
+          <a:lstStyle/>
+          <a:p>
+            <a:r>
+              <a:rPr lang="en-US" dirty="0" smtClean="0"/>
+              <a:t>EXAMPLE.DOCX</a:t>
+            </a:r>
+            <a:endParaRPr lang="en-US" dirty="0"/>
+          </a:p>
+        </p:txBody>
+      </p:sp>
+      <p:sp>
+        <p:nvSpPr>
+          <p:cNvPr id="13" name="TextBox 12"/>
+          <p:cNvSpPr txBox="1"/>
+          <p:nvPr/>
+        </p:nvSpPr>
+        <p:spPr>
+          <a:xfrm>
+            <a:off x="3712059" y="4053456"/>
+            <a:ext cx="1672253" cy="369332"/>
+          </a:xfrm>
+          <a:prstGeom prst="rect">
+            <a:avLst/>
+          </a:prstGeom>
+          <a:noFill/>
+        </p:spPr>
+        <p:txBody>
+          <a:bodyPr wrap="none" rtlCol="0">
+            <a:spAutoFit/>
+          </a:bodyPr>
+          <a:lstStyle/>
+          <a:p>
+            <a:r>
+              <a:rPr lang="en-US" dirty="0" smtClean="0"/>
+              <a:t>EXAMPLE.DOCX</a:t>
+            </a:r>
+            <a:endParaRPr lang="en-US" dirty="0"/>
+          </a:p>
+        </p:txBody>
+      </p:sp>
+      <p:sp>
+        <p:nvSpPr>
+          <p:cNvPr id="14" name="TextBox 13"/>
+          <p:cNvSpPr txBox="1"/>
+          <p:nvPr/>
+        </p:nvSpPr>
+        <p:spPr>
+          <a:xfrm>
+            <a:off x="8779374" y="1144109"/>
+            <a:ext cx="1598643" cy="369332"/>
+          </a:xfrm>
+          <a:prstGeom prst="rect">
+            <a:avLst/>
+          </a:prstGeom>
+          <a:noFill/>
+        </p:spPr>
+        <p:txBody>
+          <a:bodyPr wrap="none" rtlCol="0">
+            <a:spAutoFit/>
+          </a:bodyPr>
+          <a:lstStyle/>
+          <a:p>
+            <a:r>
+              <a:rPr lang="en-US" dirty="0" smtClean="0"/>
+              <a:t>~WRDXXX.TMP</a:t>
+            </a:r>
+            <a:endParaRPr lang="en-US" dirty="0"/>
+          </a:p>
+        </p:txBody>
+      </p:sp>
+      <p:sp>
+        <p:nvSpPr>
+          <p:cNvPr id="15" name="TextBox 14"/>
+          <p:cNvSpPr txBox="1"/>
+          <p:nvPr/>
+        </p:nvSpPr>
+        <p:spPr>
+          <a:xfrm>
+            <a:off x="8779373" y="2547702"/>
+            <a:ext cx="1598643" cy="369332"/>
+          </a:xfrm>
+          <a:prstGeom prst="rect">
+            <a:avLst/>
+          </a:prstGeom>
+          <a:noFill/>
+        </p:spPr>
+        <p:txBody>
+          <a:bodyPr wrap="none" rtlCol="0">
+            <a:spAutoFit/>
+          </a:bodyPr>
+          <a:lstStyle/>
+          <a:p>
+            <a:r>
+              <a:rPr lang="en-US" dirty="0" smtClean="0"/>
+              <a:t>~WRDXXX.TMP</a:t>
+            </a:r>
+            <a:endParaRPr lang="en-US" dirty="0"/>
+          </a:p>
+        </p:txBody>
+      </p:sp>
+      <p:sp>
+        <p:nvSpPr>
+          <p:cNvPr id="16" name="TextBox 15"/>
+          <p:cNvSpPr txBox="1"/>
+          <p:nvPr/>
+        </p:nvSpPr>
+        <p:spPr>
+          <a:xfrm>
+            <a:off x="8779372" y="4053456"/>
+            <a:ext cx="1598643" cy="369332"/>
+          </a:xfrm>
+          <a:prstGeom prst="rect">
+            <a:avLst/>
+          </a:prstGeom>
+          <a:noFill/>
+        </p:spPr>
+        <p:txBody>
+          <a:bodyPr wrap="none" rtlCol="0">
+            <a:spAutoFit/>
+          </a:bodyPr>
+          <a:lstStyle/>
+          <a:p>
+            <a:r>
+              <a:rPr lang="en-US" dirty="0" smtClean="0"/>
+              <a:t>~WRDXXX.TMP</a:t>
+            </a:r>
+            <a:endParaRPr lang="en-US" dirty="0"/>
+          </a:p>
+        </p:txBody>
+      </p:sp>
+      <p:sp>
+        <p:nvSpPr>
+          <p:cNvPr id="17" name="TextBox 16"/>
+          <p:cNvSpPr txBox="1"/>
+          <p:nvPr/>
+        </p:nvSpPr>
+        <p:spPr>
+          <a:xfrm>
+            <a:off x="5728054" y="1554718"/>
+            <a:ext cx="2744790" cy="369332"/>
+          </a:xfrm>
+          <a:prstGeom prst="rect">
+            <a:avLst/>
+          </a:prstGeom>
+          <a:noFill/>
+        </p:spPr>
+        <p:txBody>
+          <a:bodyPr wrap="none" rtlCol="0">
+            <a:spAutoFit/>
+          </a:bodyPr>
+          <a:lstStyle/>
+          <a:p>
+            <a:r>
+              <a:rPr lang="en-US" dirty="0" err="1" smtClean="0"/>
+              <a:t>Tạo</a:t>
+            </a:r>
+            <a:r>
+              <a:rPr lang="en-US" dirty="0" smtClean="0"/>
+              <a:t> file </a:t>
+            </a:r>
+            <a:r>
+              <a:rPr lang="en-US" dirty="0" err="1" smtClean="0"/>
+              <a:t>tạm</a:t>
+            </a:r>
+            <a:r>
+              <a:rPr lang="en-US" dirty="0" smtClean="0"/>
+              <a:t> ~WRDXXX.TMP</a:t>
+            </a:r>
+            <a:endParaRPr lang="en-US" dirty="0"/>
+          </a:p>
+        </p:txBody>
+      </p:sp>
+      <p:sp>
+        <p:nvSpPr>
+          <p:cNvPr id="18" name="TextBox 17"/>
+          <p:cNvSpPr txBox="1"/>
+          <p:nvPr/>
+        </p:nvSpPr>
+        <p:spPr>
+          <a:xfrm>
+            <a:off x="6215515" y="2684463"/>
+            <a:ext cx="1732654" cy="646331"/>
+          </a:xfrm>
+          <a:prstGeom prst="rect">
+            <a:avLst/>
+          </a:prstGeom>
+          <a:noFill/>
+        </p:spPr>
+        <p:txBody>
+          <a:bodyPr wrap="none" rtlCol="0">
+            <a:spAutoFit/>
+          </a:bodyPr>
+          <a:lstStyle/>
+          <a:p>
+            <a:pPr algn="ctr"/>
+            <a:r>
+              <a:rPr lang="en-US" dirty="0" err="1" smtClean="0"/>
+              <a:t>Cập</a:t>
+            </a:r>
+            <a:r>
+              <a:rPr lang="en-US" dirty="0" smtClean="0"/>
+              <a:t> </a:t>
+            </a:r>
+            <a:r>
+              <a:rPr lang="en-US" dirty="0" err="1" smtClean="0"/>
+              <a:t>nhật</a:t>
+            </a:r>
+            <a:r>
+              <a:rPr lang="en-US" dirty="0" smtClean="0"/>
+              <a:t> </a:t>
+            </a:r>
+            <a:r>
+              <a:rPr lang="en-US" dirty="0" err="1" smtClean="0"/>
+              <a:t>dữ</a:t>
+            </a:r>
+            <a:r>
+              <a:rPr lang="en-US" dirty="0" smtClean="0"/>
+              <a:t> </a:t>
+            </a:r>
+            <a:r>
+              <a:rPr lang="en-US" dirty="0" err="1" smtClean="0"/>
+              <a:t>liệu</a:t>
+            </a:r>
+            <a:endParaRPr lang="en-US" dirty="0" smtClean="0"/>
+          </a:p>
+          <a:p>
+            <a:pPr algn="ctr"/>
+            <a:r>
+              <a:rPr lang="en-US" dirty="0" err="1"/>
+              <a:t>t</a:t>
+            </a:r>
+            <a:r>
+              <a:rPr lang="en-US" dirty="0" err="1" smtClean="0"/>
+              <a:t>rên</a:t>
+            </a:r>
+            <a:r>
+              <a:rPr lang="en-US" dirty="0" smtClean="0"/>
+              <a:t> file </a:t>
+            </a:r>
+            <a:r>
+              <a:rPr lang="en-US" dirty="0" err="1" smtClean="0"/>
+              <a:t>tạm</a:t>
+            </a:r>
+            <a:endParaRPr lang="en-US" dirty="0"/>
+          </a:p>
+        </p:txBody>
+      </p:sp>
+      <p:sp>
+        <p:nvSpPr>
+          <p:cNvPr id="19" name="TextBox 18"/>
+          <p:cNvSpPr txBox="1"/>
+          <p:nvPr/>
+        </p:nvSpPr>
+        <p:spPr>
+          <a:xfrm>
+            <a:off x="5843176" y="4026498"/>
+            <a:ext cx="2505301" cy="923330"/>
+          </a:xfrm>
+          <a:prstGeom prst="rect">
+            <a:avLst/>
+          </a:prstGeom>
+          <a:noFill/>
+        </p:spPr>
+        <p:txBody>
+          <a:bodyPr wrap="none" rtlCol="0">
+            <a:spAutoFit/>
+          </a:bodyPr>
+          <a:lstStyle/>
+          <a:p>
+            <a:pPr algn="ctr"/>
+            <a:r>
+              <a:rPr lang="en-US" dirty="0" err="1" smtClean="0"/>
+              <a:t>Xóa</a:t>
+            </a:r>
+            <a:r>
+              <a:rPr lang="en-US" dirty="0" smtClean="0"/>
+              <a:t> file EXAMPLE.DOCX</a:t>
+            </a:r>
+          </a:p>
+          <a:p>
+            <a:pPr algn="ctr"/>
+            <a:r>
+              <a:rPr lang="en-US" dirty="0" err="1" smtClean="0"/>
+              <a:t>Và</a:t>
+            </a:r>
+            <a:r>
+              <a:rPr lang="en-US" dirty="0" smtClean="0"/>
+              <a:t> </a:t>
+            </a:r>
+            <a:r>
+              <a:rPr lang="en-US" dirty="0" err="1" smtClean="0"/>
+              <a:t>đổi</a:t>
+            </a:r>
+            <a:r>
+              <a:rPr lang="en-US" dirty="0" smtClean="0"/>
+              <a:t> </a:t>
+            </a:r>
+            <a:r>
+              <a:rPr lang="en-US" dirty="0" err="1" smtClean="0"/>
+              <a:t>tên</a:t>
+            </a:r>
+            <a:r>
+              <a:rPr lang="en-US" dirty="0" smtClean="0"/>
+              <a:t> file </a:t>
+            </a:r>
+            <a:r>
+              <a:rPr lang="en-US" dirty="0" err="1" smtClean="0"/>
+              <a:t>tạm</a:t>
+            </a:r>
+            <a:r>
+              <a:rPr lang="en-US" dirty="0" smtClean="0"/>
+              <a:t> </a:t>
+            </a:r>
+            <a:r>
+              <a:rPr lang="en-US" dirty="0" err="1" smtClean="0"/>
+              <a:t>thành</a:t>
+            </a:r>
+            <a:endParaRPr lang="en-US" dirty="0" smtClean="0"/>
+          </a:p>
+          <a:p>
+            <a:pPr algn="ctr"/>
+            <a:r>
+              <a:rPr lang="en-US" dirty="0" smtClean="0"/>
+              <a:t>EXAMPLE.DOCX</a:t>
+            </a:r>
+            <a:endParaRPr lang="en-US" dirty="0"/>
+          </a:p>
+        </p:txBody>
+      </p:sp>
+      <p:cxnSp>
+        <p:nvCxnSpPr>
+          <p:cNvPr id="21" name="Straight Arrow Connector 20"/>
+          <p:cNvCxnSpPr/>
+          <p:nvPr/>
+        </p:nvCxnSpPr>
+        <p:spPr>
+          <a:xfrm>
+            <a:off x="5384312" y="2057400"/>
+            <a:ext cx="3395060" cy="0"/>
+          </a:xfrm>
+          <a:prstGeom prst="straightConnector1">
+            <a:avLst/>
+          </a:prstGeom>
+          <a:ln w="50800">
+            <a:tailEnd type="triangle"/>
+          </a:ln>
+        </p:spPr>
+        <p:style>
+          <a:lnRef idx="1">
+            <a:schemeClr val="accent1"/>
+          </a:lnRef>
+          <a:fillRef idx="0">
+            <a:schemeClr val="accent1"/>
+          </a:fillRef>
+          <a:effectRef idx="0">
+            <a:schemeClr val="accent1"/>
+          </a:effectRef>
+          <a:fontRef idx="minor">
+            <a:schemeClr val="tx1"/>
+          </a:fontRef>
+        </p:style>
+      </p:cxnSp>
+      <p:cxnSp>
+        <p:nvCxnSpPr>
+          <p:cNvPr id="22" name="Straight Arrow Connector 21"/>
+          <p:cNvCxnSpPr/>
+          <p:nvPr/>
+        </p:nvCxnSpPr>
+        <p:spPr>
+          <a:xfrm>
+            <a:off x="5407521" y="3449636"/>
+            <a:ext cx="3395060" cy="0"/>
+          </a:xfrm>
+          <a:prstGeom prst="straightConnector1">
+            <a:avLst/>
+          </a:prstGeom>
+          <a:ln w="50800">
+            <a:tailEnd type="triangle"/>
+          </a:ln>
+        </p:spPr>
+        <p:style>
+          <a:lnRef idx="1">
+            <a:schemeClr val="accent1"/>
+          </a:lnRef>
+          <a:fillRef idx="0">
+            <a:schemeClr val="accent1"/>
+          </a:fillRef>
+          <a:effectRef idx="0">
+            <a:schemeClr val="accent1"/>
+          </a:effectRef>
+          <a:fontRef idx="minor">
+            <a:schemeClr val="tx1"/>
+          </a:fontRef>
+        </p:style>
+      </p:cxnSp>
+      <p:cxnSp>
+        <p:nvCxnSpPr>
+          <p:cNvPr id="23" name="Straight Arrow Connector 22"/>
+          <p:cNvCxnSpPr/>
+          <p:nvPr/>
+        </p:nvCxnSpPr>
+        <p:spPr>
+          <a:xfrm flipH="1">
+            <a:off x="5382237" y="5028700"/>
+            <a:ext cx="3397135" cy="0"/>
+          </a:xfrm>
+          <a:prstGeom prst="straightConnector1">
+            <a:avLst/>
+          </a:prstGeom>
+          <a:ln w="50800">
+            <a:tailEnd type="triangle"/>
+          </a:ln>
+        </p:spPr>
+        <p:style>
+          <a:lnRef idx="1">
+            <a:schemeClr val="accent1"/>
+          </a:lnRef>
+          <a:fillRef idx="0">
+            <a:schemeClr val="accent1"/>
+          </a:fillRef>
+          <a:effectRef idx="0">
+            <a:schemeClr val="accent1"/>
+          </a:effectRef>
+          <a:fontRef idx="minor">
+            <a:schemeClr val="tx1"/>
+          </a:fontRef>
+        </p:style>
+      </p:cxnSp>
+      <p:sp>
+        <p:nvSpPr>
+          <p:cNvPr id="24" name="TextBox 23"/>
+          <p:cNvSpPr txBox="1"/>
+          <p:nvPr/>
+        </p:nvSpPr>
+        <p:spPr>
+          <a:xfrm>
+            <a:off x="6868241" y="2174644"/>
+            <a:ext cx="301686" cy="369332"/>
+          </a:xfrm>
+          <a:prstGeom prst="rect">
+            <a:avLst/>
+          </a:prstGeom>
+          <a:noFill/>
+        </p:spPr>
+        <p:txBody>
+          <a:bodyPr wrap="none" rtlCol="0">
+            <a:spAutoFit/>
+          </a:bodyPr>
+          <a:lstStyle/>
+          <a:p>
+            <a:r>
+              <a:rPr lang="en-US" dirty="0" smtClean="0"/>
+              <a:t>1</a:t>
+            </a:r>
+            <a:endParaRPr lang="en-US" dirty="0"/>
+          </a:p>
+        </p:txBody>
+      </p:sp>
+      <p:sp>
+        <p:nvSpPr>
+          <p:cNvPr id="25" name="TextBox 24"/>
+          <p:cNvSpPr txBox="1"/>
+          <p:nvPr/>
+        </p:nvSpPr>
+        <p:spPr>
+          <a:xfrm>
+            <a:off x="6870904" y="3488502"/>
+            <a:ext cx="301686" cy="369332"/>
+          </a:xfrm>
+          <a:prstGeom prst="rect">
+            <a:avLst/>
+          </a:prstGeom>
+          <a:noFill/>
+        </p:spPr>
+        <p:txBody>
+          <a:bodyPr wrap="none" rtlCol="0">
+            <a:spAutoFit/>
+          </a:bodyPr>
+          <a:lstStyle/>
+          <a:p>
+            <a:r>
+              <a:rPr lang="en-US" dirty="0" smtClean="0"/>
+              <a:t>2</a:t>
+            </a:r>
+            <a:endParaRPr lang="en-US" dirty="0"/>
+          </a:p>
+        </p:txBody>
+      </p:sp>
+      <p:sp>
+        <p:nvSpPr>
+          <p:cNvPr id="26" name="TextBox 25"/>
+          <p:cNvSpPr txBox="1"/>
+          <p:nvPr/>
+        </p:nvSpPr>
+        <p:spPr>
+          <a:xfrm>
+            <a:off x="6868241" y="5050922"/>
+            <a:ext cx="301686" cy="369332"/>
+          </a:xfrm>
+          <a:prstGeom prst="rect">
+            <a:avLst/>
+          </a:prstGeom>
+          <a:noFill/>
+        </p:spPr>
+        <p:txBody>
+          <a:bodyPr wrap="none" rtlCol="0">
+            <a:spAutoFit/>
+          </a:bodyPr>
+          <a:lstStyle/>
+          <a:p>
+            <a:r>
+              <a:rPr lang="en-US" dirty="0" smtClean="0"/>
+              <a:t>3</a:t>
+            </a:r>
+            <a:endParaRPr lang="en-US" dirty="0"/>
+          </a:p>
+        </p:txBody>
+      </p:sp>
+      <p:cxnSp>
+        <p:nvCxnSpPr>
+          <p:cNvPr id="28" name="Straight Connector 27"/>
+          <p:cNvCxnSpPr/>
+          <p:nvPr/>
+        </p:nvCxnSpPr>
+        <p:spPr>
+          <a:xfrm>
+            <a:off x="3642427" y="4488163"/>
+            <a:ext cx="1678171" cy="847875"/>
+          </a:xfrm>
+          <a:prstGeom prst="line">
+            <a:avLst/>
+          </a:prstGeom>
+          <a:ln w="28575">
+            <a:solidFill>
+              <a:srgbClr val="FF0000"/>
+            </a:solidFill>
+          </a:ln>
+        </p:spPr>
+        <p:style>
+          <a:lnRef idx="1">
+            <a:schemeClr val="accent1"/>
+          </a:lnRef>
+          <a:fillRef idx="0">
+            <a:schemeClr val="accent1"/>
+          </a:fillRef>
+          <a:effectRef idx="0">
+            <a:schemeClr val="accent1"/>
+          </a:effectRef>
+          <a:fontRef idx="minor">
+            <a:schemeClr val="tx1"/>
+          </a:fontRef>
+        </p:style>
+      </p:cxnSp>
+      <p:cxnSp>
+        <p:nvCxnSpPr>
+          <p:cNvPr id="30" name="Straight Connector 29"/>
+          <p:cNvCxnSpPr/>
+          <p:nvPr/>
+        </p:nvCxnSpPr>
+        <p:spPr>
+          <a:xfrm flipV="1">
+            <a:off x="3642427" y="4488163"/>
+            <a:ext cx="1678171" cy="847875"/>
+          </a:xfrm>
+          <a:prstGeom prst="line">
+            <a:avLst/>
+          </a:prstGeom>
+          <a:ln w="28575">
+            <a:solidFill>
+              <a:srgbClr val="FF0000"/>
+            </a:solidFill>
+          </a:ln>
+        </p:spPr>
+        <p:style>
+          <a:lnRef idx="1">
+            <a:schemeClr val="accent1"/>
+          </a:lnRef>
+          <a:fillRef idx="0">
+            <a:schemeClr val="accent1"/>
+          </a:fillRef>
+          <a:effectRef idx="0">
+            <a:schemeClr val="accent1"/>
+          </a:effectRef>
+          <a:fontRef idx="minor">
+            <a:schemeClr val="tx1"/>
+          </a:fontRef>
+        </p:style>
+      </p:cxnSp>
+      <p:cxnSp>
+        <p:nvCxnSpPr>
+          <p:cNvPr id="37" name="Straight Connector 36"/>
+          <p:cNvCxnSpPr/>
+          <p:nvPr/>
+        </p:nvCxnSpPr>
+        <p:spPr>
+          <a:xfrm flipV="1">
+            <a:off x="8779372" y="4089524"/>
+            <a:ext cx="1575434" cy="395133"/>
+          </a:xfrm>
+          <a:prstGeom prst="line">
+            <a:avLst/>
+          </a:prstGeom>
+          <a:ln w="28575">
+            <a:solidFill>
+              <a:srgbClr val="FF0000"/>
+            </a:solidFill>
+          </a:ln>
+        </p:spPr>
+        <p:style>
+          <a:lnRef idx="1">
+            <a:schemeClr val="accent1"/>
+          </a:lnRef>
+          <a:fillRef idx="0">
+            <a:schemeClr val="accent1"/>
+          </a:fillRef>
+          <a:effectRef idx="0">
+            <a:schemeClr val="accent1"/>
+          </a:effectRef>
+          <a:fontRef idx="minor">
+            <a:schemeClr val="tx1"/>
+          </a:fontRef>
+        </p:style>
+      </p:cxnSp>
+      <p:cxnSp>
+        <p:nvCxnSpPr>
+          <p:cNvPr id="39" name="Straight Connector 38"/>
+          <p:cNvCxnSpPr/>
+          <p:nvPr/>
+        </p:nvCxnSpPr>
+        <p:spPr>
+          <a:xfrm flipH="1" flipV="1">
+            <a:off x="8779372" y="4093196"/>
+            <a:ext cx="1575434" cy="378761"/>
+          </a:xfrm>
+          <a:prstGeom prst="line">
+            <a:avLst/>
+          </a:prstGeom>
+          <a:ln w="28575">
+            <a:solidFill>
+              <a:srgbClr val="FF0000"/>
+            </a:solidFill>
+          </a:ln>
+        </p:spPr>
+        <p:style>
+          <a:lnRef idx="1">
+            <a:schemeClr val="accent1"/>
+          </a:lnRef>
+          <a:fillRef idx="0">
+            <a:schemeClr val="accent1"/>
+          </a:fillRef>
+          <a:effectRef idx="0">
+            <a:schemeClr val="accent1"/>
+          </a:effectRef>
+          <a:fontRef idx="minor">
+            <a:schemeClr val="tx1"/>
+          </a:fontRef>
+        </p:style>
+      </p:cxnSp>
+    </p:spTree>
+    <p:extLst>
+      <p:ext uri="{BB962C8B-B14F-4D97-AF65-F5344CB8AC3E}">
+        <p14:creationId xmlns:p14="http://schemas.microsoft.com/office/powerpoint/2010/main" val="3564868569"/>
+      </p:ext>
+    </p:extLst>
+  </p:cSld>
+  <p:clrMapOvr>
+    <a:masterClrMapping/>
+  </p:clrMapOvr>
+</p:sld>
+</file>
+
 <file path=ppt/slides/slide2.xml><?xml version="1.0" encoding="utf-8"?>
 <p:sld xmlns:a="http://schemas.openxmlformats.org/drawingml/2006/main" xmlns:r="http://schemas.openxmlformats.org/officeDocument/2006/relationships" xmlns:p="http://schemas.openxmlformats.org/presentationml/2006/main">
   <p:cSld>
@@ -13954,7 +14765,7 @@
         <p:spPr>
           <a:xfrm>
             <a:off x="7895575" y="374006"/>
-            <a:ext cx="2124428" cy="461665"/>
+            <a:ext cx="2191754" cy="461665"/>
           </a:xfrm>
           <a:prstGeom prst="rect">
             <a:avLst/>
@@ -13975,7 +14786,7 @@
                   </a:schemeClr>
                 </a:solidFill>
               </a:rPr>
-              <a:t>My Application</a:t>
+              <a:t>Our Application</a:t>
             </a:r>
           </a:p>
         </p:txBody>
@@ -14079,8 +14890,8 @@
         </p:nvSpPr>
         <p:spPr>
           <a:xfrm>
-            <a:off x="7582487" y="3233828"/>
-            <a:ext cx="2146507" cy="1561513"/>
+            <a:off x="7582487" y="3212032"/>
+            <a:ext cx="2146507" cy="1582336"/>
           </a:xfrm>
           <a:prstGeom prst="ellipse">
             <a:avLst/>
@@ -14141,41 +14952,6 @@
           </a:p>
         </p:txBody>
       </p:sp>
-      <p:cxnSp>
-        <p:nvCxnSpPr>
-          <p:cNvPr id="34" name="Straight Arrow Connector 33"/>
-          <p:cNvCxnSpPr>
-            <a:endCxn id="32" idx="2"/>
-          </p:cNvCxnSpPr>
-          <p:nvPr/>
-        </p:nvCxnSpPr>
-        <p:spPr>
-          <a:xfrm>
-            <a:off x="5338580" y="4010526"/>
-            <a:ext cx="2243907" cy="4059"/>
-          </a:xfrm>
-          <a:prstGeom prst="straightConnector1">
-            <a:avLst/>
-          </a:prstGeom>
-          <a:ln w="76200">
-            <a:tailEnd type="triangle"/>
-          </a:ln>
-        </p:spPr>
-        <p:style>
-          <a:lnRef idx="1">
-            <a:schemeClr val="accent1"/>
-          </a:lnRef>
-          <a:fillRef idx="0">
-            <a:schemeClr val="accent1"/>
-          </a:fillRef>
-          <a:effectRef idx="0">
-            <a:schemeClr val="accent1"/>
-          </a:effectRef>
-          <a:fontRef idx="minor">
-            <a:schemeClr val="tx1"/>
-          </a:fontRef>
-        </p:style>
-      </p:cxnSp>
       <p:cxnSp>
         <p:nvCxnSpPr>
           <p:cNvPr id="3" name="Straight Arrow Connector 2"/>
@@ -14486,6 +15262,40 @@
           </a:p>
         </p:txBody>
       </p:sp>
+      <p:cxnSp>
+        <p:nvCxnSpPr>
+          <p:cNvPr id="8" name="Straight Arrow Connector 7"/>
+          <p:cNvCxnSpPr/>
+          <p:nvPr/>
+        </p:nvCxnSpPr>
+        <p:spPr>
+          <a:xfrm flipH="1" flipV="1">
+            <a:off x="5365454" y="3994772"/>
+            <a:ext cx="2244657" cy="8428"/>
+          </a:xfrm>
+          <a:prstGeom prst="straightConnector1">
+            <a:avLst/>
+          </a:prstGeom>
+          <a:ln w="76200">
+            <a:headEnd type="triangle"/>
+            <a:tailEnd type="triangle"/>
+          </a:ln>
+        </p:spPr>
+        <p:style>
+          <a:lnRef idx="1">
+            <a:schemeClr val="accent1"/>
+          </a:lnRef>
+          <a:fillRef idx="0">
+            <a:schemeClr val="accent1"/>
+          </a:fillRef>
+          <a:effectRef idx="0">
+            <a:schemeClr val="accent1"/>
+          </a:effectRef>
+          <a:fontRef idx="minor">
+            <a:schemeClr val="tx1"/>
+          </a:fontRef>
+        </p:style>
+      </p:cxnSp>
     </p:spTree>
     <p:extLst>
       <p:ext uri="{BB962C8B-B14F-4D97-AF65-F5344CB8AC3E}">
@@ -15016,7 +15826,7 @@
                             </p:stCondLst>
                             <p:childTnLst>
                               <p:par>
-                                <p:cTn id="48" presetID="2" presetClass="entr" presetSubtype="4" fill="hold" nodeType="clickEffect">
+                                <p:cTn id="48" presetID="10" presetClass="entr" presetSubtype="0" fill="hold" grpId="0" nodeType="clickEffect">
                                   <p:stCondLst>
                                     <p:cond delay="0"/>
                                   </p:stCondLst>
@@ -15024,97 +15834,6 @@
                                     <p:set>
                                       <p:cBhvr>
                                         <p:cTn id="49" dur="1" fill="hold">
-                                          <p:stCondLst>
-                                            <p:cond delay="0"/>
-                                          </p:stCondLst>
-                                        </p:cTn>
-                                        <p:tgtEl>
-                                          <p:spTgt spid="34"/>
-                                        </p:tgtEl>
-                                        <p:attrNameLst>
-                                          <p:attrName>style.visibility</p:attrName>
-                                        </p:attrNameLst>
-                                      </p:cBhvr>
-                                      <p:to>
-                                        <p:strVal val="visible"/>
-                                      </p:to>
-                                    </p:set>
-                                    <p:anim calcmode="lin" valueType="num">
-                                      <p:cBhvr additive="base">
-                                        <p:cTn id="50" dur="500" fill="hold"/>
-                                        <p:tgtEl>
-                                          <p:spTgt spid="34"/>
-                                        </p:tgtEl>
-                                        <p:attrNameLst>
-                                          <p:attrName>ppt_x</p:attrName>
-                                        </p:attrNameLst>
-                                      </p:cBhvr>
-                                      <p:tavLst>
-                                        <p:tav tm="0">
-                                          <p:val>
-                                            <p:strVal val="#ppt_x"/>
-                                          </p:val>
-                                        </p:tav>
-                                        <p:tav tm="100000">
-                                          <p:val>
-                                            <p:strVal val="#ppt_x"/>
-                                          </p:val>
-                                        </p:tav>
-                                      </p:tavLst>
-                                    </p:anim>
-                                    <p:anim calcmode="lin" valueType="num">
-                                      <p:cBhvr additive="base">
-                                        <p:cTn id="51" dur="500" fill="hold"/>
-                                        <p:tgtEl>
-                                          <p:spTgt spid="34"/>
-                                        </p:tgtEl>
-                                        <p:attrNameLst>
-                                          <p:attrName>ppt_y</p:attrName>
-                                        </p:attrNameLst>
-                                      </p:cBhvr>
-                                      <p:tavLst>
-                                        <p:tav tm="0">
-                                          <p:val>
-                                            <p:strVal val="1+#ppt_h/2"/>
-                                          </p:val>
-                                        </p:tav>
-                                        <p:tav tm="100000">
-                                          <p:val>
-                                            <p:strVal val="#ppt_y"/>
-                                          </p:val>
-                                        </p:tav>
-                                      </p:tavLst>
-                                    </p:anim>
-                                  </p:childTnLst>
-                                </p:cTn>
-                              </p:par>
-                            </p:childTnLst>
-                          </p:cTn>
-                        </p:par>
-                      </p:childTnLst>
-                    </p:cTn>
-                  </p:par>
-                  <p:par>
-                    <p:cTn id="52" fill="hold">
-                      <p:stCondLst>
-                        <p:cond delay="indefinite"/>
-                      </p:stCondLst>
-                      <p:childTnLst>
-                        <p:par>
-                          <p:cTn id="53" fill="hold">
-                            <p:stCondLst>
-                              <p:cond delay="0"/>
-                            </p:stCondLst>
-                            <p:childTnLst>
-                              <p:par>
-                                <p:cTn id="54" presetID="10" presetClass="entr" presetSubtype="0" fill="hold" grpId="0" nodeType="clickEffect">
-                                  <p:stCondLst>
-                                    <p:cond delay="0"/>
-                                  </p:stCondLst>
-                                  <p:childTnLst>
-                                    <p:set>
-                                      <p:cBhvr>
-                                        <p:cTn id="55" dur="1" fill="hold">
                                           <p:stCondLst>
                                             <p:cond delay="0"/>
                                           </p:stCondLst>
@@ -15132,7 +15851,7 @@
                                     </p:set>
                                     <p:animEffect transition="in" filter="fade">
                                       <p:cBhvr>
-                                        <p:cTn id="56" dur="500"/>
+                                        <p:cTn id="50" dur="500"/>
                                         <p:tgtEl>
                                           <p:spTgt spid="32"/>
                                         </p:tgtEl>
@@ -15148,26 +15867,26 @@
                     </p:cTn>
                   </p:par>
                   <p:par>
-                    <p:cTn id="57" fill="hold">
+                    <p:cTn id="51" fill="hold">
                       <p:stCondLst>
                         <p:cond delay="indefinite"/>
                       </p:stCondLst>
                       <p:childTnLst>
                         <p:par>
-                          <p:cTn id="58" fill="hold">
+                          <p:cTn id="52" fill="hold">
                             <p:stCondLst>
                               <p:cond delay="0"/>
                             </p:stCondLst>
                             <p:childTnLst>
                               <p:par>
-                                <p:cTn id="59" presetID="10" presetClass="entr" presetSubtype="0" fill="hold" nodeType="clickEffect">
+                                <p:cTn id="53" presetID="10" presetClass="entr" presetSubtype="0" fill="hold" nodeType="clickEffect">
                                   <p:stCondLst>
                                     <p:cond delay="0"/>
                                   </p:stCondLst>
                                   <p:childTnLst>
                                     <p:set>
                                       <p:cBhvr>
-                                        <p:cTn id="60" dur="1" fill="hold">
+                                        <p:cTn id="54" dur="1" fill="hold">
                                           <p:stCondLst>
                                             <p:cond delay="0"/>
                                           </p:stCondLst>
@@ -15185,7 +15904,7 @@
                                     </p:set>
                                     <p:animEffect transition="in" filter="fade">
                                       <p:cBhvr>
-                                        <p:cTn id="61" dur="500"/>
+                                        <p:cTn id="55" dur="500"/>
                                         <p:tgtEl>
                                           <p:spTgt spid="42"/>
                                         </p:tgtEl>
@@ -15201,26 +15920,26 @@
                     </p:cTn>
                   </p:par>
                   <p:par>
-                    <p:cTn id="62" fill="hold">
+                    <p:cTn id="56" fill="hold">
                       <p:stCondLst>
                         <p:cond delay="indefinite"/>
                       </p:stCondLst>
                       <p:childTnLst>
                         <p:par>
-                          <p:cTn id="63" fill="hold">
+                          <p:cTn id="57" fill="hold">
                             <p:stCondLst>
                               <p:cond delay="0"/>
                             </p:stCondLst>
                             <p:childTnLst>
                               <p:par>
-                                <p:cTn id="64" presetID="1" presetClass="exit" presetSubtype="0" fill="hold" nodeType="clickEffect">
+                                <p:cTn id="58" presetID="1" presetClass="exit" presetSubtype="0" fill="hold" nodeType="clickEffect">
                                   <p:stCondLst>
                                     <p:cond delay="0"/>
                                   </p:stCondLst>
                                   <p:childTnLst>
                                     <p:set>
                                       <p:cBhvr>
-                                        <p:cTn id="65" dur="1" fill="hold">
+                                        <p:cTn id="59" dur="1" fill="hold">
                                           <p:stCondLst>
                                             <p:cond delay="0"/>
                                           </p:stCondLst>
@@ -15769,8 +16488,8 @@
         </p:nvSpPr>
         <p:spPr>
           <a:xfrm>
-            <a:off x="8007643" y="343744"/>
-            <a:ext cx="2124428" cy="461665"/>
+            <a:off x="8406108" y="329608"/>
+            <a:ext cx="2191754" cy="461665"/>
           </a:xfrm>
           <a:prstGeom prst="rect">
             <a:avLst/>
@@ -15791,7 +16510,7 @@
                   </a:schemeClr>
                 </a:solidFill>
               </a:rPr>
-              <a:t>My Application</a:t>
+              <a:t>Our Application</a:t>
             </a:r>
           </a:p>
         </p:txBody>

</xml_diff>